<commit_message>
Estoy creando el header, tambien ya añadi nuestro logo
</commit_message>
<xml_diff>
--- a/Recursos.pptx
+++ b/Recursos.pptx
@@ -104,7 +104,24 @@
       </a:defRPr>
     </a:lvl9pPr>
   </p:defaultTextStyle>
+  <p:extLst>
+    <p:ext uri="{EFAFB233-063F-42B5-8137-9DF3F51BA10A}">
+      <p15:sldGuideLst xmlns:p15="http://schemas.microsoft.com/office/powerpoint/2012/main"/>
+    </p:ext>
+  </p:extLst>
 </p:presentation>
+</file>
+
+<file path=ppt/commentAuthors.xml><?xml version="1.0" encoding="utf-8"?>
+<p:cmAuthorLst xmlns:a="http://schemas.openxmlformats.org/drawingml/2006/main" xmlns:r="http://schemas.openxmlformats.org/officeDocument/2006/relationships" xmlns:p="http://schemas.openxmlformats.org/presentationml/2006/main">
+  <p:cmAuthor id="1" name="user" initials="u" lastIdx="1" clrIdx="0">
+    <p:extLst>
+      <p:ext uri="{19B8F6BF-5375-455C-9EA6-DF929625EA0E}">
+        <p15:presenceInfo xmlns:p15="http://schemas.microsoft.com/office/powerpoint/2012/main" userId="user" providerId="None"/>
+      </p:ext>
+    </p:extLst>
+  </p:cmAuthor>
+</p:cmAuthorLst>
 </file>
 
 <file path=ppt/slideLayouts/slideLayout1.xml><?xml version="1.0" encoding="utf-8"?>
@@ -3342,6 +3359,520 @@
           <a:chExt cx="0" cy="0"/>
         </a:xfrm>
       </p:grpSpPr>
+      <p:pic>
+        <p:nvPicPr>
+          <p:cNvPr id="11" name="Imagen 10">
+            <a:extLst>
+              <a:ext uri="{FF2B5EF4-FFF2-40B4-BE49-F238E27FC236}">
+                <a16:creationId xmlns:a16="http://schemas.microsoft.com/office/drawing/2014/main" id="{647145A8-B96D-2D21-8048-58E558BAF808}"/>
+              </a:ext>
+            </a:extLst>
+          </p:cNvPr>
+          <p:cNvPicPr>
+            <a:picLocks noChangeAspect="1"/>
+          </p:cNvPicPr>
+          <p:nvPr/>
+        </p:nvPicPr>
+        <p:blipFill>
+          <a:blip r:embed="rId2"/>
+          <a:stretch>
+            <a:fillRect/>
+          </a:stretch>
+        </p:blipFill>
+        <p:spPr>
+          <a:xfrm>
+            <a:off x="0" y="0"/>
+            <a:ext cx="12192000" cy="6858000"/>
+          </a:xfrm>
+          <a:prstGeom prst="rect">
+            <a:avLst/>
+          </a:prstGeom>
+        </p:spPr>
+      </p:pic>
+      <p:sp>
+        <p:nvSpPr>
+          <p:cNvPr id="8" name="Forma libre: forma 7">
+            <a:extLst>
+              <a:ext uri="{FF2B5EF4-FFF2-40B4-BE49-F238E27FC236}">
+                <a16:creationId xmlns:a16="http://schemas.microsoft.com/office/drawing/2014/main" id="{B6A4B488-3722-1684-C80C-06F82F980C4D}"/>
+              </a:ext>
+            </a:extLst>
+          </p:cNvPr>
+          <p:cNvSpPr/>
+          <p:nvPr/>
+        </p:nvSpPr>
+        <p:spPr>
+          <a:xfrm>
+            <a:off x="194726" y="211603"/>
+            <a:ext cx="1258814" cy="893298"/>
+          </a:xfrm>
+          <a:custGeom>
+            <a:avLst/>
+            <a:gdLst>
+              <a:gd name="connsiteX0" fmla="*/ 478301 w 4600135"/>
+              <a:gd name="connsiteY0" fmla="*/ 1913206 h 3052689"/>
+              <a:gd name="connsiteX1" fmla="*/ 1913206 w 4600135"/>
+              <a:gd name="connsiteY1" fmla="*/ 0 h 3052689"/>
+              <a:gd name="connsiteX2" fmla="*/ 2982350 w 4600135"/>
+              <a:gd name="connsiteY2" fmla="*/ 1983544 h 3052689"/>
+              <a:gd name="connsiteX3" fmla="*/ 4093698 w 4600135"/>
+              <a:gd name="connsiteY3" fmla="*/ 154744 h 3052689"/>
+              <a:gd name="connsiteX4" fmla="*/ 4600135 w 4600135"/>
+              <a:gd name="connsiteY4" fmla="*/ 492369 h 3052689"/>
+              <a:gd name="connsiteX5" fmla="*/ 3080824 w 4600135"/>
+              <a:gd name="connsiteY5" fmla="*/ 2757267 h 3052689"/>
+              <a:gd name="connsiteX6" fmla="*/ 2799470 w 4600135"/>
+              <a:gd name="connsiteY6" fmla="*/ 3052689 h 3052689"/>
+              <a:gd name="connsiteX7" fmla="*/ 1828800 w 4600135"/>
+              <a:gd name="connsiteY7" fmla="*/ 1266092 h 3052689"/>
+              <a:gd name="connsiteX8" fmla="*/ 534572 w 4600135"/>
+              <a:gd name="connsiteY8" fmla="*/ 2912012 h 3052689"/>
+              <a:gd name="connsiteX9" fmla="*/ 0 w 4600135"/>
+              <a:gd name="connsiteY9" fmla="*/ 2560320 h 3052689"/>
+              <a:gd name="connsiteX10" fmla="*/ 478301 w 4600135"/>
+              <a:gd name="connsiteY10" fmla="*/ 1913206 h 3052689"/>
+              <a:gd name="connsiteX0" fmla="*/ 478301 w 4600135"/>
+              <a:gd name="connsiteY0" fmla="*/ 1913206 h 3052689"/>
+              <a:gd name="connsiteX1" fmla="*/ 1913206 w 4600135"/>
+              <a:gd name="connsiteY1" fmla="*/ 0 h 3052689"/>
+              <a:gd name="connsiteX2" fmla="*/ 2982350 w 4600135"/>
+              <a:gd name="connsiteY2" fmla="*/ 1983544 h 3052689"/>
+              <a:gd name="connsiteX3" fmla="*/ 4093698 w 4600135"/>
+              <a:gd name="connsiteY3" fmla="*/ 154744 h 3052689"/>
+              <a:gd name="connsiteX4" fmla="*/ 4600135 w 4600135"/>
+              <a:gd name="connsiteY4" fmla="*/ 492369 h 3052689"/>
+              <a:gd name="connsiteX5" fmla="*/ 2799470 w 4600135"/>
+              <a:gd name="connsiteY5" fmla="*/ 3052689 h 3052689"/>
+              <a:gd name="connsiteX6" fmla="*/ 1828800 w 4600135"/>
+              <a:gd name="connsiteY6" fmla="*/ 1266092 h 3052689"/>
+              <a:gd name="connsiteX7" fmla="*/ 534572 w 4600135"/>
+              <a:gd name="connsiteY7" fmla="*/ 2912012 h 3052689"/>
+              <a:gd name="connsiteX8" fmla="*/ 0 w 4600135"/>
+              <a:gd name="connsiteY8" fmla="*/ 2560320 h 3052689"/>
+              <a:gd name="connsiteX9" fmla="*/ 478301 w 4600135"/>
+              <a:gd name="connsiteY9" fmla="*/ 1913206 h 3052689"/>
+              <a:gd name="connsiteX0" fmla="*/ 478301 w 4600135"/>
+              <a:gd name="connsiteY0" fmla="*/ 1913206 h 3052689"/>
+              <a:gd name="connsiteX1" fmla="*/ 1913206 w 4600135"/>
+              <a:gd name="connsiteY1" fmla="*/ 0 h 3052689"/>
+              <a:gd name="connsiteX2" fmla="*/ 2982350 w 4600135"/>
+              <a:gd name="connsiteY2" fmla="*/ 1983544 h 3052689"/>
+              <a:gd name="connsiteX3" fmla="*/ 4093698 w 4600135"/>
+              <a:gd name="connsiteY3" fmla="*/ 154744 h 3052689"/>
+              <a:gd name="connsiteX4" fmla="*/ 4600135 w 4600135"/>
+              <a:gd name="connsiteY4" fmla="*/ 492369 h 3052689"/>
+              <a:gd name="connsiteX5" fmla="*/ 3010485 w 4600135"/>
+              <a:gd name="connsiteY5" fmla="*/ 3052689 h 3052689"/>
+              <a:gd name="connsiteX6" fmla="*/ 1828800 w 4600135"/>
+              <a:gd name="connsiteY6" fmla="*/ 1266092 h 3052689"/>
+              <a:gd name="connsiteX7" fmla="*/ 534572 w 4600135"/>
+              <a:gd name="connsiteY7" fmla="*/ 2912012 h 3052689"/>
+              <a:gd name="connsiteX8" fmla="*/ 0 w 4600135"/>
+              <a:gd name="connsiteY8" fmla="*/ 2560320 h 3052689"/>
+              <a:gd name="connsiteX9" fmla="*/ 478301 w 4600135"/>
+              <a:gd name="connsiteY9" fmla="*/ 1913206 h 3052689"/>
+              <a:gd name="connsiteX0" fmla="*/ 478301 w 4600135"/>
+              <a:gd name="connsiteY0" fmla="*/ 1871003 h 3010486"/>
+              <a:gd name="connsiteX1" fmla="*/ 1828799 w 4600135"/>
+              <a:gd name="connsiteY1" fmla="*/ 0 h 3010486"/>
+              <a:gd name="connsiteX2" fmla="*/ 2982350 w 4600135"/>
+              <a:gd name="connsiteY2" fmla="*/ 1941341 h 3010486"/>
+              <a:gd name="connsiteX3" fmla="*/ 4093698 w 4600135"/>
+              <a:gd name="connsiteY3" fmla="*/ 112541 h 3010486"/>
+              <a:gd name="connsiteX4" fmla="*/ 4600135 w 4600135"/>
+              <a:gd name="connsiteY4" fmla="*/ 450166 h 3010486"/>
+              <a:gd name="connsiteX5" fmla="*/ 3010485 w 4600135"/>
+              <a:gd name="connsiteY5" fmla="*/ 3010486 h 3010486"/>
+              <a:gd name="connsiteX6" fmla="*/ 1828800 w 4600135"/>
+              <a:gd name="connsiteY6" fmla="*/ 1223889 h 3010486"/>
+              <a:gd name="connsiteX7" fmla="*/ 534572 w 4600135"/>
+              <a:gd name="connsiteY7" fmla="*/ 2869809 h 3010486"/>
+              <a:gd name="connsiteX8" fmla="*/ 0 w 4600135"/>
+              <a:gd name="connsiteY8" fmla="*/ 2518117 h 3010486"/>
+              <a:gd name="connsiteX9" fmla="*/ 478301 w 4600135"/>
+              <a:gd name="connsiteY9" fmla="*/ 1871003 h 3010486"/>
+            </a:gdLst>
+            <a:ahLst/>
+            <a:cxnLst>
+              <a:cxn ang="0">
+                <a:pos x="connsiteX0" y="connsiteY0"/>
+              </a:cxn>
+              <a:cxn ang="0">
+                <a:pos x="connsiteX1" y="connsiteY1"/>
+              </a:cxn>
+              <a:cxn ang="0">
+                <a:pos x="connsiteX2" y="connsiteY2"/>
+              </a:cxn>
+              <a:cxn ang="0">
+                <a:pos x="connsiteX3" y="connsiteY3"/>
+              </a:cxn>
+              <a:cxn ang="0">
+                <a:pos x="connsiteX4" y="connsiteY4"/>
+              </a:cxn>
+              <a:cxn ang="0">
+                <a:pos x="connsiteX5" y="connsiteY5"/>
+              </a:cxn>
+              <a:cxn ang="0">
+                <a:pos x="connsiteX6" y="connsiteY6"/>
+              </a:cxn>
+              <a:cxn ang="0">
+                <a:pos x="connsiteX7" y="connsiteY7"/>
+              </a:cxn>
+              <a:cxn ang="0">
+                <a:pos x="connsiteX8" y="connsiteY8"/>
+              </a:cxn>
+              <a:cxn ang="0">
+                <a:pos x="connsiteX9" y="connsiteY9"/>
+              </a:cxn>
+            </a:cxnLst>
+            <a:rect l="l" t="t" r="r" b="b"/>
+            <a:pathLst>
+              <a:path w="4600135" h="3010486">
+                <a:moveTo>
+                  <a:pt x="478301" y="1871003"/>
+                </a:moveTo>
+                <a:lnTo>
+                  <a:pt x="1828799" y="0"/>
+                </a:lnTo>
+                <a:lnTo>
+                  <a:pt x="2982350" y="1941341"/>
+                </a:lnTo>
+                <a:lnTo>
+                  <a:pt x="4093698" y="112541"/>
+                </a:lnTo>
+                <a:lnTo>
+                  <a:pt x="4600135" y="450166"/>
+                </a:lnTo>
+                <a:lnTo>
+                  <a:pt x="3010485" y="3010486"/>
+                </a:lnTo>
+                <a:lnTo>
+                  <a:pt x="1828800" y="1223889"/>
+                </a:lnTo>
+                <a:lnTo>
+                  <a:pt x="534572" y="2869809"/>
+                </a:lnTo>
+                <a:lnTo>
+                  <a:pt x="0" y="2518117"/>
+                </a:lnTo>
+                <a:lnTo>
+                  <a:pt x="478301" y="1871003"/>
+                </a:lnTo>
+                <a:close/>
+              </a:path>
+            </a:pathLst>
+          </a:custGeom>
+          <a:solidFill>
+            <a:schemeClr val="accent1">
+              <a:lumMod val="40000"/>
+              <a:lumOff val="60000"/>
+            </a:schemeClr>
+          </a:solidFill>
+          <a:ln>
+            <a:noFill/>
+          </a:ln>
+          <a:effectLst>
+            <a:outerShdw blurRad="190500" dist="228600" dir="2700000" algn="ctr">
+              <a:srgbClr val="000000">
+                <a:alpha val="30000"/>
+              </a:srgbClr>
+            </a:outerShdw>
+          </a:effectLst>
+          <a:scene3d>
+            <a:camera prst="orthographicFront">
+              <a:rot lat="0" lon="0" rev="0"/>
+            </a:camera>
+            <a:lightRig rig="glow" dir="t">
+              <a:rot lat="0" lon="0" rev="4800000"/>
+            </a:lightRig>
+          </a:scene3d>
+          <a:sp3d prstMaterial="matte">
+            <a:bevelT w="127000" h="63500"/>
+          </a:sp3d>
+        </p:spPr>
+        <p:style>
+          <a:lnRef idx="2">
+            <a:schemeClr val="accent1">
+              <a:shade val="50000"/>
+            </a:schemeClr>
+          </a:lnRef>
+          <a:fillRef idx="1">
+            <a:schemeClr val="accent1"/>
+          </a:fillRef>
+          <a:effectRef idx="0">
+            <a:schemeClr val="accent1"/>
+          </a:effectRef>
+          <a:fontRef idx="minor">
+            <a:schemeClr val="lt1"/>
+          </a:fontRef>
+        </p:style>
+        <p:txBody>
+          <a:bodyPr rtlCol="0" anchor="ctr"/>
+          <a:lstStyle/>
+          <a:p>
+            <a:pPr algn="ctr"/>
+            <a:endParaRPr lang="es-PE"/>
+          </a:p>
+        </p:txBody>
+      </p:sp>
+      <p:sp>
+        <p:nvSpPr>
+          <p:cNvPr id="9" name="Rectángulo 8">
+            <a:extLst>
+              <a:ext uri="{FF2B5EF4-FFF2-40B4-BE49-F238E27FC236}">
+                <a16:creationId xmlns:a16="http://schemas.microsoft.com/office/drawing/2014/main" id="{3AE99106-BDA8-34CB-C596-594AEEC13370}"/>
+              </a:ext>
+            </a:extLst>
+          </p:cNvPr>
+          <p:cNvSpPr/>
+          <p:nvPr/>
+        </p:nvSpPr>
+        <p:spPr>
+          <a:xfrm>
+            <a:off x="1648266" y="335460"/>
+            <a:ext cx="2316660" cy="769441"/>
+          </a:xfrm>
+          <a:prstGeom prst="rect">
+            <a:avLst/>
+          </a:prstGeom>
+          <a:noFill/>
+        </p:spPr>
+        <p:txBody>
+          <a:bodyPr wrap="none" lIns="91440" tIns="45720" rIns="91440" bIns="45720">
+            <a:spAutoFit/>
+          </a:bodyPr>
+          <a:lstStyle/>
+          <a:p>
+            <a:pPr algn="ctr"/>
+            <a:r>
+              <a:rPr lang="es-ES" sz="4400" b="1" cap="none" spc="0" dirty="0">
+                <a:ln w="0"/>
+                <a:solidFill>
+                  <a:schemeClr val="bg1"/>
+                </a:solidFill>
+                <a:effectLst>
+                  <a:outerShdw blurRad="38100" dist="19050" dir="2700000" algn="tl" rotWithShape="0">
+                    <a:schemeClr val="dk1">
+                      <a:alpha val="40000"/>
+                    </a:schemeClr>
+                  </a:outerShdw>
+                </a:effectLst>
+                <a:latin typeface="Impact" panose="020B0806030902050204" pitchFamily="34" charset="0"/>
+                <a:ea typeface="Verdana" panose="020B0604030504040204" pitchFamily="34" charset="0"/>
+              </a:rPr>
+              <a:t>2O SYNTH</a:t>
+            </a:r>
+          </a:p>
+        </p:txBody>
+      </p:sp>
+      <p:sp>
+        <p:nvSpPr>
+          <p:cNvPr id="12" name="Círculo: vacío 11">
+            <a:extLst>
+              <a:ext uri="{FF2B5EF4-FFF2-40B4-BE49-F238E27FC236}">
+                <a16:creationId xmlns:a16="http://schemas.microsoft.com/office/drawing/2014/main" id="{CF58EFC7-879A-1B8F-D703-6C48E893E5E4}"/>
+              </a:ext>
+            </a:extLst>
+          </p:cNvPr>
+          <p:cNvSpPr/>
+          <p:nvPr/>
+        </p:nvSpPr>
+        <p:spPr>
+          <a:xfrm>
+            <a:off x="1376037" y="2661272"/>
+            <a:ext cx="864887" cy="893298"/>
+          </a:xfrm>
+          <a:prstGeom prst="donut">
+            <a:avLst>
+              <a:gd name="adj" fmla="val 19444"/>
+            </a:avLst>
+          </a:prstGeom>
+          <a:solidFill>
+            <a:schemeClr val="accent1">
+              <a:lumMod val="40000"/>
+              <a:lumOff val="60000"/>
+            </a:schemeClr>
+          </a:solidFill>
+          <a:ln>
+            <a:noFill/>
+          </a:ln>
+          <a:effectLst>
+            <a:outerShdw blurRad="190500" dist="228600" dir="2700000" algn="ctr">
+              <a:srgbClr val="000000">
+                <a:alpha val="30000"/>
+              </a:srgbClr>
+            </a:outerShdw>
+          </a:effectLst>
+          <a:scene3d>
+            <a:camera prst="orthographicFront">
+              <a:rot lat="0" lon="0" rev="0"/>
+            </a:camera>
+            <a:lightRig rig="glow" dir="t">
+              <a:rot lat="0" lon="0" rev="4800000"/>
+            </a:lightRig>
+          </a:scene3d>
+          <a:sp3d prstMaterial="matte">
+            <a:bevelT w="127000" h="63500"/>
+          </a:sp3d>
+        </p:spPr>
+        <p:style>
+          <a:lnRef idx="2">
+            <a:schemeClr val="accent1">
+              <a:shade val="50000"/>
+            </a:schemeClr>
+          </a:lnRef>
+          <a:fillRef idx="1">
+            <a:schemeClr val="accent1"/>
+          </a:fillRef>
+          <a:effectRef idx="0">
+            <a:schemeClr val="accent1"/>
+          </a:effectRef>
+          <a:fontRef idx="minor">
+            <a:schemeClr val="lt1"/>
+          </a:fontRef>
+        </p:style>
+        <p:txBody>
+          <a:bodyPr rtlCol="0" anchor="ctr"/>
+          <a:lstStyle/>
+          <a:p>
+            <a:pPr algn="ctr"/>
+            <a:endParaRPr lang="es-PE">
+              <a:solidFill>
+                <a:schemeClr val="tx1"/>
+              </a:solidFill>
+            </a:endParaRPr>
+          </a:p>
+        </p:txBody>
+      </p:sp>
+      <p:sp>
+        <p:nvSpPr>
+          <p:cNvPr id="14" name="Círculo: vacío 13">
+            <a:extLst>
+              <a:ext uri="{FF2B5EF4-FFF2-40B4-BE49-F238E27FC236}">
+                <a16:creationId xmlns:a16="http://schemas.microsoft.com/office/drawing/2014/main" id="{B5910886-6B1D-EF09-8EDE-5CD9E6A4C1BB}"/>
+              </a:ext>
+            </a:extLst>
+          </p:cNvPr>
+          <p:cNvSpPr/>
+          <p:nvPr/>
+        </p:nvSpPr>
+        <p:spPr>
+          <a:xfrm>
+            <a:off x="2240924" y="2661272"/>
+            <a:ext cx="864887" cy="893298"/>
+          </a:xfrm>
+          <a:prstGeom prst="donut">
+            <a:avLst>
+              <a:gd name="adj" fmla="val 19444"/>
+            </a:avLst>
+          </a:prstGeom>
+          <a:solidFill>
+            <a:schemeClr val="accent1">
+              <a:lumMod val="40000"/>
+              <a:lumOff val="60000"/>
+            </a:schemeClr>
+          </a:solidFill>
+          <a:ln>
+            <a:noFill/>
+          </a:ln>
+          <a:effectLst>
+            <a:outerShdw blurRad="190500" dist="228600" dir="2700000" algn="ctr">
+              <a:srgbClr val="000000">
+                <a:alpha val="30000"/>
+              </a:srgbClr>
+            </a:outerShdw>
+          </a:effectLst>
+          <a:scene3d>
+            <a:camera prst="orthographicFront">
+              <a:rot lat="0" lon="0" rev="0"/>
+            </a:camera>
+            <a:lightRig rig="glow" dir="t">
+              <a:rot lat="0" lon="0" rev="4800000"/>
+            </a:lightRig>
+          </a:scene3d>
+          <a:sp3d prstMaterial="matte">
+            <a:bevelT w="127000" h="63500"/>
+          </a:sp3d>
+        </p:spPr>
+        <p:style>
+          <a:lnRef idx="2">
+            <a:schemeClr val="accent1">
+              <a:shade val="50000"/>
+            </a:schemeClr>
+          </a:lnRef>
+          <a:fillRef idx="1">
+            <a:schemeClr val="accent1"/>
+          </a:fillRef>
+          <a:effectRef idx="0">
+            <a:schemeClr val="accent1"/>
+          </a:effectRef>
+          <a:fontRef idx="minor">
+            <a:schemeClr val="lt1"/>
+          </a:fontRef>
+        </p:style>
+        <p:txBody>
+          <a:bodyPr rtlCol="0" anchor="ctr"/>
+          <a:lstStyle/>
+          <a:p>
+            <a:pPr algn="ctr"/>
+            <a:endParaRPr lang="es-PE">
+              <a:solidFill>
+                <a:schemeClr val="tx1"/>
+              </a:solidFill>
+            </a:endParaRPr>
+          </a:p>
+        </p:txBody>
+      </p:sp>
+      <p:sp>
+        <p:nvSpPr>
+          <p:cNvPr id="15" name="Rectángulo 14">
+            <a:extLst>
+              <a:ext uri="{FF2B5EF4-FFF2-40B4-BE49-F238E27FC236}">
+                <a16:creationId xmlns:a16="http://schemas.microsoft.com/office/drawing/2014/main" id="{FDC74A5E-6FC7-E8B5-4DB3-FE8658723297}"/>
+              </a:ext>
+            </a:extLst>
+          </p:cNvPr>
+          <p:cNvSpPr/>
+          <p:nvPr/>
+        </p:nvSpPr>
+        <p:spPr>
+          <a:xfrm>
+            <a:off x="3373467" y="2467188"/>
+            <a:ext cx="3089307" cy="1015663"/>
+          </a:xfrm>
+          <a:prstGeom prst="rect">
+            <a:avLst/>
+          </a:prstGeom>
+          <a:noFill/>
+        </p:spPr>
+        <p:txBody>
+          <a:bodyPr wrap="none" lIns="91440" tIns="45720" rIns="91440" bIns="45720">
+            <a:spAutoFit/>
+          </a:bodyPr>
+          <a:lstStyle/>
+          <a:p>
+            <a:pPr algn="ctr"/>
+            <a:r>
+              <a:rPr lang="es-ES" sz="6000" b="1" cap="none" spc="0" dirty="0">
+                <a:ln w="0"/>
+                <a:solidFill>
+                  <a:schemeClr val="bg1"/>
+                </a:solidFill>
+                <a:effectLst>
+                  <a:outerShdw blurRad="38100" dist="19050" dir="2700000" algn="tl" rotWithShape="0">
+                    <a:schemeClr val="dk1">
+                      <a:alpha val="40000"/>
+                    </a:schemeClr>
+                  </a:outerShdw>
+                </a:effectLst>
+                <a:latin typeface="Impact" panose="020B0806030902050204" pitchFamily="34" charset="0"/>
+                <a:ea typeface="Verdana" panose="020B0604030504040204" pitchFamily="34" charset="0"/>
+              </a:rPr>
+              <a:t>2O SYNTH</a:t>
+            </a:r>
+          </a:p>
+        </p:txBody>
+      </p:sp>
     </p:spTree>
     <p:extLst>
       <p:ext uri="{BB962C8B-B14F-4D97-AF65-F5344CB8AC3E}">

</xml_diff>

<commit_message>
Se agrego el cuadro de navegacion
</commit_message>
<xml_diff>
--- a/Recursos.pptx
+++ b/Recursos.pptx
@@ -6,6 +6,9 @@
   </p:sldMasterIdLst>
   <p:sldIdLst>
     <p:sldId id="256" r:id="rId2"/>
+    <p:sldId id="257" r:id="rId3"/>
+    <p:sldId id="258" r:id="rId4"/>
+    <p:sldId id="259" r:id="rId5"/>
   </p:sldIdLst>
   <p:sldSz cx="12192000" cy="6858000"/>
   <p:notesSz cx="6858000" cy="9144000"/>
@@ -273,7 +276,7 @@
           <a:p>
             <a:fld id="{5C595ADE-D6CE-4376-A575-4C72F21EB491}" type="datetimeFigureOut">
               <a:rPr lang="es-PE" smtClean="0"/>
-              <a:t>3/10/2022</a:t>
+              <a:t>4/10/2022</a:t>
             </a:fld>
             <a:endParaRPr lang="es-PE"/>
           </a:p>
@@ -473,7 +476,7 @@
           <a:p>
             <a:fld id="{5C595ADE-D6CE-4376-A575-4C72F21EB491}" type="datetimeFigureOut">
               <a:rPr lang="es-PE" smtClean="0"/>
-              <a:t>3/10/2022</a:t>
+              <a:t>4/10/2022</a:t>
             </a:fld>
             <a:endParaRPr lang="es-PE"/>
           </a:p>
@@ -683,7 +686,7 @@
           <a:p>
             <a:fld id="{5C595ADE-D6CE-4376-A575-4C72F21EB491}" type="datetimeFigureOut">
               <a:rPr lang="es-PE" smtClean="0"/>
-              <a:t>3/10/2022</a:t>
+              <a:t>4/10/2022</a:t>
             </a:fld>
             <a:endParaRPr lang="es-PE"/>
           </a:p>
@@ -883,7 +886,7 @@
           <a:p>
             <a:fld id="{5C595ADE-D6CE-4376-A575-4C72F21EB491}" type="datetimeFigureOut">
               <a:rPr lang="es-PE" smtClean="0"/>
-              <a:t>3/10/2022</a:t>
+              <a:t>4/10/2022</a:t>
             </a:fld>
             <a:endParaRPr lang="es-PE"/>
           </a:p>
@@ -1159,7 +1162,7 @@
           <a:p>
             <a:fld id="{5C595ADE-D6CE-4376-A575-4C72F21EB491}" type="datetimeFigureOut">
               <a:rPr lang="es-PE" smtClean="0"/>
-              <a:t>3/10/2022</a:t>
+              <a:t>4/10/2022</a:t>
             </a:fld>
             <a:endParaRPr lang="es-PE"/>
           </a:p>
@@ -1427,7 +1430,7 @@
           <a:p>
             <a:fld id="{5C595ADE-D6CE-4376-A575-4C72F21EB491}" type="datetimeFigureOut">
               <a:rPr lang="es-PE" smtClean="0"/>
-              <a:t>3/10/2022</a:t>
+              <a:t>4/10/2022</a:t>
             </a:fld>
             <a:endParaRPr lang="es-PE"/>
           </a:p>
@@ -1842,7 +1845,7 @@
           <a:p>
             <a:fld id="{5C595ADE-D6CE-4376-A575-4C72F21EB491}" type="datetimeFigureOut">
               <a:rPr lang="es-PE" smtClean="0"/>
-              <a:t>3/10/2022</a:t>
+              <a:t>4/10/2022</a:t>
             </a:fld>
             <a:endParaRPr lang="es-PE"/>
           </a:p>
@@ -1984,7 +1987,7 @@
           <a:p>
             <a:fld id="{5C595ADE-D6CE-4376-A575-4C72F21EB491}" type="datetimeFigureOut">
               <a:rPr lang="es-PE" smtClean="0"/>
-              <a:t>3/10/2022</a:t>
+              <a:t>4/10/2022</a:t>
             </a:fld>
             <a:endParaRPr lang="es-PE"/>
           </a:p>
@@ -2097,7 +2100,7 @@
           <a:p>
             <a:fld id="{5C595ADE-D6CE-4376-A575-4C72F21EB491}" type="datetimeFigureOut">
               <a:rPr lang="es-PE" smtClean="0"/>
-              <a:t>3/10/2022</a:t>
+              <a:t>4/10/2022</a:t>
             </a:fld>
             <a:endParaRPr lang="es-PE"/>
           </a:p>
@@ -2410,7 +2413,7 @@
           <a:p>
             <a:fld id="{5C595ADE-D6CE-4376-A575-4C72F21EB491}" type="datetimeFigureOut">
               <a:rPr lang="es-PE" smtClean="0"/>
-              <a:t>3/10/2022</a:t>
+              <a:t>4/10/2022</a:t>
             </a:fld>
             <a:endParaRPr lang="es-PE"/>
           </a:p>
@@ -2699,7 +2702,7 @@
           <a:p>
             <a:fld id="{5C595ADE-D6CE-4376-A575-4C72F21EB491}" type="datetimeFigureOut">
               <a:rPr lang="es-PE" smtClean="0"/>
-              <a:t>3/10/2022</a:t>
+              <a:t>4/10/2022</a:t>
             </a:fld>
             <a:endParaRPr lang="es-PE"/>
           </a:p>
@@ -2942,7 +2945,7 @@
           <a:p>
             <a:fld id="{5C595ADE-D6CE-4376-A575-4C72F21EB491}" type="datetimeFigureOut">
               <a:rPr lang="es-PE" smtClean="0"/>
-              <a:t>3/10/2022</a:t>
+              <a:t>4/10/2022</a:t>
             </a:fld>
             <a:endParaRPr lang="es-PE"/>
           </a:p>
@@ -3886,6 +3889,3094 @@
 </p:sld>
 </file>
 
+<file path=ppt/slides/slide2.xml><?xml version="1.0" encoding="utf-8"?>
+<p:sld xmlns:a="http://schemas.openxmlformats.org/drawingml/2006/main" xmlns:r="http://schemas.openxmlformats.org/officeDocument/2006/relationships" xmlns:p="http://schemas.openxmlformats.org/presentationml/2006/main">
+  <p:cSld>
+    <p:spTree>
+      <p:nvGrpSpPr>
+        <p:cNvPr id="1" name=""/>
+        <p:cNvGrpSpPr/>
+        <p:nvPr/>
+      </p:nvGrpSpPr>
+      <p:grpSpPr>
+        <a:xfrm>
+          <a:off x="0" y="0"/>
+          <a:ext cx="0" cy="0"/>
+          <a:chOff x="0" y="0"/>
+          <a:chExt cx="0" cy="0"/>
+        </a:xfrm>
+      </p:grpSpPr>
+      <p:pic>
+        <p:nvPicPr>
+          <p:cNvPr id="4" name="Imagen 3">
+            <a:extLst>
+              <a:ext uri="{FF2B5EF4-FFF2-40B4-BE49-F238E27FC236}">
+                <a16:creationId xmlns:a16="http://schemas.microsoft.com/office/drawing/2014/main" id="{6563D9E4-8346-F56A-E191-F8F984B88BEF}"/>
+              </a:ext>
+            </a:extLst>
+          </p:cNvPr>
+          <p:cNvPicPr>
+            <a:picLocks noChangeAspect="1"/>
+          </p:cNvPicPr>
+          <p:nvPr/>
+        </p:nvPicPr>
+        <p:blipFill>
+          <a:blip r:embed="rId2"/>
+          <a:stretch>
+            <a:fillRect/>
+          </a:stretch>
+        </p:blipFill>
+        <p:spPr>
+          <a:xfrm>
+            <a:off x="278266" y="993094"/>
+            <a:ext cx="2143125" cy="2143125"/>
+          </a:xfrm>
+          <a:prstGeom prst="rect">
+            <a:avLst/>
+          </a:prstGeom>
+        </p:spPr>
+      </p:pic>
+      <p:sp>
+        <p:nvSpPr>
+          <p:cNvPr id="5" name="Rectángulo: esquinas redondeadas 4">
+            <a:extLst>
+              <a:ext uri="{FF2B5EF4-FFF2-40B4-BE49-F238E27FC236}">
+                <a16:creationId xmlns:a16="http://schemas.microsoft.com/office/drawing/2014/main" id="{843A5046-FD7A-6A45-506D-B1DE57E3C775}"/>
+              </a:ext>
+            </a:extLst>
+          </p:cNvPr>
+          <p:cNvSpPr/>
+          <p:nvPr/>
+        </p:nvSpPr>
+        <p:spPr>
+          <a:xfrm>
+            <a:off x="3454401" y="2206171"/>
+            <a:ext cx="2249714" cy="1943798"/>
+          </a:xfrm>
+          <a:prstGeom prst="roundRect">
+            <a:avLst/>
+          </a:prstGeom>
+          <a:noFill/>
+          <a:ln w="63500">
+            <a:solidFill>
+              <a:schemeClr val="tx1"/>
+            </a:solidFill>
+          </a:ln>
+        </p:spPr>
+        <p:style>
+          <a:lnRef idx="2">
+            <a:schemeClr val="accent1">
+              <a:shade val="50000"/>
+            </a:schemeClr>
+          </a:lnRef>
+          <a:fillRef idx="1">
+            <a:schemeClr val="accent1"/>
+          </a:fillRef>
+          <a:effectRef idx="0">
+            <a:schemeClr val="accent1"/>
+          </a:effectRef>
+          <a:fontRef idx="minor">
+            <a:schemeClr val="lt1"/>
+          </a:fontRef>
+        </p:style>
+        <p:txBody>
+          <a:bodyPr rtlCol="0" anchor="ctr"/>
+          <a:lstStyle/>
+          <a:p>
+            <a:pPr algn="ctr"/>
+            <a:endParaRPr lang="es-PE"/>
+          </a:p>
+        </p:txBody>
+      </p:sp>
+      <p:cxnSp>
+        <p:nvCxnSpPr>
+          <p:cNvPr id="8" name="Conector recto 7">
+            <a:extLst>
+              <a:ext uri="{FF2B5EF4-FFF2-40B4-BE49-F238E27FC236}">
+                <a16:creationId xmlns:a16="http://schemas.microsoft.com/office/drawing/2014/main" id="{264F7B23-DC9F-ABF9-8D79-7CE415BF104B}"/>
+              </a:ext>
+            </a:extLst>
+          </p:cNvPr>
+          <p:cNvCxnSpPr/>
+          <p:nvPr/>
+        </p:nvCxnSpPr>
+        <p:spPr>
+          <a:xfrm>
+            <a:off x="3454401" y="3118633"/>
+            <a:ext cx="2249714" cy="0"/>
+          </a:xfrm>
+          <a:prstGeom prst="line">
+            <a:avLst/>
+          </a:prstGeom>
+          <a:ln w="41275"/>
+        </p:spPr>
+        <p:style>
+          <a:lnRef idx="1">
+            <a:schemeClr val="dk1"/>
+          </a:lnRef>
+          <a:fillRef idx="0">
+            <a:schemeClr val="dk1"/>
+          </a:fillRef>
+          <a:effectRef idx="0">
+            <a:schemeClr val="dk1"/>
+          </a:effectRef>
+          <a:fontRef idx="minor">
+            <a:schemeClr val="tx1"/>
+          </a:fontRef>
+        </p:style>
+      </p:cxnSp>
+      <p:sp>
+        <p:nvSpPr>
+          <p:cNvPr id="14" name="Rectángulo: esquinas redondeadas 13">
+            <a:extLst>
+              <a:ext uri="{FF2B5EF4-FFF2-40B4-BE49-F238E27FC236}">
+                <a16:creationId xmlns:a16="http://schemas.microsoft.com/office/drawing/2014/main" id="{9A779CBD-D186-0E6E-F6C2-F5445972156D}"/>
+              </a:ext>
+            </a:extLst>
+          </p:cNvPr>
+          <p:cNvSpPr/>
+          <p:nvPr/>
+        </p:nvSpPr>
+        <p:spPr>
+          <a:xfrm>
+            <a:off x="4191389" y="2511580"/>
+            <a:ext cx="755007" cy="330199"/>
+          </a:xfrm>
+          <a:prstGeom prst="roundRect">
+            <a:avLst/>
+          </a:prstGeom>
+          <a:noFill/>
+          <a:ln w="47625">
+            <a:solidFill>
+              <a:schemeClr val="tx1"/>
+            </a:solidFill>
+          </a:ln>
+        </p:spPr>
+        <p:style>
+          <a:lnRef idx="2">
+            <a:schemeClr val="accent1">
+              <a:shade val="50000"/>
+            </a:schemeClr>
+          </a:lnRef>
+          <a:fillRef idx="1">
+            <a:schemeClr val="accent1"/>
+          </a:fillRef>
+          <a:effectRef idx="0">
+            <a:schemeClr val="accent1"/>
+          </a:effectRef>
+          <a:fontRef idx="minor">
+            <a:schemeClr val="lt1"/>
+          </a:fontRef>
+        </p:style>
+        <p:txBody>
+          <a:bodyPr rtlCol="0" anchor="ctr"/>
+          <a:lstStyle/>
+          <a:p>
+            <a:pPr algn="ctr"/>
+            <a:endParaRPr lang="es-PE"/>
+          </a:p>
+        </p:txBody>
+      </p:sp>
+      <p:sp>
+        <p:nvSpPr>
+          <p:cNvPr id="15" name="Rectángulo 14">
+            <a:extLst>
+              <a:ext uri="{FF2B5EF4-FFF2-40B4-BE49-F238E27FC236}">
+                <a16:creationId xmlns:a16="http://schemas.microsoft.com/office/drawing/2014/main" id="{8F6DD7F9-6C91-F326-5ECD-4DA24EAE910B}"/>
+              </a:ext>
+            </a:extLst>
+          </p:cNvPr>
+          <p:cNvSpPr/>
+          <p:nvPr/>
+        </p:nvSpPr>
+        <p:spPr>
+          <a:xfrm>
+            <a:off x="3717386" y="2417120"/>
+            <a:ext cx="45719" cy="456703"/>
+          </a:xfrm>
+          <a:prstGeom prst="rect">
+            <a:avLst/>
+          </a:prstGeom>
+        </p:spPr>
+        <p:style>
+          <a:lnRef idx="2">
+            <a:schemeClr val="dk1">
+              <a:shade val="50000"/>
+            </a:schemeClr>
+          </a:lnRef>
+          <a:fillRef idx="1">
+            <a:schemeClr val="dk1"/>
+          </a:fillRef>
+          <a:effectRef idx="0">
+            <a:schemeClr val="dk1"/>
+          </a:effectRef>
+          <a:fontRef idx="minor">
+            <a:schemeClr val="lt1"/>
+          </a:fontRef>
+        </p:style>
+        <p:txBody>
+          <a:bodyPr rtlCol="0" anchor="ctr"/>
+          <a:lstStyle/>
+          <a:p>
+            <a:pPr algn="ctr"/>
+            <a:endParaRPr lang="es-PE"/>
+          </a:p>
+        </p:txBody>
+      </p:sp>
+      <p:sp>
+        <p:nvSpPr>
+          <p:cNvPr id="16" name="Rectángulo 15">
+            <a:extLst>
+              <a:ext uri="{FF2B5EF4-FFF2-40B4-BE49-F238E27FC236}">
+                <a16:creationId xmlns:a16="http://schemas.microsoft.com/office/drawing/2014/main" id="{832435AC-3A4E-9A96-9263-D407F874F642}"/>
+              </a:ext>
+            </a:extLst>
+          </p:cNvPr>
+          <p:cNvSpPr/>
+          <p:nvPr/>
+        </p:nvSpPr>
+        <p:spPr>
+          <a:xfrm>
+            <a:off x="3954387" y="2417120"/>
+            <a:ext cx="45719" cy="456703"/>
+          </a:xfrm>
+          <a:prstGeom prst="rect">
+            <a:avLst/>
+          </a:prstGeom>
+        </p:spPr>
+        <p:style>
+          <a:lnRef idx="2">
+            <a:schemeClr val="dk1">
+              <a:shade val="50000"/>
+            </a:schemeClr>
+          </a:lnRef>
+          <a:fillRef idx="1">
+            <a:schemeClr val="dk1"/>
+          </a:fillRef>
+          <a:effectRef idx="0">
+            <a:schemeClr val="dk1"/>
+          </a:effectRef>
+          <a:fontRef idx="minor">
+            <a:schemeClr val="lt1"/>
+          </a:fontRef>
+        </p:style>
+        <p:txBody>
+          <a:bodyPr rtlCol="0" anchor="ctr"/>
+          <a:lstStyle/>
+          <a:p>
+            <a:pPr algn="ctr"/>
+            <a:endParaRPr lang="es-PE"/>
+          </a:p>
+        </p:txBody>
+      </p:sp>
+      <p:sp>
+        <p:nvSpPr>
+          <p:cNvPr id="17" name="Rectángulo: esquinas redondeadas 16">
+            <a:extLst>
+              <a:ext uri="{FF2B5EF4-FFF2-40B4-BE49-F238E27FC236}">
+                <a16:creationId xmlns:a16="http://schemas.microsoft.com/office/drawing/2014/main" id="{067CA3D8-1103-FCFB-7405-6170ED3BB634}"/>
+              </a:ext>
+            </a:extLst>
+          </p:cNvPr>
+          <p:cNvSpPr/>
+          <p:nvPr/>
+        </p:nvSpPr>
+        <p:spPr>
+          <a:xfrm>
+            <a:off x="3671667" y="2604350"/>
+            <a:ext cx="137161" cy="79216"/>
+          </a:xfrm>
+          <a:prstGeom prst="roundRect">
+            <a:avLst/>
+          </a:prstGeom>
+        </p:spPr>
+        <p:style>
+          <a:lnRef idx="2">
+            <a:schemeClr val="dk1">
+              <a:shade val="50000"/>
+            </a:schemeClr>
+          </a:lnRef>
+          <a:fillRef idx="1">
+            <a:schemeClr val="dk1"/>
+          </a:fillRef>
+          <a:effectRef idx="0">
+            <a:schemeClr val="dk1"/>
+          </a:effectRef>
+          <a:fontRef idx="minor">
+            <a:schemeClr val="lt1"/>
+          </a:fontRef>
+        </p:style>
+        <p:txBody>
+          <a:bodyPr rtlCol="0" anchor="ctr"/>
+          <a:lstStyle/>
+          <a:p>
+            <a:pPr algn="ctr"/>
+            <a:endParaRPr lang="es-PE"/>
+          </a:p>
+        </p:txBody>
+      </p:sp>
+      <p:sp>
+        <p:nvSpPr>
+          <p:cNvPr id="18" name="Rectángulo: esquinas redondeadas 17">
+            <a:extLst>
+              <a:ext uri="{FF2B5EF4-FFF2-40B4-BE49-F238E27FC236}">
+                <a16:creationId xmlns:a16="http://schemas.microsoft.com/office/drawing/2014/main" id="{3887696B-068A-39E5-074F-7095313FA87D}"/>
+              </a:ext>
+            </a:extLst>
+          </p:cNvPr>
+          <p:cNvSpPr/>
+          <p:nvPr/>
+        </p:nvSpPr>
+        <p:spPr>
+          <a:xfrm>
+            <a:off x="3908665" y="2604350"/>
+            <a:ext cx="137161" cy="79216"/>
+          </a:xfrm>
+          <a:prstGeom prst="roundRect">
+            <a:avLst/>
+          </a:prstGeom>
+        </p:spPr>
+        <p:style>
+          <a:lnRef idx="2">
+            <a:schemeClr val="dk1">
+              <a:shade val="50000"/>
+            </a:schemeClr>
+          </a:lnRef>
+          <a:fillRef idx="1">
+            <a:schemeClr val="dk1"/>
+          </a:fillRef>
+          <a:effectRef idx="0">
+            <a:schemeClr val="dk1"/>
+          </a:effectRef>
+          <a:fontRef idx="minor">
+            <a:schemeClr val="lt1"/>
+          </a:fontRef>
+        </p:style>
+        <p:txBody>
+          <a:bodyPr rtlCol="0" anchor="ctr"/>
+          <a:lstStyle/>
+          <a:p>
+            <a:pPr algn="ctr"/>
+            <a:endParaRPr lang="es-PE"/>
+          </a:p>
+        </p:txBody>
+      </p:sp>
+      <p:sp>
+        <p:nvSpPr>
+          <p:cNvPr id="19" name="Rectángulo 18">
+            <a:extLst>
+              <a:ext uri="{FF2B5EF4-FFF2-40B4-BE49-F238E27FC236}">
+                <a16:creationId xmlns:a16="http://schemas.microsoft.com/office/drawing/2014/main" id="{DFA6011D-A3C4-B33E-570C-6F5AEFB68A59}"/>
+              </a:ext>
+            </a:extLst>
+          </p:cNvPr>
+          <p:cNvSpPr/>
+          <p:nvPr/>
+        </p:nvSpPr>
+        <p:spPr>
+          <a:xfrm>
+            <a:off x="5139823" y="2417120"/>
+            <a:ext cx="45719" cy="456703"/>
+          </a:xfrm>
+          <a:prstGeom prst="rect">
+            <a:avLst/>
+          </a:prstGeom>
+        </p:spPr>
+        <p:style>
+          <a:lnRef idx="2">
+            <a:schemeClr val="dk1">
+              <a:shade val="50000"/>
+            </a:schemeClr>
+          </a:lnRef>
+          <a:fillRef idx="1">
+            <a:schemeClr val="dk1"/>
+          </a:fillRef>
+          <a:effectRef idx="0">
+            <a:schemeClr val="dk1"/>
+          </a:effectRef>
+          <a:fontRef idx="minor">
+            <a:schemeClr val="lt1"/>
+          </a:fontRef>
+        </p:style>
+        <p:txBody>
+          <a:bodyPr rtlCol="0" anchor="ctr"/>
+          <a:lstStyle/>
+          <a:p>
+            <a:pPr algn="ctr"/>
+            <a:endParaRPr lang="es-PE"/>
+          </a:p>
+        </p:txBody>
+      </p:sp>
+      <p:sp>
+        <p:nvSpPr>
+          <p:cNvPr id="20" name="Rectángulo 19">
+            <a:extLst>
+              <a:ext uri="{FF2B5EF4-FFF2-40B4-BE49-F238E27FC236}">
+                <a16:creationId xmlns:a16="http://schemas.microsoft.com/office/drawing/2014/main" id="{E564B0BF-CD55-E657-FF7E-11263304FC8C}"/>
+              </a:ext>
+            </a:extLst>
+          </p:cNvPr>
+          <p:cNvSpPr/>
+          <p:nvPr/>
+        </p:nvSpPr>
+        <p:spPr>
+          <a:xfrm>
+            <a:off x="5376824" y="2417120"/>
+            <a:ext cx="45719" cy="456703"/>
+          </a:xfrm>
+          <a:prstGeom prst="rect">
+            <a:avLst/>
+          </a:prstGeom>
+        </p:spPr>
+        <p:style>
+          <a:lnRef idx="2">
+            <a:schemeClr val="dk1">
+              <a:shade val="50000"/>
+            </a:schemeClr>
+          </a:lnRef>
+          <a:fillRef idx="1">
+            <a:schemeClr val="dk1"/>
+          </a:fillRef>
+          <a:effectRef idx="0">
+            <a:schemeClr val="dk1"/>
+          </a:effectRef>
+          <a:fontRef idx="minor">
+            <a:schemeClr val="lt1"/>
+          </a:fontRef>
+        </p:style>
+        <p:txBody>
+          <a:bodyPr rtlCol="0" anchor="ctr"/>
+          <a:lstStyle/>
+          <a:p>
+            <a:pPr algn="ctr"/>
+            <a:endParaRPr lang="es-PE"/>
+          </a:p>
+        </p:txBody>
+      </p:sp>
+      <p:sp>
+        <p:nvSpPr>
+          <p:cNvPr id="21" name="Rectángulo: esquinas redondeadas 20">
+            <a:extLst>
+              <a:ext uri="{FF2B5EF4-FFF2-40B4-BE49-F238E27FC236}">
+                <a16:creationId xmlns:a16="http://schemas.microsoft.com/office/drawing/2014/main" id="{E8218949-3362-041C-2E44-236F870E8AC4}"/>
+              </a:ext>
+            </a:extLst>
+          </p:cNvPr>
+          <p:cNvSpPr/>
+          <p:nvPr/>
+        </p:nvSpPr>
+        <p:spPr>
+          <a:xfrm>
+            <a:off x="5094104" y="2604350"/>
+            <a:ext cx="137161" cy="79216"/>
+          </a:xfrm>
+          <a:prstGeom prst="roundRect">
+            <a:avLst/>
+          </a:prstGeom>
+        </p:spPr>
+        <p:style>
+          <a:lnRef idx="2">
+            <a:schemeClr val="dk1">
+              <a:shade val="50000"/>
+            </a:schemeClr>
+          </a:lnRef>
+          <a:fillRef idx="1">
+            <a:schemeClr val="dk1"/>
+          </a:fillRef>
+          <a:effectRef idx="0">
+            <a:schemeClr val="dk1"/>
+          </a:effectRef>
+          <a:fontRef idx="minor">
+            <a:schemeClr val="lt1"/>
+          </a:fontRef>
+        </p:style>
+        <p:txBody>
+          <a:bodyPr rtlCol="0" anchor="ctr"/>
+          <a:lstStyle/>
+          <a:p>
+            <a:pPr algn="ctr"/>
+            <a:endParaRPr lang="es-PE"/>
+          </a:p>
+        </p:txBody>
+      </p:sp>
+      <p:sp>
+        <p:nvSpPr>
+          <p:cNvPr id="22" name="Rectángulo: esquinas redondeadas 21">
+            <a:extLst>
+              <a:ext uri="{FF2B5EF4-FFF2-40B4-BE49-F238E27FC236}">
+                <a16:creationId xmlns:a16="http://schemas.microsoft.com/office/drawing/2014/main" id="{8242D812-E02B-16D0-4BD3-7A8A7CA578C8}"/>
+              </a:ext>
+            </a:extLst>
+          </p:cNvPr>
+          <p:cNvSpPr/>
+          <p:nvPr/>
+        </p:nvSpPr>
+        <p:spPr>
+          <a:xfrm>
+            <a:off x="5331102" y="2604350"/>
+            <a:ext cx="137161" cy="79216"/>
+          </a:xfrm>
+          <a:prstGeom prst="roundRect">
+            <a:avLst/>
+          </a:prstGeom>
+        </p:spPr>
+        <p:style>
+          <a:lnRef idx="2">
+            <a:schemeClr val="dk1">
+              <a:shade val="50000"/>
+            </a:schemeClr>
+          </a:lnRef>
+          <a:fillRef idx="1">
+            <a:schemeClr val="dk1"/>
+          </a:fillRef>
+          <a:effectRef idx="0">
+            <a:schemeClr val="dk1"/>
+          </a:effectRef>
+          <a:fontRef idx="minor">
+            <a:schemeClr val="lt1"/>
+          </a:fontRef>
+        </p:style>
+        <p:txBody>
+          <a:bodyPr rtlCol="0" anchor="ctr"/>
+          <a:lstStyle/>
+          <a:p>
+            <a:pPr algn="ctr"/>
+            <a:endParaRPr lang="es-PE"/>
+          </a:p>
+        </p:txBody>
+      </p:sp>
+      <p:sp>
+        <p:nvSpPr>
+          <p:cNvPr id="23" name="Rectángulo: esquinas redondeadas 22">
+            <a:extLst>
+              <a:ext uri="{FF2B5EF4-FFF2-40B4-BE49-F238E27FC236}">
+                <a16:creationId xmlns:a16="http://schemas.microsoft.com/office/drawing/2014/main" id="{6A1C959A-804F-2836-BA0F-623E811DE2D4}"/>
+              </a:ext>
+            </a:extLst>
+          </p:cNvPr>
+          <p:cNvSpPr/>
+          <p:nvPr/>
+        </p:nvSpPr>
+        <p:spPr>
+          <a:xfrm>
+            <a:off x="3763104" y="3123518"/>
+            <a:ext cx="186595" cy="572181"/>
+          </a:xfrm>
+          <a:prstGeom prst="roundRect">
+            <a:avLst/>
+          </a:prstGeom>
+        </p:spPr>
+        <p:style>
+          <a:lnRef idx="2">
+            <a:schemeClr val="dk1">
+              <a:shade val="50000"/>
+            </a:schemeClr>
+          </a:lnRef>
+          <a:fillRef idx="1">
+            <a:schemeClr val="dk1"/>
+          </a:fillRef>
+          <a:effectRef idx="0">
+            <a:schemeClr val="dk1"/>
+          </a:effectRef>
+          <a:fontRef idx="minor">
+            <a:schemeClr val="lt1"/>
+          </a:fontRef>
+        </p:style>
+        <p:txBody>
+          <a:bodyPr rtlCol="0" anchor="ctr"/>
+          <a:lstStyle/>
+          <a:p>
+            <a:pPr algn="ctr"/>
+            <a:endParaRPr lang="es-PE"/>
+          </a:p>
+        </p:txBody>
+      </p:sp>
+      <p:sp>
+        <p:nvSpPr>
+          <p:cNvPr id="24" name="Rectángulo: esquinas redondeadas 23">
+            <a:extLst>
+              <a:ext uri="{FF2B5EF4-FFF2-40B4-BE49-F238E27FC236}">
+                <a16:creationId xmlns:a16="http://schemas.microsoft.com/office/drawing/2014/main" id="{40D7789C-E4BE-384B-8EE4-2945A4C52B5E}"/>
+              </a:ext>
+            </a:extLst>
+          </p:cNvPr>
+          <p:cNvSpPr/>
+          <p:nvPr/>
+        </p:nvSpPr>
+        <p:spPr>
+          <a:xfrm>
+            <a:off x="4080991" y="3123518"/>
+            <a:ext cx="186595" cy="572181"/>
+          </a:xfrm>
+          <a:prstGeom prst="roundRect">
+            <a:avLst/>
+          </a:prstGeom>
+        </p:spPr>
+        <p:style>
+          <a:lnRef idx="2">
+            <a:schemeClr val="dk1">
+              <a:shade val="50000"/>
+            </a:schemeClr>
+          </a:lnRef>
+          <a:fillRef idx="1">
+            <a:schemeClr val="dk1"/>
+          </a:fillRef>
+          <a:effectRef idx="0">
+            <a:schemeClr val="dk1"/>
+          </a:effectRef>
+          <a:fontRef idx="minor">
+            <a:schemeClr val="lt1"/>
+          </a:fontRef>
+        </p:style>
+        <p:txBody>
+          <a:bodyPr rtlCol="0" anchor="ctr"/>
+          <a:lstStyle/>
+          <a:p>
+            <a:pPr algn="ctr"/>
+            <a:endParaRPr lang="es-PE"/>
+          </a:p>
+        </p:txBody>
+      </p:sp>
+      <p:sp>
+        <p:nvSpPr>
+          <p:cNvPr id="25" name="Rectángulo: esquinas redondeadas 24">
+            <a:extLst>
+              <a:ext uri="{FF2B5EF4-FFF2-40B4-BE49-F238E27FC236}">
+                <a16:creationId xmlns:a16="http://schemas.microsoft.com/office/drawing/2014/main" id="{B7B0D87E-4256-C0B5-F103-4D9E4643453E}"/>
+              </a:ext>
+            </a:extLst>
+          </p:cNvPr>
+          <p:cNvSpPr/>
+          <p:nvPr/>
+        </p:nvSpPr>
+        <p:spPr>
+          <a:xfrm>
+            <a:off x="4628509" y="3123518"/>
+            <a:ext cx="186595" cy="572181"/>
+          </a:xfrm>
+          <a:prstGeom prst="roundRect">
+            <a:avLst/>
+          </a:prstGeom>
+        </p:spPr>
+        <p:style>
+          <a:lnRef idx="2">
+            <a:schemeClr val="dk1">
+              <a:shade val="50000"/>
+            </a:schemeClr>
+          </a:lnRef>
+          <a:fillRef idx="1">
+            <a:schemeClr val="dk1"/>
+          </a:fillRef>
+          <a:effectRef idx="0">
+            <a:schemeClr val="dk1"/>
+          </a:effectRef>
+          <a:fontRef idx="minor">
+            <a:schemeClr val="lt1"/>
+          </a:fontRef>
+        </p:style>
+        <p:txBody>
+          <a:bodyPr rtlCol="0" anchor="ctr"/>
+          <a:lstStyle/>
+          <a:p>
+            <a:pPr algn="ctr"/>
+            <a:endParaRPr lang="es-PE"/>
+          </a:p>
+        </p:txBody>
+      </p:sp>
+      <p:sp>
+        <p:nvSpPr>
+          <p:cNvPr id="26" name="Rectángulo: esquinas redondeadas 25">
+            <a:extLst>
+              <a:ext uri="{FF2B5EF4-FFF2-40B4-BE49-F238E27FC236}">
+                <a16:creationId xmlns:a16="http://schemas.microsoft.com/office/drawing/2014/main" id="{9EF68ED4-9741-2997-65AD-816F81A84286}"/>
+              </a:ext>
+            </a:extLst>
+          </p:cNvPr>
+          <p:cNvSpPr/>
+          <p:nvPr/>
+        </p:nvSpPr>
+        <p:spPr>
+          <a:xfrm>
+            <a:off x="4946396" y="3123518"/>
+            <a:ext cx="186595" cy="572181"/>
+          </a:xfrm>
+          <a:prstGeom prst="roundRect">
+            <a:avLst/>
+          </a:prstGeom>
+        </p:spPr>
+        <p:style>
+          <a:lnRef idx="2">
+            <a:schemeClr val="dk1">
+              <a:shade val="50000"/>
+            </a:schemeClr>
+          </a:lnRef>
+          <a:fillRef idx="1">
+            <a:schemeClr val="dk1"/>
+          </a:fillRef>
+          <a:effectRef idx="0">
+            <a:schemeClr val="dk1"/>
+          </a:effectRef>
+          <a:fontRef idx="minor">
+            <a:schemeClr val="lt1"/>
+          </a:fontRef>
+        </p:style>
+        <p:txBody>
+          <a:bodyPr rtlCol="0" anchor="ctr"/>
+          <a:lstStyle/>
+          <a:p>
+            <a:pPr algn="ctr"/>
+            <a:endParaRPr lang="es-PE"/>
+          </a:p>
+        </p:txBody>
+      </p:sp>
+      <p:sp>
+        <p:nvSpPr>
+          <p:cNvPr id="29" name="Rectángulo: esquinas redondeadas 28">
+            <a:extLst>
+              <a:ext uri="{FF2B5EF4-FFF2-40B4-BE49-F238E27FC236}">
+                <a16:creationId xmlns:a16="http://schemas.microsoft.com/office/drawing/2014/main" id="{63B70049-3933-F87F-7095-C2B3DC67F5BE}"/>
+              </a:ext>
+            </a:extLst>
+          </p:cNvPr>
+          <p:cNvSpPr/>
+          <p:nvPr/>
+        </p:nvSpPr>
+        <p:spPr>
+          <a:xfrm>
+            <a:off x="5264283" y="3123518"/>
+            <a:ext cx="186595" cy="572181"/>
+          </a:xfrm>
+          <a:prstGeom prst="roundRect">
+            <a:avLst/>
+          </a:prstGeom>
+        </p:spPr>
+        <p:style>
+          <a:lnRef idx="2">
+            <a:schemeClr val="dk1">
+              <a:shade val="50000"/>
+            </a:schemeClr>
+          </a:lnRef>
+          <a:fillRef idx="1">
+            <a:schemeClr val="dk1"/>
+          </a:fillRef>
+          <a:effectRef idx="0">
+            <a:schemeClr val="dk1"/>
+          </a:effectRef>
+          <a:fontRef idx="minor">
+            <a:schemeClr val="lt1"/>
+          </a:fontRef>
+        </p:style>
+        <p:txBody>
+          <a:bodyPr rtlCol="0" anchor="ctr"/>
+          <a:lstStyle/>
+          <a:p>
+            <a:pPr algn="ctr"/>
+            <a:endParaRPr lang="es-PE"/>
+          </a:p>
+        </p:txBody>
+      </p:sp>
+      <p:cxnSp>
+        <p:nvCxnSpPr>
+          <p:cNvPr id="35" name="Conector recto 34">
+            <a:extLst>
+              <a:ext uri="{FF2B5EF4-FFF2-40B4-BE49-F238E27FC236}">
+                <a16:creationId xmlns:a16="http://schemas.microsoft.com/office/drawing/2014/main" id="{F010E5C4-57AF-1599-AD28-A35BE25FD277}"/>
+              </a:ext>
+            </a:extLst>
+          </p:cNvPr>
+          <p:cNvCxnSpPr/>
+          <p:nvPr/>
+        </p:nvCxnSpPr>
+        <p:spPr>
+          <a:xfrm>
+            <a:off x="3857815" y="3695699"/>
+            <a:ext cx="0" cy="448840"/>
+          </a:xfrm>
+          <a:prstGeom prst="line">
+            <a:avLst/>
+          </a:prstGeom>
+          <a:ln w="28575"/>
+        </p:spPr>
+        <p:style>
+          <a:lnRef idx="1">
+            <a:schemeClr val="dk1"/>
+          </a:lnRef>
+          <a:fillRef idx="0">
+            <a:schemeClr val="dk1"/>
+          </a:fillRef>
+          <a:effectRef idx="0">
+            <a:schemeClr val="dk1"/>
+          </a:effectRef>
+          <a:fontRef idx="minor">
+            <a:schemeClr val="tx1"/>
+          </a:fontRef>
+        </p:style>
+      </p:cxnSp>
+      <p:cxnSp>
+        <p:nvCxnSpPr>
+          <p:cNvPr id="36" name="Conector recto 35">
+            <a:extLst>
+              <a:ext uri="{FF2B5EF4-FFF2-40B4-BE49-F238E27FC236}">
+                <a16:creationId xmlns:a16="http://schemas.microsoft.com/office/drawing/2014/main" id="{C18E7361-F52A-036C-6C87-D85B362555C7}"/>
+              </a:ext>
+            </a:extLst>
+          </p:cNvPr>
+          <p:cNvCxnSpPr/>
+          <p:nvPr/>
+        </p:nvCxnSpPr>
+        <p:spPr>
+          <a:xfrm>
+            <a:off x="4172339" y="3695699"/>
+            <a:ext cx="0" cy="448840"/>
+          </a:xfrm>
+          <a:prstGeom prst="line">
+            <a:avLst/>
+          </a:prstGeom>
+          <a:ln w="28575"/>
+        </p:spPr>
+        <p:style>
+          <a:lnRef idx="1">
+            <a:schemeClr val="dk1"/>
+          </a:lnRef>
+          <a:fillRef idx="0">
+            <a:schemeClr val="dk1"/>
+          </a:fillRef>
+          <a:effectRef idx="0">
+            <a:schemeClr val="dk1"/>
+          </a:effectRef>
+          <a:fontRef idx="minor">
+            <a:schemeClr val="tx1"/>
+          </a:fontRef>
+        </p:style>
+      </p:cxnSp>
+      <p:cxnSp>
+        <p:nvCxnSpPr>
+          <p:cNvPr id="37" name="Conector recto 36">
+            <a:extLst>
+              <a:ext uri="{FF2B5EF4-FFF2-40B4-BE49-F238E27FC236}">
+                <a16:creationId xmlns:a16="http://schemas.microsoft.com/office/drawing/2014/main" id="{3AB5F31C-076B-269D-8903-D6D26E933533}"/>
+              </a:ext>
+            </a:extLst>
+          </p:cNvPr>
+          <p:cNvCxnSpPr/>
+          <p:nvPr/>
+        </p:nvCxnSpPr>
+        <p:spPr>
+          <a:xfrm>
+            <a:off x="4719854" y="3695699"/>
+            <a:ext cx="0" cy="448840"/>
+          </a:xfrm>
+          <a:prstGeom prst="line">
+            <a:avLst/>
+          </a:prstGeom>
+          <a:ln w="28575"/>
+        </p:spPr>
+        <p:style>
+          <a:lnRef idx="1">
+            <a:schemeClr val="dk1"/>
+          </a:lnRef>
+          <a:fillRef idx="0">
+            <a:schemeClr val="dk1"/>
+          </a:fillRef>
+          <a:effectRef idx="0">
+            <a:schemeClr val="dk1"/>
+          </a:effectRef>
+          <a:fontRef idx="minor">
+            <a:schemeClr val="tx1"/>
+          </a:fontRef>
+        </p:style>
+      </p:cxnSp>
+      <p:cxnSp>
+        <p:nvCxnSpPr>
+          <p:cNvPr id="38" name="Conector recto 37">
+            <a:extLst>
+              <a:ext uri="{FF2B5EF4-FFF2-40B4-BE49-F238E27FC236}">
+                <a16:creationId xmlns:a16="http://schemas.microsoft.com/office/drawing/2014/main" id="{51E93D7B-5E37-FAD2-C306-1ED919DC97BE}"/>
+              </a:ext>
+            </a:extLst>
+          </p:cNvPr>
+          <p:cNvCxnSpPr/>
+          <p:nvPr/>
+        </p:nvCxnSpPr>
+        <p:spPr>
+          <a:xfrm>
+            <a:off x="5034378" y="3695699"/>
+            <a:ext cx="0" cy="448840"/>
+          </a:xfrm>
+          <a:prstGeom prst="line">
+            <a:avLst/>
+          </a:prstGeom>
+          <a:ln w="28575"/>
+        </p:spPr>
+        <p:style>
+          <a:lnRef idx="1">
+            <a:schemeClr val="dk1"/>
+          </a:lnRef>
+          <a:fillRef idx="0">
+            <a:schemeClr val="dk1"/>
+          </a:fillRef>
+          <a:effectRef idx="0">
+            <a:schemeClr val="dk1"/>
+          </a:effectRef>
+          <a:fontRef idx="minor">
+            <a:schemeClr val="tx1"/>
+          </a:fontRef>
+        </p:style>
+      </p:cxnSp>
+      <p:cxnSp>
+        <p:nvCxnSpPr>
+          <p:cNvPr id="39" name="Conector recto 38">
+            <a:extLst>
+              <a:ext uri="{FF2B5EF4-FFF2-40B4-BE49-F238E27FC236}">
+                <a16:creationId xmlns:a16="http://schemas.microsoft.com/office/drawing/2014/main" id="{47900D69-6CB2-C86A-D1F3-3C5D5FF85D4F}"/>
+              </a:ext>
+            </a:extLst>
+          </p:cNvPr>
+          <p:cNvCxnSpPr/>
+          <p:nvPr/>
+        </p:nvCxnSpPr>
+        <p:spPr>
+          <a:xfrm>
+            <a:off x="5357774" y="3695699"/>
+            <a:ext cx="0" cy="448840"/>
+          </a:xfrm>
+          <a:prstGeom prst="line">
+            <a:avLst/>
+          </a:prstGeom>
+          <a:ln w="28575"/>
+        </p:spPr>
+        <p:style>
+          <a:lnRef idx="1">
+            <a:schemeClr val="dk1"/>
+          </a:lnRef>
+          <a:fillRef idx="0">
+            <a:schemeClr val="dk1"/>
+          </a:fillRef>
+          <a:effectRef idx="0">
+            <a:schemeClr val="dk1"/>
+          </a:effectRef>
+          <a:fontRef idx="minor">
+            <a:schemeClr val="tx1"/>
+          </a:fontRef>
+        </p:style>
+      </p:cxnSp>
+      <p:cxnSp>
+        <p:nvCxnSpPr>
+          <p:cNvPr id="40" name="Conector recto 39">
+            <a:extLst>
+              <a:ext uri="{FF2B5EF4-FFF2-40B4-BE49-F238E27FC236}">
+                <a16:creationId xmlns:a16="http://schemas.microsoft.com/office/drawing/2014/main" id="{667C610A-C147-7190-CA90-CE5CCB7A2B46}"/>
+              </a:ext>
+            </a:extLst>
+          </p:cNvPr>
+          <p:cNvCxnSpPr>
+            <a:cxnSpLocks/>
+          </p:cNvCxnSpPr>
+          <p:nvPr/>
+        </p:nvCxnSpPr>
+        <p:spPr>
+          <a:xfrm>
+            <a:off x="4443629" y="3126694"/>
+            <a:ext cx="0" cy="1008320"/>
+          </a:xfrm>
+          <a:prstGeom prst="line">
+            <a:avLst/>
+          </a:prstGeom>
+          <a:ln w="28575"/>
+        </p:spPr>
+        <p:style>
+          <a:lnRef idx="1">
+            <a:schemeClr val="dk1"/>
+          </a:lnRef>
+          <a:fillRef idx="0">
+            <a:schemeClr val="dk1"/>
+          </a:fillRef>
+          <a:effectRef idx="0">
+            <a:schemeClr val="dk1"/>
+          </a:effectRef>
+          <a:fontRef idx="minor">
+            <a:schemeClr val="tx1"/>
+          </a:fontRef>
+        </p:style>
+      </p:cxnSp>
+      <p:sp>
+        <p:nvSpPr>
+          <p:cNvPr id="43" name="Rectángulo 42">
+            <a:extLst>
+              <a:ext uri="{FF2B5EF4-FFF2-40B4-BE49-F238E27FC236}">
+                <a16:creationId xmlns:a16="http://schemas.microsoft.com/office/drawing/2014/main" id="{8E8CCAB1-16C7-E054-4474-4F19773DC6FE}"/>
+              </a:ext>
+            </a:extLst>
+          </p:cNvPr>
+          <p:cNvSpPr/>
+          <p:nvPr/>
+        </p:nvSpPr>
+        <p:spPr>
+          <a:xfrm>
+            <a:off x="7107372" y="2841779"/>
+            <a:ext cx="1197765" cy="923330"/>
+          </a:xfrm>
+          <a:prstGeom prst="rect">
+            <a:avLst/>
+          </a:prstGeom>
+          <a:noFill/>
+        </p:spPr>
+        <p:txBody>
+          <a:bodyPr wrap="square" lIns="91440" tIns="45720" rIns="91440" bIns="45720">
+            <a:spAutoFit/>
+          </a:bodyPr>
+          <a:lstStyle/>
+          <a:p>
+            <a:pPr algn="ctr"/>
+            <a:r>
+              <a:rPr lang="es-ES" sz="5400" b="0" cap="none" spc="0" dirty="0">
+                <a:ln w="0"/>
+                <a:solidFill>
+                  <a:schemeClr val="tx1"/>
+                </a:solidFill>
+                <a:effectLst>
+                  <a:outerShdw blurRad="38100" dist="19050" dir="2700000" algn="tl" rotWithShape="0">
+                    <a:schemeClr val="dk1">
+                      <a:alpha val="40000"/>
+                    </a:schemeClr>
+                  </a:outerShdw>
+                </a:effectLst>
+                <a:latin typeface="Play Pretend" panose="02000500000000000000" pitchFamily="2" charset="0"/>
+              </a:rPr>
+              <a:t>FX</a:t>
+            </a:r>
+          </a:p>
+        </p:txBody>
+      </p:sp>
+      <p:pic>
+        <p:nvPicPr>
+          <p:cNvPr id="2" name="Imagen 1">
+            <a:extLst>
+              <a:ext uri="{FF2B5EF4-FFF2-40B4-BE49-F238E27FC236}">
+                <a16:creationId xmlns:a16="http://schemas.microsoft.com/office/drawing/2014/main" id="{4F8E1786-3C15-7FF8-C8B5-BF58ECEEAB1D}"/>
+              </a:ext>
+            </a:extLst>
+          </p:cNvPr>
+          <p:cNvPicPr>
+            <a:picLocks noChangeAspect="1"/>
+          </p:cNvPicPr>
+          <p:nvPr/>
+        </p:nvPicPr>
+        <p:blipFill rotWithShape="1">
+          <a:blip r:embed="rId3"/>
+          <a:srcRect l="13473" t="18397" r="12286" b="28154"/>
+          <a:stretch/>
+        </p:blipFill>
+        <p:spPr>
+          <a:xfrm>
+            <a:off x="7637172" y="4572000"/>
+            <a:ext cx="1017431" cy="811369"/>
+          </a:xfrm>
+          <a:prstGeom prst="rect">
+            <a:avLst/>
+          </a:prstGeom>
+        </p:spPr>
+      </p:pic>
+    </p:spTree>
+    <p:extLst>
+      <p:ext uri="{BB962C8B-B14F-4D97-AF65-F5344CB8AC3E}">
+        <p14:creationId xmlns:p14="http://schemas.microsoft.com/office/powerpoint/2010/main" val="3550191827"/>
+      </p:ext>
+    </p:extLst>
+  </p:cSld>
+  <p:clrMapOvr>
+    <a:masterClrMapping/>
+  </p:clrMapOvr>
+</p:sld>
+</file>
+
+<file path=ppt/slides/slide3.xml><?xml version="1.0" encoding="utf-8"?>
+<p:sld xmlns:a="http://schemas.openxmlformats.org/drawingml/2006/main" xmlns:r="http://schemas.openxmlformats.org/officeDocument/2006/relationships" xmlns:p="http://schemas.openxmlformats.org/presentationml/2006/main">
+  <p:cSld>
+    <p:spTree>
+      <p:nvGrpSpPr>
+        <p:cNvPr id="1" name=""/>
+        <p:cNvGrpSpPr/>
+        <p:nvPr/>
+      </p:nvGrpSpPr>
+      <p:grpSpPr>
+        <a:xfrm>
+          <a:off x="0" y="0"/>
+          <a:ext cx="0" cy="0"/>
+          <a:chOff x="0" y="0"/>
+          <a:chExt cx="0" cy="0"/>
+        </a:xfrm>
+      </p:grpSpPr>
+      <p:sp>
+        <p:nvSpPr>
+          <p:cNvPr id="4" name="Rectángulo: esquinas redondeadas 3">
+            <a:extLst>
+              <a:ext uri="{FF2B5EF4-FFF2-40B4-BE49-F238E27FC236}">
+                <a16:creationId xmlns:a16="http://schemas.microsoft.com/office/drawing/2014/main" id="{9BBCB830-C52D-F19C-0FEC-57AE18159C95}"/>
+              </a:ext>
+            </a:extLst>
+          </p:cNvPr>
+          <p:cNvSpPr/>
+          <p:nvPr/>
+        </p:nvSpPr>
+        <p:spPr>
+          <a:xfrm>
+            <a:off x="4391893" y="2838108"/>
+            <a:ext cx="2585682" cy="2086377"/>
+          </a:xfrm>
+          <a:prstGeom prst="roundRect">
+            <a:avLst/>
+          </a:prstGeom>
+          <a:noFill/>
+          <a:ln w="53975">
+            <a:solidFill>
+              <a:schemeClr val="tx1"/>
+            </a:solidFill>
+          </a:ln>
+        </p:spPr>
+        <p:style>
+          <a:lnRef idx="2">
+            <a:schemeClr val="accent1">
+              <a:shade val="50000"/>
+            </a:schemeClr>
+          </a:lnRef>
+          <a:fillRef idx="1">
+            <a:schemeClr val="accent1"/>
+          </a:fillRef>
+          <a:effectRef idx="0">
+            <a:schemeClr val="accent1"/>
+          </a:effectRef>
+          <a:fontRef idx="minor">
+            <a:schemeClr val="lt1"/>
+          </a:fontRef>
+        </p:style>
+        <p:txBody>
+          <a:bodyPr rtlCol="0" anchor="ctr"/>
+          <a:lstStyle/>
+          <a:p>
+            <a:pPr algn="ctr"/>
+            <a:endParaRPr lang="es-PE"/>
+          </a:p>
+        </p:txBody>
+      </p:sp>
+      <p:cxnSp>
+        <p:nvCxnSpPr>
+          <p:cNvPr id="6" name="Conector recto 5">
+            <a:extLst>
+              <a:ext uri="{FF2B5EF4-FFF2-40B4-BE49-F238E27FC236}">
+                <a16:creationId xmlns:a16="http://schemas.microsoft.com/office/drawing/2014/main" id="{60768CE8-95BA-9739-2EF5-D002771E712E}"/>
+              </a:ext>
+            </a:extLst>
+          </p:cNvPr>
+          <p:cNvCxnSpPr>
+            <a:cxnSpLocks/>
+          </p:cNvCxnSpPr>
+          <p:nvPr/>
+        </p:nvCxnSpPr>
+        <p:spPr>
+          <a:xfrm>
+            <a:off x="4698609" y="2838108"/>
+            <a:ext cx="0" cy="2110203"/>
+          </a:xfrm>
+          <a:prstGeom prst="line">
+            <a:avLst/>
+          </a:prstGeom>
+          <a:ln w="28575"/>
+        </p:spPr>
+        <p:style>
+          <a:lnRef idx="1">
+            <a:schemeClr val="dk1"/>
+          </a:lnRef>
+          <a:fillRef idx="0">
+            <a:schemeClr val="dk1"/>
+          </a:fillRef>
+          <a:effectRef idx="0">
+            <a:schemeClr val="dk1"/>
+          </a:effectRef>
+          <a:fontRef idx="minor">
+            <a:schemeClr val="tx1"/>
+          </a:fontRef>
+        </p:style>
+      </p:cxnSp>
+      <p:cxnSp>
+        <p:nvCxnSpPr>
+          <p:cNvPr id="10" name="Conector recto 9">
+            <a:extLst>
+              <a:ext uri="{FF2B5EF4-FFF2-40B4-BE49-F238E27FC236}">
+                <a16:creationId xmlns:a16="http://schemas.microsoft.com/office/drawing/2014/main" id="{587BBE3E-D620-DB57-D970-1CB0D6403892}"/>
+              </a:ext>
+            </a:extLst>
+          </p:cNvPr>
+          <p:cNvCxnSpPr>
+            <a:cxnSpLocks/>
+          </p:cNvCxnSpPr>
+          <p:nvPr/>
+        </p:nvCxnSpPr>
+        <p:spPr>
+          <a:xfrm>
+            <a:off x="4988169" y="2838108"/>
+            <a:ext cx="0" cy="2110203"/>
+          </a:xfrm>
+          <a:prstGeom prst="line">
+            <a:avLst/>
+          </a:prstGeom>
+          <a:ln w="28575"/>
+        </p:spPr>
+        <p:style>
+          <a:lnRef idx="1">
+            <a:schemeClr val="dk1"/>
+          </a:lnRef>
+          <a:fillRef idx="0">
+            <a:schemeClr val="dk1"/>
+          </a:fillRef>
+          <a:effectRef idx="0">
+            <a:schemeClr val="dk1"/>
+          </a:effectRef>
+          <a:fontRef idx="minor">
+            <a:schemeClr val="tx1"/>
+          </a:fontRef>
+        </p:style>
+      </p:cxnSp>
+      <p:cxnSp>
+        <p:nvCxnSpPr>
+          <p:cNvPr id="11" name="Conector recto 10">
+            <a:extLst>
+              <a:ext uri="{FF2B5EF4-FFF2-40B4-BE49-F238E27FC236}">
+                <a16:creationId xmlns:a16="http://schemas.microsoft.com/office/drawing/2014/main" id="{38F075F6-10DF-B57E-5E13-6B9430DBA0C1}"/>
+              </a:ext>
+            </a:extLst>
+          </p:cNvPr>
+          <p:cNvCxnSpPr>
+            <a:cxnSpLocks/>
+          </p:cNvCxnSpPr>
+          <p:nvPr/>
+        </p:nvCxnSpPr>
+        <p:spPr>
+          <a:xfrm>
+            <a:off x="5285349" y="2838108"/>
+            <a:ext cx="0" cy="2110203"/>
+          </a:xfrm>
+          <a:prstGeom prst="line">
+            <a:avLst/>
+          </a:prstGeom>
+          <a:ln w="28575"/>
+        </p:spPr>
+        <p:style>
+          <a:lnRef idx="1">
+            <a:schemeClr val="dk1"/>
+          </a:lnRef>
+          <a:fillRef idx="0">
+            <a:schemeClr val="dk1"/>
+          </a:fillRef>
+          <a:effectRef idx="0">
+            <a:schemeClr val="dk1"/>
+          </a:effectRef>
+          <a:fontRef idx="minor">
+            <a:schemeClr val="tx1"/>
+          </a:fontRef>
+        </p:style>
+      </p:cxnSp>
+      <p:cxnSp>
+        <p:nvCxnSpPr>
+          <p:cNvPr id="12" name="Conector recto 11">
+            <a:extLst>
+              <a:ext uri="{FF2B5EF4-FFF2-40B4-BE49-F238E27FC236}">
+                <a16:creationId xmlns:a16="http://schemas.microsoft.com/office/drawing/2014/main" id="{7ED89535-E777-B86A-0AFA-C0D399C79783}"/>
+              </a:ext>
+            </a:extLst>
+          </p:cNvPr>
+          <p:cNvCxnSpPr>
+            <a:cxnSpLocks/>
+          </p:cNvCxnSpPr>
+          <p:nvPr/>
+        </p:nvCxnSpPr>
+        <p:spPr>
+          <a:xfrm>
+            <a:off x="5628249" y="2838108"/>
+            <a:ext cx="0" cy="2110203"/>
+          </a:xfrm>
+          <a:prstGeom prst="line">
+            <a:avLst/>
+          </a:prstGeom>
+          <a:ln w="28575"/>
+        </p:spPr>
+        <p:style>
+          <a:lnRef idx="1">
+            <a:schemeClr val="dk1"/>
+          </a:lnRef>
+          <a:fillRef idx="0">
+            <a:schemeClr val="dk1"/>
+          </a:fillRef>
+          <a:effectRef idx="0">
+            <a:schemeClr val="dk1"/>
+          </a:effectRef>
+          <a:fontRef idx="minor">
+            <a:schemeClr val="tx1"/>
+          </a:fontRef>
+        </p:style>
+      </p:cxnSp>
+      <p:cxnSp>
+        <p:nvCxnSpPr>
+          <p:cNvPr id="13" name="Conector recto 12">
+            <a:extLst>
+              <a:ext uri="{FF2B5EF4-FFF2-40B4-BE49-F238E27FC236}">
+                <a16:creationId xmlns:a16="http://schemas.microsoft.com/office/drawing/2014/main" id="{0B3E49FC-DF2A-B208-91F5-9F2736498E56}"/>
+              </a:ext>
+            </a:extLst>
+          </p:cNvPr>
+          <p:cNvCxnSpPr>
+            <a:cxnSpLocks/>
+          </p:cNvCxnSpPr>
+          <p:nvPr/>
+        </p:nvCxnSpPr>
+        <p:spPr>
+          <a:xfrm>
+            <a:off x="5948289" y="2838108"/>
+            <a:ext cx="0" cy="2110203"/>
+          </a:xfrm>
+          <a:prstGeom prst="line">
+            <a:avLst/>
+          </a:prstGeom>
+          <a:ln w="28575"/>
+        </p:spPr>
+        <p:style>
+          <a:lnRef idx="1">
+            <a:schemeClr val="dk1"/>
+          </a:lnRef>
+          <a:fillRef idx="0">
+            <a:schemeClr val="dk1"/>
+          </a:fillRef>
+          <a:effectRef idx="0">
+            <a:schemeClr val="dk1"/>
+          </a:effectRef>
+          <a:fontRef idx="minor">
+            <a:schemeClr val="tx1"/>
+          </a:fontRef>
+        </p:style>
+      </p:cxnSp>
+      <p:cxnSp>
+        <p:nvCxnSpPr>
+          <p:cNvPr id="14" name="Conector recto 13">
+            <a:extLst>
+              <a:ext uri="{FF2B5EF4-FFF2-40B4-BE49-F238E27FC236}">
+                <a16:creationId xmlns:a16="http://schemas.microsoft.com/office/drawing/2014/main" id="{255678BE-500B-DDA8-8D40-787A92391178}"/>
+              </a:ext>
+            </a:extLst>
+          </p:cNvPr>
+          <p:cNvCxnSpPr>
+            <a:cxnSpLocks/>
+          </p:cNvCxnSpPr>
+          <p:nvPr/>
+        </p:nvCxnSpPr>
+        <p:spPr>
+          <a:xfrm>
+            <a:off x="6275949" y="2838108"/>
+            <a:ext cx="0" cy="2110203"/>
+          </a:xfrm>
+          <a:prstGeom prst="line">
+            <a:avLst/>
+          </a:prstGeom>
+          <a:ln w="28575"/>
+        </p:spPr>
+        <p:style>
+          <a:lnRef idx="1">
+            <a:schemeClr val="dk1"/>
+          </a:lnRef>
+          <a:fillRef idx="0">
+            <a:schemeClr val="dk1"/>
+          </a:fillRef>
+          <a:effectRef idx="0">
+            <a:schemeClr val="dk1"/>
+          </a:effectRef>
+          <a:fontRef idx="minor">
+            <a:schemeClr val="tx1"/>
+          </a:fontRef>
+        </p:style>
+      </p:cxnSp>
+      <p:cxnSp>
+        <p:nvCxnSpPr>
+          <p:cNvPr id="15" name="Conector recto 14">
+            <a:extLst>
+              <a:ext uri="{FF2B5EF4-FFF2-40B4-BE49-F238E27FC236}">
+                <a16:creationId xmlns:a16="http://schemas.microsoft.com/office/drawing/2014/main" id="{5847DF0A-D078-5D07-71E1-7B917105444C}"/>
+              </a:ext>
+            </a:extLst>
+          </p:cNvPr>
+          <p:cNvCxnSpPr>
+            <a:cxnSpLocks/>
+          </p:cNvCxnSpPr>
+          <p:nvPr/>
+        </p:nvCxnSpPr>
+        <p:spPr>
+          <a:xfrm>
+            <a:off x="6611229" y="2838108"/>
+            <a:ext cx="0" cy="2110203"/>
+          </a:xfrm>
+          <a:prstGeom prst="line">
+            <a:avLst/>
+          </a:prstGeom>
+          <a:ln w="28575"/>
+        </p:spPr>
+        <p:style>
+          <a:lnRef idx="1">
+            <a:schemeClr val="dk1"/>
+          </a:lnRef>
+          <a:fillRef idx="0">
+            <a:schemeClr val="dk1"/>
+          </a:fillRef>
+          <a:effectRef idx="0">
+            <a:schemeClr val="dk1"/>
+          </a:effectRef>
+          <a:fontRef idx="minor">
+            <a:schemeClr val="tx1"/>
+          </a:fontRef>
+        </p:style>
+      </p:cxnSp>
+      <p:cxnSp>
+        <p:nvCxnSpPr>
+          <p:cNvPr id="17" name="Conector recto 16">
+            <a:extLst>
+              <a:ext uri="{FF2B5EF4-FFF2-40B4-BE49-F238E27FC236}">
+                <a16:creationId xmlns:a16="http://schemas.microsoft.com/office/drawing/2014/main" id="{14435E8A-B084-965B-4989-17BB6BA3AB79}"/>
+              </a:ext>
+            </a:extLst>
+          </p:cNvPr>
+          <p:cNvCxnSpPr/>
+          <p:nvPr/>
+        </p:nvCxnSpPr>
+        <p:spPr>
+          <a:xfrm>
+            <a:off x="4391893" y="3190240"/>
+            <a:ext cx="2585682" cy="0"/>
+          </a:xfrm>
+          <a:prstGeom prst="line">
+            <a:avLst/>
+          </a:prstGeom>
+          <a:ln w="25400"/>
+        </p:spPr>
+        <p:style>
+          <a:lnRef idx="1">
+            <a:schemeClr val="dk1"/>
+          </a:lnRef>
+          <a:fillRef idx="0">
+            <a:schemeClr val="dk1"/>
+          </a:fillRef>
+          <a:effectRef idx="0">
+            <a:schemeClr val="dk1"/>
+          </a:effectRef>
+          <a:fontRef idx="minor">
+            <a:schemeClr val="tx1"/>
+          </a:fontRef>
+        </p:style>
+      </p:cxnSp>
+      <p:cxnSp>
+        <p:nvCxnSpPr>
+          <p:cNvPr id="18" name="Conector recto 17">
+            <a:extLst>
+              <a:ext uri="{FF2B5EF4-FFF2-40B4-BE49-F238E27FC236}">
+                <a16:creationId xmlns:a16="http://schemas.microsoft.com/office/drawing/2014/main" id="{D769D4DE-96F6-B5B6-7158-40FB469E9F82}"/>
+              </a:ext>
+            </a:extLst>
+          </p:cNvPr>
+          <p:cNvCxnSpPr/>
+          <p:nvPr/>
+        </p:nvCxnSpPr>
+        <p:spPr>
+          <a:xfrm>
+            <a:off x="4391893" y="3495040"/>
+            <a:ext cx="2585682" cy="0"/>
+          </a:xfrm>
+          <a:prstGeom prst="line">
+            <a:avLst/>
+          </a:prstGeom>
+          <a:ln w="25400"/>
+        </p:spPr>
+        <p:style>
+          <a:lnRef idx="1">
+            <a:schemeClr val="dk1"/>
+          </a:lnRef>
+          <a:fillRef idx="0">
+            <a:schemeClr val="dk1"/>
+          </a:fillRef>
+          <a:effectRef idx="0">
+            <a:schemeClr val="dk1"/>
+          </a:effectRef>
+          <a:fontRef idx="minor">
+            <a:schemeClr val="tx1"/>
+          </a:fontRef>
+        </p:style>
+      </p:cxnSp>
+      <p:cxnSp>
+        <p:nvCxnSpPr>
+          <p:cNvPr id="19" name="Conector recto 18">
+            <a:extLst>
+              <a:ext uri="{FF2B5EF4-FFF2-40B4-BE49-F238E27FC236}">
+                <a16:creationId xmlns:a16="http://schemas.microsoft.com/office/drawing/2014/main" id="{22C78A3F-C8F3-44CF-A960-7B720F0174F7}"/>
+              </a:ext>
+            </a:extLst>
+          </p:cNvPr>
+          <p:cNvCxnSpPr/>
+          <p:nvPr/>
+        </p:nvCxnSpPr>
+        <p:spPr>
+          <a:xfrm>
+            <a:off x="4391893" y="3784600"/>
+            <a:ext cx="2585682" cy="0"/>
+          </a:xfrm>
+          <a:prstGeom prst="line">
+            <a:avLst/>
+          </a:prstGeom>
+          <a:ln w="25400"/>
+        </p:spPr>
+        <p:style>
+          <a:lnRef idx="1">
+            <a:schemeClr val="dk1"/>
+          </a:lnRef>
+          <a:fillRef idx="0">
+            <a:schemeClr val="dk1"/>
+          </a:fillRef>
+          <a:effectRef idx="0">
+            <a:schemeClr val="dk1"/>
+          </a:effectRef>
+          <a:fontRef idx="minor">
+            <a:schemeClr val="tx1"/>
+          </a:fontRef>
+        </p:style>
+      </p:cxnSp>
+      <p:cxnSp>
+        <p:nvCxnSpPr>
+          <p:cNvPr id="20" name="Conector recto 19">
+            <a:extLst>
+              <a:ext uri="{FF2B5EF4-FFF2-40B4-BE49-F238E27FC236}">
+                <a16:creationId xmlns:a16="http://schemas.microsoft.com/office/drawing/2014/main" id="{37E5F208-65AE-79BA-E643-8650C5F0FDAC}"/>
+              </a:ext>
+            </a:extLst>
+          </p:cNvPr>
+          <p:cNvCxnSpPr/>
+          <p:nvPr/>
+        </p:nvCxnSpPr>
+        <p:spPr>
+          <a:xfrm>
+            <a:off x="4391893" y="4074160"/>
+            <a:ext cx="2585682" cy="0"/>
+          </a:xfrm>
+          <a:prstGeom prst="line">
+            <a:avLst/>
+          </a:prstGeom>
+          <a:ln w="25400"/>
+        </p:spPr>
+        <p:style>
+          <a:lnRef idx="1">
+            <a:schemeClr val="dk1"/>
+          </a:lnRef>
+          <a:fillRef idx="0">
+            <a:schemeClr val="dk1"/>
+          </a:fillRef>
+          <a:effectRef idx="0">
+            <a:schemeClr val="dk1"/>
+          </a:effectRef>
+          <a:fontRef idx="minor">
+            <a:schemeClr val="tx1"/>
+          </a:fontRef>
+        </p:style>
+      </p:cxnSp>
+      <p:cxnSp>
+        <p:nvCxnSpPr>
+          <p:cNvPr id="21" name="Conector recto 20">
+            <a:extLst>
+              <a:ext uri="{FF2B5EF4-FFF2-40B4-BE49-F238E27FC236}">
+                <a16:creationId xmlns:a16="http://schemas.microsoft.com/office/drawing/2014/main" id="{24FA4BFA-8AAB-C915-18A2-320CE7697E8C}"/>
+              </a:ext>
+            </a:extLst>
+          </p:cNvPr>
+          <p:cNvCxnSpPr/>
+          <p:nvPr/>
+        </p:nvCxnSpPr>
+        <p:spPr>
+          <a:xfrm>
+            <a:off x="4391893" y="4348480"/>
+            <a:ext cx="2585682" cy="0"/>
+          </a:xfrm>
+          <a:prstGeom prst="line">
+            <a:avLst/>
+          </a:prstGeom>
+          <a:ln w="25400"/>
+        </p:spPr>
+        <p:style>
+          <a:lnRef idx="1">
+            <a:schemeClr val="dk1"/>
+          </a:lnRef>
+          <a:fillRef idx="0">
+            <a:schemeClr val="dk1"/>
+          </a:fillRef>
+          <a:effectRef idx="0">
+            <a:schemeClr val="dk1"/>
+          </a:effectRef>
+          <a:fontRef idx="minor">
+            <a:schemeClr val="tx1"/>
+          </a:fontRef>
+        </p:style>
+      </p:cxnSp>
+      <p:cxnSp>
+        <p:nvCxnSpPr>
+          <p:cNvPr id="22" name="Conector recto 21">
+            <a:extLst>
+              <a:ext uri="{FF2B5EF4-FFF2-40B4-BE49-F238E27FC236}">
+                <a16:creationId xmlns:a16="http://schemas.microsoft.com/office/drawing/2014/main" id="{A29EF384-A166-EFC8-A078-6520B9F77587}"/>
+              </a:ext>
+            </a:extLst>
+          </p:cNvPr>
+          <p:cNvCxnSpPr/>
+          <p:nvPr/>
+        </p:nvCxnSpPr>
+        <p:spPr>
+          <a:xfrm>
+            <a:off x="4391893" y="4622800"/>
+            <a:ext cx="2585682" cy="0"/>
+          </a:xfrm>
+          <a:prstGeom prst="line">
+            <a:avLst/>
+          </a:prstGeom>
+          <a:ln w="25400"/>
+        </p:spPr>
+        <p:style>
+          <a:lnRef idx="1">
+            <a:schemeClr val="dk1"/>
+          </a:lnRef>
+          <a:fillRef idx="0">
+            <a:schemeClr val="dk1"/>
+          </a:fillRef>
+          <a:effectRef idx="0">
+            <a:schemeClr val="dk1"/>
+          </a:effectRef>
+          <a:fontRef idx="minor">
+            <a:schemeClr val="tx1"/>
+          </a:fontRef>
+        </p:style>
+      </p:cxnSp>
+      <p:sp>
+        <p:nvSpPr>
+          <p:cNvPr id="23" name="Rectángulo 22">
+            <a:extLst>
+              <a:ext uri="{FF2B5EF4-FFF2-40B4-BE49-F238E27FC236}">
+                <a16:creationId xmlns:a16="http://schemas.microsoft.com/office/drawing/2014/main" id="{3672EB94-EB26-E670-6E55-1BA36BAFAE63}"/>
+              </a:ext>
+            </a:extLst>
+          </p:cNvPr>
+          <p:cNvSpPr/>
+          <p:nvPr/>
+        </p:nvSpPr>
+        <p:spPr>
+          <a:xfrm>
+            <a:off x="4698609" y="4074160"/>
+            <a:ext cx="289557" cy="289559"/>
+          </a:xfrm>
+          <a:prstGeom prst="rect">
+            <a:avLst/>
+          </a:prstGeom>
+        </p:spPr>
+        <p:style>
+          <a:lnRef idx="2">
+            <a:schemeClr val="dk1">
+              <a:shade val="50000"/>
+            </a:schemeClr>
+          </a:lnRef>
+          <a:fillRef idx="1">
+            <a:schemeClr val="dk1"/>
+          </a:fillRef>
+          <a:effectRef idx="0">
+            <a:schemeClr val="dk1"/>
+          </a:effectRef>
+          <a:fontRef idx="minor">
+            <a:schemeClr val="lt1"/>
+          </a:fontRef>
+        </p:style>
+        <p:txBody>
+          <a:bodyPr rtlCol="0" anchor="ctr"/>
+          <a:lstStyle/>
+          <a:p>
+            <a:pPr algn="ctr"/>
+            <a:endParaRPr lang="es-PE"/>
+          </a:p>
+        </p:txBody>
+      </p:sp>
+      <p:sp>
+        <p:nvSpPr>
+          <p:cNvPr id="24" name="Rectángulo 23">
+            <a:extLst>
+              <a:ext uri="{FF2B5EF4-FFF2-40B4-BE49-F238E27FC236}">
+                <a16:creationId xmlns:a16="http://schemas.microsoft.com/office/drawing/2014/main" id="{35C65404-9AA5-D34B-510E-34D4D5C738AB}"/>
+              </a:ext>
+            </a:extLst>
+          </p:cNvPr>
+          <p:cNvSpPr/>
+          <p:nvPr/>
+        </p:nvSpPr>
+        <p:spPr>
+          <a:xfrm>
+            <a:off x="5277729" y="3492441"/>
+            <a:ext cx="662940" cy="289559"/>
+          </a:xfrm>
+          <a:prstGeom prst="rect">
+            <a:avLst/>
+          </a:prstGeom>
+        </p:spPr>
+        <p:style>
+          <a:lnRef idx="2">
+            <a:schemeClr val="dk1">
+              <a:shade val="50000"/>
+            </a:schemeClr>
+          </a:lnRef>
+          <a:fillRef idx="1">
+            <a:schemeClr val="dk1"/>
+          </a:fillRef>
+          <a:effectRef idx="0">
+            <a:schemeClr val="dk1"/>
+          </a:effectRef>
+          <a:fontRef idx="minor">
+            <a:schemeClr val="lt1"/>
+          </a:fontRef>
+        </p:style>
+        <p:txBody>
+          <a:bodyPr rtlCol="0" anchor="ctr"/>
+          <a:lstStyle/>
+          <a:p>
+            <a:pPr algn="ctr"/>
+            <a:endParaRPr lang="es-PE"/>
+          </a:p>
+        </p:txBody>
+      </p:sp>
+      <p:sp>
+        <p:nvSpPr>
+          <p:cNvPr id="25" name="Rectángulo 24">
+            <a:extLst>
+              <a:ext uri="{FF2B5EF4-FFF2-40B4-BE49-F238E27FC236}">
+                <a16:creationId xmlns:a16="http://schemas.microsoft.com/office/drawing/2014/main" id="{8EC78A80-1C92-5AE7-83B8-4D31EB8987E1}"/>
+              </a:ext>
+            </a:extLst>
+          </p:cNvPr>
+          <p:cNvSpPr/>
+          <p:nvPr/>
+        </p:nvSpPr>
+        <p:spPr>
+          <a:xfrm>
+            <a:off x="6268329" y="4074160"/>
+            <a:ext cx="342900" cy="289559"/>
+          </a:xfrm>
+          <a:prstGeom prst="rect">
+            <a:avLst/>
+          </a:prstGeom>
+        </p:spPr>
+        <p:style>
+          <a:lnRef idx="2">
+            <a:schemeClr val="dk1">
+              <a:shade val="50000"/>
+            </a:schemeClr>
+          </a:lnRef>
+          <a:fillRef idx="1">
+            <a:schemeClr val="dk1"/>
+          </a:fillRef>
+          <a:effectRef idx="0">
+            <a:schemeClr val="dk1"/>
+          </a:effectRef>
+          <a:fontRef idx="minor">
+            <a:schemeClr val="lt1"/>
+          </a:fontRef>
+        </p:style>
+        <p:txBody>
+          <a:bodyPr rtlCol="0" anchor="ctr"/>
+          <a:lstStyle/>
+          <a:p>
+            <a:pPr algn="ctr"/>
+            <a:endParaRPr lang="es-PE"/>
+          </a:p>
+        </p:txBody>
+      </p:sp>
+    </p:spTree>
+    <p:extLst>
+      <p:ext uri="{BB962C8B-B14F-4D97-AF65-F5344CB8AC3E}">
+        <p14:creationId xmlns:p14="http://schemas.microsoft.com/office/powerpoint/2010/main" val="3855100015"/>
+      </p:ext>
+    </p:extLst>
+  </p:cSld>
+  <p:clrMapOvr>
+    <a:masterClrMapping/>
+  </p:clrMapOvr>
+</p:sld>
+</file>
+
+<file path=ppt/slides/slide4.xml><?xml version="1.0" encoding="utf-8"?>
+<p:sld xmlns:a="http://schemas.openxmlformats.org/drawingml/2006/main" xmlns:r="http://schemas.openxmlformats.org/officeDocument/2006/relationships" xmlns:p="http://schemas.openxmlformats.org/presentationml/2006/main">
+  <p:cSld>
+    <p:spTree>
+      <p:nvGrpSpPr>
+        <p:cNvPr id="1" name=""/>
+        <p:cNvGrpSpPr/>
+        <p:nvPr/>
+      </p:nvGrpSpPr>
+      <p:grpSpPr>
+        <a:xfrm>
+          <a:off x="0" y="0"/>
+          <a:ext cx="0" cy="0"/>
+          <a:chOff x="0" y="0"/>
+          <a:chExt cx="0" cy="0"/>
+        </a:xfrm>
+      </p:grpSpPr>
+      <p:sp>
+        <p:nvSpPr>
+          <p:cNvPr id="4" name="Rectángulo: esquinas redondeadas 3">
+            <a:extLst>
+              <a:ext uri="{FF2B5EF4-FFF2-40B4-BE49-F238E27FC236}">
+                <a16:creationId xmlns:a16="http://schemas.microsoft.com/office/drawing/2014/main" id="{CEF26D79-F9F5-8020-B8AB-1D7B0591BA3C}"/>
+              </a:ext>
+            </a:extLst>
+          </p:cNvPr>
+          <p:cNvSpPr/>
+          <p:nvPr/>
+        </p:nvSpPr>
+        <p:spPr>
+          <a:xfrm>
+            <a:off x="3038621" y="1519311"/>
+            <a:ext cx="3882683" cy="2926080"/>
+          </a:xfrm>
+          <a:prstGeom prst="roundRect">
+            <a:avLst>
+              <a:gd name="adj" fmla="val 13782"/>
+            </a:avLst>
+          </a:prstGeom>
+          <a:noFill/>
+          <a:ln w="57150">
+            <a:solidFill>
+              <a:schemeClr val="tx1"/>
+            </a:solidFill>
+          </a:ln>
+        </p:spPr>
+        <p:style>
+          <a:lnRef idx="2">
+            <a:schemeClr val="accent1">
+              <a:shade val="50000"/>
+            </a:schemeClr>
+          </a:lnRef>
+          <a:fillRef idx="1">
+            <a:schemeClr val="accent1"/>
+          </a:fillRef>
+          <a:effectRef idx="0">
+            <a:schemeClr val="accent1"/>
+          </a:effectRef>
+          <a:fontRef idx="minor">
+            <a:schemeClr val="lt1"/>
+          </a:fontRef>
+        </p:style>
+        <p:txBody>
+          <a:bodyPr rtlCol="0" anchor="ctr"/>
+          <a:lstStyle/>
+          <a:p>
+            <a:pPr algn="ctr"/>
+            <a:endParaRPr lang="es-PE"/>
+          </a:p>
+        </p:txBody>
+      </p:sp>
+      <p:sp>
+        <p:nvSpPr>
+          <p:cNvPr id="5" name="Rectángulo: esquinas redondeadas 4">
+            <a:extLst>
+              <a:ext uri="{FF2B5EF4-FFF2-40B4-BE49-F238E27FC236}">
+                <a16:creationId xmlns:a16="http://schemas.microsoft.com/office/drawing/2014/main" id="{870DFFDD-1739-000D-ECF8-462D64807BDB}"/>
+              </a:ext>
+            </a:extLst>
+          </p:cNvPr>
+          <p:cNvSpPr/>
+          <p:nvPr/>
+        </p:nvSpPr>
+        <p:spPr>
+          <a:xfrm>
+            <a:off x="3323493" y="1899138"/>
+            <a:ext cx="253218" cy="450167"/>
+          </a:xfrm>
+          <a:prstGeom prst="roundRect">
+            <a:avLst/>
+          </a:prstGeom>
+          <a:noFill/>
+          <a:ln w="57150">
+            <a:solidFill>
+              <a:schemeClr val="tx1"/>
+            </a:solidFill>
+          </a:ln>
+        </p:spPr>
+        <p:style>
+          <a:lnRef idx="2">
+            <a:schemeClr val="accent1">
+              <a:shade val="50000"/>
+            </a:schemeClr>
+          </a:lnRef>
+          <a:fillRef idx="1">
+            <a:schemeClr val="accent1"/>
+          </a:fillRef>
+          <a:effectRef idx="0">
+            <a:schemeClr val="accent1"/>
+          </a:effectRef>
+          <a:fontRef idx="minor">
+            <a:schemeClr val="lt1"/>
+          </a:fontRef>
+        </p:style>
+        <p:txBody>
+          <a:bodyPr rtlCol="0" anchor="ctr"/>
+          <a:lstStyle/>
+          <a:p>
+            <a:pPr algn="ctr"/>
+            <a:endParaRPr lang="es-PE"/>
+          </a:p>
+        </p:txBody>
+      </p:sp>
+      <p:sp>
+        <p:nvSpPr>
+          <p:cNvPr id="6" name="Rectángulo: esquinas redondeadas 5">
+            <a:extLst>
+              <a:ext uri="{FF2B5EF4-FFF2-40B4-BE49-F238E27FC236}">
+                <a16:creationId xmlns:a16="http://schemas.microsoft.com/office/drawing/2014/main" id="{E9F39905-F63B-9E8E-39C2-A8A1128E5D23}"/>
+              </a:ext>
+            </a:extLst>
+          </p:cNvPr>
+          <p:cNvSpPr/>
+          <p:nvPr/>
+        </p:nvSpPr>
+        <p:spPr>
+          <a:xfrm>
+            <a:off x="3752557" y="1899138"/>
+            <a:ext cx="253218" cy="450167"/>
+          </a:xfrm>
+          <a:prstGeom prst="roundRect">
+            <a:avLst/>
+          </a:prstGeom>
+        </p:spPr>
+        <p:style>
+          <a:lnRef idx="2">
+            <a:schemeClr val="dk1">
+              <a:shade val="50000"/>
+            </a:schemeClr>
+          </a:lnRef>
+          <a:fillRef idx="1">
+            <a:schemeClr val="dk1"/>
+          </a:fillRef>
+          <a:effectRef idx="0">
+            <a:schemeClr val="dk1"/>
+          </a:effectRef>
+          <a:fontRef idx="minor">
+            <a:schemeClr val="lt1"/>
+          </a:fontRef>
+        </p:style>
+        <p:txBody>
+          <a:bodyPr rtlCol="0" anchor="ctr"/>
+          <a:lstStyle/>
+          <a:p>
+            <a:pPr algn="ctr"/>
+            <a:endParaRPr lang="es-PE"/>
+          </a:p>
+        </p:txBody>
+      </p:sp>
+      <p:sp>
+        <p:nvSpPr>
+          <p:cNvPr id="7" name="Rectángulo: esquinas redondeadas 6">
+            <a:extLst>
+              <a:ext uri="{FF2B5EF4-FFF2-40B4-BE49-F238E27FC236}">
+                <a16:creationId xmlns:a16="http://schemas.microsoft.com/office/drawing/2014/main" id="{F68257A4-FFE5-ECBC-FFE7-F609D01ADF08}"/>
+              </a:ext>
+            </a:extLst>
+          </p:cNvPr>
+          <p:cNvSpPr/>
+          <p:nvPr/>
+        </p:nvSpPr>
+        <p:spPr>
+          <a:xfrm>
+            <a:off x="4210639" y="1899138"/>
+            <a:ext cx="253218" cy="450167"/>
+          </a:xfrm>
+          <a:prstGeom prst="roundRect">
+            <a:avLst/>
+          </a:prstGeom>
+          <a:noFill/>
+          <a:ln w="57150">
+            <a:solidFill>
+              <a:schemeClr val="tx1"/>
+            </a:solidFill>
+          </a:ln>
+        </p:spPr>
+        <p:style>
+          <a:lnRef idx="2">
+            <a:schemeClr val="accent1">
+              <a:shade val="50000"/>
+            </a:schemeClr>
+          </a:lnRef>
+          <a:fillRef idx="1">
+            <a:schemeClr val="accent1"/>
+          </a:fillRef>
+          <a:effectRef idx="0">
+            <a:schemeClr val="accent1"/>
+          </a:effectRef>
+          <a:fontRef idx="minor">
+            <a:schemeClr val="lt1"/>
+          </a:fontRef>
+        </p:style>
+        <p:txBody>
+          <a:bodyPr rtlCol="0" anchor="ctr"/>
+          <a:lstStyle/>
+          <a:p>
+            <a:pPr algn="ctr"/>
+            <a:endParaRPr lang="es-PE"/>
+          </a:p>
+        </p:txBody>
+      </p:sp>
+      <p:sp>
+        <p:nvSpPr>
+          <p:cNvPr id="10" name="Rectángulo: esquinas redondeadas 9">
+            <a:extLst>
+              <a:ext uri="{FF2B5EF4-FFF2-40B4-BE49-F238E27FC236}">
+                <a16:creationId xmlns:a16="http://schemas.microsoft.com/office/drawing/2014/main" id="{36ABCAF4-FE27-5B59-3034-E528A6C95090}"/>
+              </a:ext>
+            </a:extLst>
+          </p:cNvPr>
+          <p:cNvSpPr/>
+          <p:nvPr/>
+        </p:nvSpPr>
+        <p:spPr>
+          <a:xfrm>
+            <a:off x="4681026" y="1899137"/>
+            <a:ext cx="253218" cy="450167"/>
+          </a:xfrm>
+          <a:prstGeom prst="roundRect">
+            <a:avLst/>
+          </a:prstGeom>
+        </p:spPr>
+        <p:style>
+          <a:lnRef idx="2">
+            <a:schemeClr val="dk1">
+              <a:shade val="50000"/>
+            </a:schemeClr>
+          </a:lnRef>
+          <a:fillRef idx="1">
+            <a:schemeClr val="dk1"/>
+          </a:fillRef>
+          <a:effectRef idx="0">
+            <a:schemeClr val="dk1"/>
+          </a:effectRef>
+          <a:fontRef idx="minor">
+            <a:schemeClr val="lt1"/>
+          </a:fontRef>
+        </p:style>
+        <p:txBody>
+          <a:bodyPr rtlCol="0" anchor="ctr"/>
+          <a:lstStyle/>
+          <a:p>
+            <a:pPr algn="ctr"/>
+            <a:endParaRPr lang="es-PE"/>
+          </a:p>
+        </p:txBody>
+      </p:sp>
+      <p:sp>
+        <p:nvSpPr>
+          <p:cNvPr id="15" name="Rectángulo: esquinas redondeadas 14">
+            <a:extLst>
+              <a:ext uri="{FF2B5EF4-FFF2-40B4-BE49-F238E27FC236}">
+                <a16:creationId xmlns:a16="http://schemas.microsoft.com/office/drawing/2014/main" id="{D2A2B2C7-AD81-D2D4-7340-9655D552B1BA}"/>
+              </a:ext>
+            </a:extLst>
+          </p:cNvPr>
+          <p:cNvSpPr/>
+          <p:nvPr/>
+        </p:nvSpPr>
+        <p:spPr>
+          <a:xfrm>
+            <a:off x="5110090" y="1899138"/>
+            <a:ext cx="253218" cy="450167"/>
+          </a:xfrm>
+          <a:prstGeom prst="roundRect">
+            <a:avLst/>
+          </a:prstGeom>
+          <a:noFill/>
+          <a:ln w="57150">
+            <a:solidFill>
+              <a:schemeClr val="tx1"/>
+            </a:solidFill>
+          </a:ln>
+        </p:spPr>
+        <p:style>
+          <a:lnRef idx="2">
+            <a:schemeClr val="accent1">
+              <a:shade val="50000"/>
+            </a:schemeClr>
+          </a:lnRef>
+          <a:fillRef idx="1">
+            <a:schemeClr val="accent1"/>
+          </a:fillRef>
+          <a:effectRef idx="0">
+            <a:schemeClr val="accent1"/>
+          </a:effectRef>
+          <a:fontRef idx="minor">
+            <a:schemeClr val="lt1"/>
+          </a:fontRef>
+        </p:style>
+        <p:txBody>
+          <a:bodyPr rtlCol="0" anchor="ctr"/>
+          <a:lstStyle/>
+          <a:p>
+            <a:pPr algn="ctr"/>
+            <a:endParaRPr lang="es-PE"/>
+          </a:p>
+        </p:txBody>
+      </p:sp>
+      <p:sp>
+        <p:nvSpPr>
+          <p:cNvPr id="16" name="Rectángulo: esquinas redondeadas 15">
+            <a:extLst>
+              <a:ext uri="{FF2B5EF4-FFF2-40B4-BE49-F238E27FC236}">
+                <a16:creationId xmlns:a16="http://schemas.microsoft.com/office/drawing/2014/main" id="{6A45EA67-F1DF-4790-9D18-179790147AE5}"/>
+              </a:ext>
+            </a:extLst>
+          </p:cNvPr>
+          <p:cNvSpPr/>
+          <p:nvPr/>
+        </p:nvSpPr>
+        <p:spPr>
+          <a:xfrm>
+            <a:off x="5539154" y="1899138"/>
+            <a:ext cx="253218" cy="450167"/>
+          </a:xfrm>
+          <a:prstGeom prst="roundRect">
+            <a:avLst/>
+          </a:prstGeom>
+        </p:spPr>
+        <p:style>
+          <a:lnRef idx="2">
+            <a:schemeClr val="dk1">
+              <a:shade val="50000"/>
+            </a:schemeClr>
+          </a:lnRef>
+          <a:fillRef idx="1">
+            <a:schemeClr val="dk1"/>
+          </a:fillRef>
+          <a:effectRef idx="0">
+            <a:schemeClr val="dk1"/>
+          </a:effectRef>
+          <a:fontRef idx="minor">
+            <a:schemeClr val="lt1"/>
+          </a:fontRef>
+        </p:style>
+        <p:txBody>
+          <a:bodyPr rtlCol="0" anchor="ctr"/>
+          <a:lstStyle/>
+          <a:p>
+            <a:pPr algn="ctr"/>
+            <a:endParaRPr lang="es-PE"/>
+          </a:p>
+        </p:txBody>
+      </p:sp>
+      <p:sp>
+        <p:nvSpPr>
+          <p:cNvPr id="17" name="Rectángulo: esquinas redondeadas 16">
+            <a:extLst>
+              <a:ext uri="{FF2B5EF4-FFF2-40B4-BE49-F238E27FC236}">
+                <a16:creationId xmlns:a16="http://schemas.microsoft.com/office/drawing/2014/main" id="{1092E51A-BD38-D0D3-2B53-72D42DC5DAC6}"/>
+              </a:ext>
+            </a:extLst>
+          </p:cNvPr>
+          <p:cNvSpPr/>
+          <p:nvPr/>
+        </p:nvSpPr>
+        <p:spPr>
+          <a:xfrm>
+            <a:off x="5968218" y="1899138"/>
+            <a:ext cx="253218" cy="450167"/>
+          </a:xfrm>
+          <a:prstGeom prst="roundRect">
+            <a:avLst/>
+          </a:prstGeom>
+          <a:noFill/>
+          <a:ln w="57150">
+            <a:solidFill>
+              <a:schemeClr val="tx1"/>
+            </a:solidFill>
+          </a:ln>
+        </p:spPr>
+        <p:style>
+          <a:lnRef idx="2">
+            <a:schemeClr val="accent1">
+              <a:shade val="50000"/>
+            </a:schemeClr>
+          </a:lnRef>
+          <a:fillRef idx="1">
+            <a:schemeClr val="accent1"/>
+          </a:fillRef>
+          <a:effectRef idx="0">
+            <a:schemeClr val="accent1"/>
+          </a:effectRef>
+          <a:fontRef idx="minor">
+            <a:schemeClr val="lt1"/>
+          </a:fontRef>
+        </p:style>
+        <p:txBody>
+          <a:bodyPr rtlCol="0" anchor="ctr"/>
+          <a:lstStyle/>
+          <a:p>
+            <a:pPr algn="ctr"/>
+            <a:endParaRPr lang="es-PE"/>
+          </a:p>
+        </p:txBody>
+      </p:sp>
+      <p:sp>
+        <p:nvSpPr>
+          <p:cNvPr id="18" name="Rectángulo: esquinas redondeadas 17">
+            <a:extLst>
+              <a:ext uri="{FF2B5EF4-FFF2-40B4-BE49-F238E27FC236}">
+                <a16:creationId xmlns:a16="http://schemas.microsoft.com/office/drawing/2014/main" id="{82D6F81A-76A4-8B28-0C3C-52AA58E6D9B7}"/>
+              </a:ext>
+            </a:extLst>
+          </p:cNvPr>
+          <p:cNvSpPr/>
+          <p:nvPr/>
+        </p:nvSpPr>
+        <p:spPr>
+          <a:xfrm>
+            <a:off x="6397282" y="1899138"/>
+            <a:ext cx="253218" cy="450167"/>
+          </a:xfrm>
+          <a:prstGeom prst="roundRect">
+            <a:avLst/>
+          </a:prstGeom>
+        </p:spPr>
+        <p:style>
+          <a:lnRef idx="2">
+            <a:schemeClr val="dk1">
+              <a:shade val="50000"/>
+            </a:schemeClr>
+          </a:lnRef>
+          <a:fillRef idx="1">
+            <a:schemeClr val="dk1"/>
+          </a:fillRef>
+          <a:effectRef idx="0">
+            <a:schemeClr val="dk1"/>
+          </a:effectRef>
+          <a:fontRef idx="minor">
+            <a:schemeClr val="lt1"/>
+          </a:fontRef>
+        </p:style>
+        <p:txBody>
+          <a:bodyPr rtlCol="0" anchor="ctr"/>
+          <a:lstStyle/>
+          <a:p>
+            <a:pPr algn="ctr"/>
+            <a:endParaRPr lang="es-PE"/>
+          </a:p>
+        </p:txBody>
+      </p:sp>
+      <p:sp>
+        <p:nvSpPr>
+          <p:cNvPr id="19" name="Rectángulo: esquinas redondeadas 18">
+            <a:extLst>
+              <a:ext uri="{FF2B5EF4-FFF2-40B4-BE49-F238E27FC236}">
+                <a16:creationId xmlns:a16="http://schemas.microsoft.com/office/drawing/2014/main" id="{913C927E-7A3B-A705-4A37-0800CA2ADA2D}"/>
+              </a:ext>
+            </a:extLst>
+          </p:cNvPr>
+          <p:cNvSpPr/>
+          <p:nvPr/>
+        </p:nvSpPr>
+        <p:spPr>
+          <a:xfrm>
+            <a:off x="6397282" y="2729132"/>
+            <a:ext cx="253218" cy="450167"/>
+          </a:xfrm>
+          <a:prstGeom prst="roundRect">
+            <a:avLst/>
+          </a:prstGeom>
+          <a:noFill/>
+          <a:ln w="57150">
+            <a:solidFill>
+              <a:schemeClr val="tx1"/>
+            </a:solidFill>
+          </a:ln>
+        </p:spPr>
+        <p:style>
+          <a:lnRef idx="2">
+            <a:schemeClr val="accent1">
+              <a:shade val="50000"/>
+            </a:schemeClr>
+          </a:lnRef>
+          <a:fillRef idx="1">
+            <a:schemeClr val="accent1"/>
+          </a:fillRef>
+          <a:effectRef idx="0">
+            <a:schemeClr val="accent1"/>
+          </a:effectRef>
+          <a:fontRef idx="minor">
+            <a:schemeClr val="lt1"/>
+          </a:fontRef>
+        </p:style>
+        <p:txBody>
+          <a:bodyPr rtlCol="0" anchor="ctr"/>
+          <a:lstStyle/>
+          <a:p>
+            <a:pPr algn="ctr"/>
+            <a:endParaRPr lang="es-PE"/>
+          </a:p>
+        </p:txBody>
+      </p:sp>
+      <p:sp>
+        <p:nvSpPr>
+          <p:cNvPr id="20" name="Rectángulo: esquinas redondeadas 19">
+            <a:extLst>
+              <a:ext uri="{FF2B5EF4-FFF2-40B4-BE49-F238E27FC236}">
+                <a16:creationId xmlns:a16="http://schemas.microsoft.com/office/drawing/2014/main" id="{EB95CDA2-972B-20A8-972F-B5E0D04CA1E7}"/>
+              </a:ext>
+            </a:extLst>
+          </p:cNvPr>
+          <p:cNvSpPr/>
+          <p:nvPr/>
+        </p:nvSpPr>
+        <p:spPr>
+          <a:xfrm>
+            <a:off x="3323493" y="2729132"/>
+            <a:ext cx="253218" cy="450167"/>
+          </a:xfrm>
+          <a:prstGeom prst="roundRect">
+            <a:avLst/>
+          </a:prstGeom>
+        </p:spPr>
+        <p:style>
+          <a:lnRef idx="2">
+            <a:schemeClr val="dk1">
+              <a:shade val="50000"/>
+            </a:schemeClr>
+          </a:lnRef>
+          <a:fillRef idx="1">
+            <a:schemeClr val="dk1"/>
+          </a:fillRef>
+          <a:effectRef idx="0">
+            <a:schemeClr val="dk1"/>
+          </a:effectRef>
+          <a:fontRef idx="minor">
+            <a:schemeClr val="lt1"/>
+          </a:fontRef>
+        </p:style>
+        <p:txBody>
+          <a:bodyPr rtlCol="0" anchor="ctr"/>
+          <a:lstStyle/>
+          <a:p>
+            <a:pPr algn="ctr"/>
+            <a:endParaRPr lang="es-PE"/>
+          </a:p>
+        </p:txBody>
+      </p:sp>
+      <p:sp>
+        <p:nvSpPr>
+          <p:cNvPr id="21" name="Rectángulo: esquinas redondeadas 20">
+            <a:extLst>
+              <a:ext uri="{FF2B5EF4-FFF2-40B4-BE49-F238E27FC236}">
+                <a16:creationId xmlns:a16="http://schemas.microsoft.com/office/drawing/2014/main" id="{0DB48C88-C4F5-3066-9F6C-B786F51A8140}"/>
+              </a:ext>
+            </a:extLst>
+          </p:cNvPr>
+          <p:cNvSpPr/>
+          <p:nvPr/>
+        </p:nvSpPr>
+        <p:spPr>
+          <a:xfrm>
+            <a:off x="3752557" y="2729132"/>
+            <a:ext cx="253218" cy="450167"/>
+          </a:xfrm>
+          <a:prstGeom prst="roundRect">
+            <a:avLst/>
+          </a:prstGeom>
+          <a:noFill/>
+          <a:ln w="57150">
+            <a:solidFill>
+              <a:schemeClr val="tx1"/>
+            </a:solidFill>
+          </a:ln>
+        </p:spPr>
+        <p:style>
+          <a:lnRef idx="2">
+            <a:schemeClr val="accent1">
+              <a:shade val="50000"/>
+            </a:schemeClr>
+          </a:lnRef>
+          <a:fillRef idx="1">
+            <a:schemeClr val="accent1"/>
+          </a:fillRef>
+          <a:effectRef idx="0">
+            <a:schemeClr val="accent1"/>
+          </a:effectRef>
+          <a:fontRef idx="minor">
+            <a:schemeClr val="lt1"/>
+          </a:fontRef>
+        </p:style>
+        <p:txBody>
+          <a:bodyPr rtlCol="0" anchor="ctr"/>
+          <a:lstStyle/>
+          <a:p>
+            <a:pPr algn="ctr"/>
+            <a:endParaRPr lang="es-PE"/>
+          </a:p>
+        </p:txBody>
+      </p:sp>
+      <p:sp>
+        <p:nvSpPr>
+          <p:cNvPr id="22" name="Rectángulo: esquinas redondeadas 21">
+            <a:extLst>
+              <a:ext uri="{FF2B5EF4-FFF2-40B4-BE49-F238E27FC236}">
+                <a16:creationId xmlns:a16="http://schemas.microsoft.com/office/drawing/2014/main" id="{CBCF43A3-9399-1375-C69F-678D6BA3AC78}"/>
+              </a:ext>
+            </a:extLst>
+          </p:cNvPr>
+          <p:cNvSpPr/>
+          <p:nvPr/>
+        </p:nvSpPr>
+        <p:spPr>
+          <a:xfrm>
+            <a:off x="4210639" y="2729132"/>
+            <a:ext cx="253218" cy="450167"/>
+          </a:xfrm>
+          <a:prstGeom prst="roundRect">
+            <a:avLst/>
+          </a:prstGeom>
+        </p:spPr>
+        <p:style>
+          <a:lnRef idx="2">
+            <a:schemeClr val="dk1">
+              <a:shade val="50000"/>
+            </a:schemeClr>
+          </a:lnRef>
+          <a:fillRef idx="1">
+            <a:schemeClr val="dk1"/>
+          </a:fillRef>
+          <a:effectRef idx="0">
+            <a:schemeClr val="dk1"/>
+          </a:effectRef>
+          <a:fontRef idx="minor">
+            <a:schemeClr val="lt1"/>
+          </a:fontRef>
+        </p:style>
+        <p:txBody>
+          <a:bodyPr rtlCol="0" anchor="ctr"/>
+          <a:lstStyle/>
+          <a:p>
+            <a:pPr algn="ctr"/>
+            <a:endParaRPr lang="es-PE"/>
+          </a:p>
+        </p:txBody>
+      </p:sp>
+      <p:sp>
+        <p:nvSpPr>
+          <p:cNvPr id="23" name="Rectángulo: esquinas redondeadas 22">
+            <a:extLst>
+              <a:ext uri="{FF2B5EF4-FFF2-40B4-BE49-F238E27FC236}">
+                <a16:creationId xmlns:a16="http://schemas.microsoft.com/office/drawing/2014/main" id="{CE29955D-DC97-4E70-C0C4-0A714CF9E012}"/>
+              </a:ext>
+            </a:extLst>
+          </p:cNvPr>
+          <p:cNvSpPr/>
+          <p:nvPr/>
+        </p:nvSpPr>
+        <p:spPr>
+          <a:xfrm>
+            <a:off x="4681026" y="2729132"/>
+            <a:ext cx="253218" cy="450167"/>
+          </a:xfrm>
+          <a:prstGeom prst="roundRect">
+            <a:avLst/>
+          </a:prstGeom>
+          <a:noFill/>
+          <a:ln w="57150">
+            <a:solidFill>
+              <a:schemeClr val="tx1"/>
+            </a:solidFill>
+          </a:ln>
+        </p:spPr>
+        <p:style>
+          <a:lnRef idx="2">
+            <a:schemeClr val="accent1">
+              <a:shade val="50000"/>
+            </a:schemeClr>
+          </a:lnRef>
+          <a:fillRef idx="1">
+            <a:schemeClr val="accent1"/>
+          </a:fillRef>
+          <a:effectRef idx="0">
+            <a:schemeClr val="accent1"/>
+          </a:effectRef>
+          <a:fontRef idx="minor">
+            <a:schemeClr val="lt1"/>
+          </a:fontRef>
+        </p:style>
+        <p:txBody>
+          <a:bodyPr rtlCol="0" anchor="ctr"/>
+          <a:lstStyle/>
+          <a:p>
+            <a:pPr algn="ctr"/>
+            <a:endParaRPr lang="es-PE"/>
+          </a:p>
+        </p:txBody>
+      </p:sp>
+      <p:sp>
+        <p:nvSpPr>
+          <p:cNvPr id="24" name="Rectángulo: esquinas redondeadas 23">
+            <a:extLst>
+              <a:ext uri="{FF2B5EF4-FFF2-40B4-BE49-F238E27FC236}">
+                <a16:creationId xmlns:a16="http://schemas.microsoft.com/office/drawing/2014/main" id="{E6077052-61BA-1242-6C3B-70343934DBAC}"/>
+              </a:ext>
+            </a:extLst>
+          </p:cNvPr>
+          <p:cNvSpPr/>
+          <p:nvPr/>
+        </p:nvSpPr>
+        <p:spPr>
+          <a:xfrm>
+            <a:off x="5110090" y="2729132"/>
+            <a:ext cx="253218" cy="450167"/>
+          </a:xfrm>
+          <a:prstGeom prst="roundRect">
+            <a:avLst/>
+          </a:prstGeom>
+        </p:spPr>
+        <p:style>
+          <a:lnRef idx="2">
+            <a:schemeClr val="dk1">
+              <a:shade val="50000"/>
+            </a:schemeClr>
+          </a:lnRef>
+          <a:fillRef idx="1">
+            <a:schemeClr val="dk1"/>
+          </a:fillRef>
+          <a:effectRef idx="0">
+            <a:schemeClr val="dk1"/>
+          </a:effectRef>
+          <a:fontRef idx="minor">
+            <a:schemeClr val="lt1"/>
+          </a:fontRef>
+        </p:style>
+        <p:txBody>
+          <a:bodyPr rtlCol="0" anchor="ctr"/>
+          <a:lstStyle/>
+          <a:p>
+            <a:pPr algn="ctr"/>
+            <a:endParaRPr lang="es-PE"/>
+          </a:p>
+        </p:txBody>
+      </p:sp>
+      <p:sp>
+        <p:nvSpPr>
+          <p:cNvPr id="25" name="Rectángulo: esquinas redondeadas 24">
+            <a:extLst>
+              <a:ext uri="{FF2B5EF4-FFF2-40B4-BE49-F238E27FC236}">
+                <a16:creationId xmlns:a16="http://schemas.microsoft.com/office/drawing/2014/main" id="{C85F0D3B-7F8D-D92C-8FF0-869BBB522763}"/>
+              </a:ext>
+            </a:extLst>
+          </p:cNvPr>
+          <p:cNvSpPr/>
+          <p:nvPr/>
+        </p:nvSpPr>
+        <p:spPr>
+          <a:xfrm>
+            <a:off x="5539154" y="2729132"/>
+            <a:ext cx="253218" cy="450167"/>
+          </a:xfrm>
+          <a:prstGeom prst="roundRect">
+            <a:avLst/>
+          </a:prstGeom>
+          <a:noFill/>
+          <a:ln w="57150">
+            <a:solidFill>
+              <a:schemeClr val="tx1"/>
+            </a:solidFill>
+          </a:ln>
+        </p:spPr>
+        <p:style>
+          <a:lnRef idx="2">
+            <a:schemeClr val="accent1">
+              <a:shade val="50000"/>
+            </a:schemeClr>
+          </a:lnRef>
+          <a:fillRef idx="1">
+            <a:schemeClr val="accent1"/>
+          </a:fillRef>
+          <a:effectRef idx="0">
+            <a:schemeClr val="accent1"/>
+          </a:effectRef>
+          <a:fontRef idx="minor">
+            <a:schemeClr val="lt1"/>
+          </a:fontRef>
+        </p:style>
+        <p:txBody>
+          <a:bodyPr rtlCol="0" anchor="ctr"/>
+          <a:lstStyle/>
+          <a:p>
+            <a:pPr algn="ctr"/>
+            <a:endParaRPr lang="es-PE"/>
+          </a:p>
+        </p:txBody>
+      </p:sp>
+      <p:sp>
+        <p:nvSpPr>
+          <p:cNvPr id="26" name="Rectángulo: esquinas redondeadas 25">
+            <a:extLst>
+              <a:ext uri="{FF2B5EF4-FFF2-40B4-BE49-F238E27FC236}">
+                <a16:creationId xmlns:a16="http://schemas.microsoft.com/office/drawing/2014/main" id="{43E0FC8B-B6B1-2A39-3C73-FE37C9A2D83A}"/>
+              </a:ext>
+            </a:extLst>
+          </p:cNvPr>
+          <p:cNvSpPr/>
+          <p:nvPr/>
+        </p:nvSpPr>
+        <p:spPr>
+          <a:xfrm>
+            <a:off x="5968218" y="2729132"/>
+            <a:ext cx="253218" cy="450167"/>
+          </a:xfrm>
+          <a:prstGeom prst="roundRect">
+            <a:avLst/>
+          </a:prstGeom>
+        </p:spPr>
+        <p:style>
+          <a:lnRef idx="2">
+            <a:schemeClr val="dk1">
+              <a:shade val="50000"/>
+            </a:schemeClr>
+          </a:lnRef>
+          <a:fillRef idx="1">
+            <a:schemeClr val="dk1"/>
+          </a:fillRef>
+          <a:effectRef idx="0">
+            <a:schemeClr val="dk1"/>
+          </a:effectRef>
+          <a:fontRef idx="minor">
+            <a:schemeClr val="lt1"/>
+          </a:fontRef>
+        </p:style>
+        <p:txBody>
+          <a:bodyPr rtlCol="0" anchor="ctr"/>
+          <a:lstStyle/>
+          <a:p>
+            <a:pPr algn="ctr"/>
+            <a:endParaRPr lang="es-PE"/>
+          </a:p>
+        </p:txBody>
+      </p:sp>
+      <p:sp>
+        <p:nvSpPr>
+          <p:cNvPr id="28" name="Rectángulo: esquinas redondeadas 27">
+            <a:extLst>
+              <a:ext uri="{FF2B5EF4-FFF2-40B4-BE49-F238E27FC236}">
+                <a16:creationId xmlns:a16="http://schemas.microsoft.com/office/drawing/2014/main" id="{58F2A9F7-0E06-E1E5-9EBC-4D6E8BF48853}"/>
+              </a:ext>
+            </a:extLst>
+          </p:cNvPr>
+          <p:cNvSpPr/>
+          <p:nvPr/>
+        </p:nvSpPr>
+        <p:spPr>
+          <a:xfrm>
+            <a:off x="3323493" y="3559126"/>
+            <a:ext cx="253218" cy="450167"/>
+          </a:xfrm>
+          <a:prstGeom prst="roundRect">
+            <a:avLst/>
+          </a:prstGeom>
+        </p:spPr>
+        <p:style>
+          <a:lnRef idx="2">
+            <a:schemeClr val="dk1">
+              <a:shade val="50000"/>
+            </a:schemeClr>
+          </a:lnRef>
+          <a:fillRef idx="1">
+            <a:schemeClr val="dk1"/>
+          </a:fillRef>
+          <a:effectRef idx="0">
+            <a:schemeClr val="dk1"/>
+          </a:effectRef>
+          <a:fontRef idx="minor">
+            <a:schemeClr val="lt1"/>
+          </a:fontRef>
+        </p:style>
+        <p:txBody>
+          <a:bodyPr rtlCol="0" anchor="ctr"/>
+          <a:lstStyle/>
+          <a:p>
+            <a:pPr algn="ctr"/>
+            <a:endParaRPr lang="es-PE"/>
+          </a:p>
+        </p:txBody>
+      </p:sp>
+      <p:sp>
+        <p:nvSpPr>
+          <p:cNvPr id="29" name="Rectángulo: esquinas redondeadas 28">
+            <a:extLst>
+              <a:ext uri="{FF2B5EF4-FFF2-40B4-BE49-F238E27FC236}">
+                <a16:creationId xmlns:a16="http://schemas.microsoft.com/office/drawing/2014/main" id="{01A45228-7D3B-5E12-2A2A-BCF5447D7BD6}"/>
+              </a:ext>
+            </a:extLst>
+          </p:cNvPr>
+          <p:cNvSpPr/>
+          <p:nvPr/>
+        </p:nvSpPr>
+        <p:spPr>
+          <a:xfrm>
+            <a:off x="3752557" y="3559126"/>
+            <a:ext cx="253218" cy="450167"/>
+          </a:xfrm>
+          <a:prstGeom prst="roundRect">
+            <a:avLst/>
+          </a:prstGeom>
+          <a:noFill/>
+          <a:ln w="57150">
+            <a:solidFill>
+              <a:schemeClr val="tx1"/>
+            </a:solidFill>
+          </a:ln>
+        </p:spPr>
+        <p:style>
+          <a:lnRef idx="2">
+            <a:schemeClr val="accent1">
+              <a:shade val="50000"/>
+            </a:schemeClr>
+          </a:lnRef>
+          <a:fillRef idx="1">
+            <a:schemeClr val="accent1"/>
+          </a:fillRef>
+          <a:effectRef idx="0">
+            <a:schemeClr val="accent1"/>
+          </a:effectRef>
+          <a:fontRef idx="minor">
+            <a:schemeClr val="lt1"/>
+          </a:fontRef>
+        </p:style>
+        <p:txBody>
+          <a:bodyPr rtlCol="0" anchor="ctr"/>
+          <a:lstStyle/>
+          <a:p>
+            <a:pPr algn="ctr"/>
+            <a:endParaRPr lang="es-PE"/>
+          </a:p>
+        </p:txBody>
+      </p:sp>
+      <p:sp>
+        <p:nvSpPr>
+          <p:cNvPr id="35" name="Rectángulo: esquinas redondeadas 34">
+            <a:extLst>
+              <a:ext uri="{FF2B5EF4-FFF2-40B4-BE49-F238E27FC236}">
+                <a16:creationId xmlns:a16="http://schemas.microsoft.com/office/drawing/2014/main" id="{524EC0E3-9759-66DD-B206-FFC3E6A85739}"/>
+              </a:ext>
+            </a:extLst>
+          </p:cNvPr>
+          <p:cNvSpPr/>
+          <p:nvPr/>
+        </p:nvSpPr>
+        <p:spPr>
+          <a:xfrm>
+            <a:off x="5110090" y="3559126"/>
+            <a:ext cx="253218" cy="450167"/>
+          </a:xfrm>
+          <a:prstGeom prst="roundRect">
+            <a:avLst/>
+          </a:prstGeom>
+        </p:spPr>
+        <p:style>
+          <a:lnRef idx="2">
+            <a:schemeClr val="dk1">
+              <a:shade val="50000"/>
+            </a:schemeClr>
+          </a:lnRef>
+          <a:fillRef idx="1">
+            <a:schemeClr val="dk1"/>
+          </a:fillRef>
+          <a:effectRef idx="0">
+            <a:schemeClr val="dk1"/>
+          </a:effectRef>
+          <a:fontRef idx="minor">
+            <a:schemeClr val="lt1"/>
+          </a:fontRef>
+        </p:style>
+        <p:txBody>
+          <a:bodyPr rtlCol="0" anchor="ctr"/>
+          <a:lstStyle/>
+          <a:p>
+            <a:pPr algn="ctr"/>
+            <a:endParaRPr lang="es-PE"/>
+          </a:p>
+        </p:txBody>
+      </p:sp>
+      <p:sp>
+        <p:nvSpPr>
+          <p:cNvPr id="36" name="Rectángulo: esquinas redondeadas 35">
+            <a:extLst>
+              <a:ext uri="{FF2B5EF4-FFF2-40B4-BE49-F238E27FC236}">
+                <a16:creationId xmlns:a16="http://schemas.microsoft.com/office/drawing/2014/main" id="{EF4B6EE9-73A4-4FFB-3AC3-2C79FFEC07A5}"/>
+              </a:ext>
+            </a:extLst>
+          </p:cNvPr>
+          <p:cNvSpPr/>
+          <p:nvPr/>
+        </p:nvSpPr>
+        <p:spPr>
+          <a:xfrm>
+            <a:off x="4215914" y="3559126"/>
+            <a:ext cx="253218" cy="450167"/>
+          </a:xfrm>
+          <a:prstGeom prst="roundRect">
+            <a:avLst/>
+          </a:prstGeom>
+          <a:noFill/>
+          <a:ln w="57150">
+            <a:solidFill>
+              <a:schemeClr val="tx1"/>
+            </a:solidFill>
+          </a:ln>
+        </p:spPr>
+        <p:style>
+          <a:lnRef idx="2">
+            <a:schemeClr val="accent1">
+              <a:shade val="50000"/>
+            </a:schemeClr>
+          </a:lnRef>
+          <a:fillRef idx="1">
+            <a:schemeClr val="accent1"/>
+          </a:fillRef>
+          <a:effectRef idx="0">
+            <a:schemeClr val="accent1"/>
+          </a:effectRef>
+          <a:fontRef idx="minor">
+            <a:schemeClr val="lt1"/>
+          </a:fontRef>
+        </p:style>
+        <p:txBody>
+          <a:bodyPr rtlCol="0" anchor="ctr"/>
+          <a:lstStyle/>
+          <a:p>
+            <a:pPr algn="ctr"/>
+            <a:endParaRPr lang="es-PE"/>
+          </a:p>
+        </p:txBody>
+      </p:sp>
+      <p:sp>
+        <p:nvSpPr>
+          <p:cNvPr id="37" name="Rectángulo: esquinas redondeadas 36">
+            <a:extLst>
+              <a:ext uri="{FF2B5EF4-FFF2-40B4-BE49-F238E27FC236}">
+                <a16:creationId xmlns:a16="http://schemas.microsoft.com/office/drawing/2014/main" id="{BA32ED83-76AA-0A5A-B186-996F4E76C680}"/>
+              </a:ext>
+            </a:extLst>
+          </p:cNvPr>
+          <p:cNvSpPr/>
+          <p:nvPr/>
+        </p:nvSpPr>
+        <p:spPr>
+          <a:xfrm>
+            <a:off x="4672087" y="3559125"/>
+            <a:ext cx="253218" cy="450167"/>
+          </a:xfrm>
+          <a:prstGeom prst="roundRect">
+            <a:avLst/>
+          </a:prstGeom>
+          <a:noFill/>
+          <a:ln w="57150">
+            <a:solidFill>
+              <a:schemeClr val="tx1"/>
+            </a:solidFill>
+          </a:ln>
+        </p:spPr>
+        <p:style>
+          <a:lnRef idx="2">
+            <a:schemeClr val="accent1">
+              <a:shade val="50000"/>
+            </a:schemeClr>
+          </a:lnRef>
+          <a:fillRef idx="1">
+            <a:schemeClr val="accent1"/>
+          </a:fillRef>
+          <a:effectRef idx="0">
+            <a:schemeClr val="accent1"/>
+          </a:effectRef>
+          <a:fontRef idx="minor">
+            <a:schemeClr val="lt1"/>
+          </a:fontRef>
+        </p:style>
+        <p:txBody>
+          <a:bodyPr rtlCol="0" anchor="ctr"/>
+          <a:lstStyle/>
+          <a:p>
+            <a:pPr algn="ctr"/>
+            <a:endParaRPr lang="es-PE"/>
+          </a:p>
+        </p:txBody>
+      </p:sp>
+      <p:sp>
+        <p:nvSpPr>
+          <p:cNvPr id="38" name="Rectángulo: esquinas redondeadas 37">
+            <a:extLst>
+              <a:ext uri="{FF2B5EF4-FFF2-40B4-BE49-F238E27FC236}">
+                <a16:creationId xmlns:a16="http://schemas.microsoft.com/office/drawing/2014/main" id="{01492122-7312-A9C4-F80B-4E6D73F4F7AC}"/>
+              </a:ext>
+            </a:extLst>
+          </p:cNvPr>
+          <p:cNvSpPr/>
+          <p:nvPr/>
+        </p:nvSpPr>
+        <p:spPr>
+          <a:xfrm>
+            <a:off x="5539154" y="3559124"/>
+            <a:ext cx="253218" cy="450167"/>
+          </a:xfrm>
+          <a:prstGeom prst="roundRect">
+            <a:avLst/>
+          </a:prstGeom>
+          <a:noFill/>
+          <a:ln w="57150">
+            <a:solidFill>
+              <a:schemeClr val="tx1"/>
+            </a:solidFill>
+          </a:ln>
+        </p:spPr>
+        <p:style>
+          <a:lnRef idx="2">
+            <a:schemeClr val="accent1">
+              <a:shade val="50000"/>
+            </a:schemeClr>
+          </a:lnRef>
+          <a:fillRef idx="1">
+            <a:schemeClr val="accent1"/>
+          </a:fillRef>
+          <a:effectRef idx="0">
+            <a:schemeClr val="accent1"/>
+          </a:effectRef>
+          <a:fontRef idx="minor">
+            <a:schemeClr val="lt1"/>
+          </a:fontRef>
+        </p:style>
+        <p:txBody>
+          <a:bodyPr rtlCol="0" anchor="ctr"/>
+          <a:lstStyle/>
+          <a:p>
+            <a:pPr algn="ctr"/>
+            <a:endParaRPr lang="es-PE"/>
+          </a:p>
+        </p:txBody>
+      </p:sp>
+      <p:sp>
+        <p:nvSpPr>
+          <p:cNvPr id="39" name="Rectángulo: esquinas redondeadas 38">
+            <a:extLst>
+              <a:ext uri="{FF2B5EF4-FFF2-40B4-BE49-F238E27FC236}">
+                <a16:creationId xmlns:a16="http://schemas.microsoft.com/office/drawing/2014/main" id="{1938D008-0773-08A1-D2B8-5016D239C951}"/>
+              </a:ext>
+            </a:extLst>
+          </p:cNvPr>
+          <p:cNvSpPr/>
+          <p:nvPr/>
+        </p:nvSpPr>
+        <p:spPr>
+          <a:xfrm>
+            <a:off x="6397282" y="3559124"/>
+            <a:ext cx="253218" cy="450167"/>
+          </a:xfrm>
+          <a:prstGeom prst="roundRect">
+            <a:avLst/>
+          </a:prstGeom>
+          <a:noFill/>
+          <a:ln w="57150">
+            <a:solidFill>
+              <a:schemeClr val="tx1"/>
+            </a:solidFill>
+          </a:ln>
+        </p:spPr>
+        <p:style>
+          <a:lnRef idx="2">
+            <a:schemeClr val="accent1">
+              <a:shade val="50000"/>
+            </a:schemeClr>
+          </a:lnRef>
+          <a:fillRef idx="1">
+            <a:schemeClr val="accent1"/>
+          </a:fillRef>
+          <a:effectRef idx="0">
+            <a:schemeClr val="accent1"/>
+          </a:effectRef>
+          <a:fontRef idx="minor">
+            <a:schemeClr val="lt1"/>
+          </a:fontRef>
+        </p:style>
+        <p:txBody>
+          <a:bodyPr rtlCol="0" anchor="ctr"/>
+          <a:lstStyle/>
+          <a:p>
+            <a:pPr algn="ctr"/>
+            <a:endParaRPr lang="es-PE"/>
+          </a:p>
+        </p:txBody>
+      </p:sp>
+      <p:sp>
+        <p:nvSpPr>
+          <p:cNvPr id="40" name="Rectángulo: esquinas redondeadas 39">
+            <a:extLst>
+              <a:ext uri="{FF2B5EF4-FFF2-40B4-BE49-F238E27FC236}">
+                <a16:creationId xmlns:a16="http://schemas.microsoft.com/office/drawing/2014/main" id="{C78FFB2C-3F75-1B64-84DD-B79E8BC7D22B}"/>
+              </a:ext>
+            </a:extLst>
+          </p:cNvPr>
+          <p:cNvSpPr/>
+          <p:nvPr/>
+        </p:nvSpPr>
+        <p:spPr>
+          <a:xfrm>
+            <a:off x="5968218" y="3559123"/>
+            <a:ext cx="253218" cy="450167"/>
+          </a:xfrm>
+          <a:prstGeom prst="roundRect">
+            <a:avLst/>
+          </a:prstGeom>
+          <a:noFill/>
+          <a:ln w="57150">
+            <a:solidFill>
+              <a:schemeClr val="tx1"/>
+            </a:solidFill>
+          </a:ln>
+        </p:spPr>
+        <p:style>
+          <a:lnRef idx="2">
+            <a:schemeClr val="accent1">
+              <a:shade val="50000"/>
+            </a:schemeClr>
+          </a:lnRef>
+          <a:fillRef idx="1">
+            <a:schemeClr val="accent1"/>
+          </a:fillRef>
+          <a:effectRef idx="0">
+            <a:schemeClr val="accent1"/>
+          </a:effectRef>
+          <a:fontRef idx="minor">
+            <a:schemeClr val="lt1"/>
+          </a:fontRef>
+        </p:style>
+        <p:txBody>
+          <a:bodyPr rtlCol="0" anchor="ctr"/>
+          <a:lstStyle/>
+          <a:p>
+            <a:pPr algn="ctr"/>
+            <a:endParaRPr lang="es-PE"/>
+          </a:p>
+        </p:txBody>
+      </p:sp>
+    </p:spTree>
+    <p:extLst>
+      <p:ext uri="{BB962C8B-B14F-4D97-AF65-F5344CB8AC3E}">
+        <p14:creationId xmlns:p14="http://schemas.microsoft.com/office/powerpoint/2010/main" val="3619022389"/>
+      </p:ext>
+    </p:extLst>
+  </p:cSld>
+  <p:clrMapOvr>
+    <a:masterClrMapping/>
+  </p:clrMapOvr>
+</p:sld>
+</file>
+
 <file path=ppt/theme/theme1.xml><?xml version="1.0" encoding="utf-8"?>
 <a:theme xmlns:a="http://schemas.openxmlformats.org/drawingml/2006/main" name="Tema de Office">
   <a:themeElements>

</xml_diff>

<commit_message>
Se agrego el primer slider de imagenes del sintetizador :)
</commit_message>
<xml_diff>
--- a/Recursos.pptx
+++ b/Recursos.pptx
@@ -9,6 +9,7 @@
     <p:sldId id="257" r:id="rId3"/>
     <p:sldId id="258" r:id="rId4"/>
     <p:sldId id="259" r:id="rId5"/>
+    <p:sldId id="260" r:id="rId6"/>
   </p:sldIdLst>
   <p:sldSz cx="12192000" cy="6858000"/>
   <p:notesSz cx="6858000" cy="9144000"/>
@@ -276,7 +277,7 @@
           <a:p>
             <a:fld id="{5C595ADE-D6CE-4376-A575-4C72F21EB491}" type="datetimeFigureOut">
               <a:rPr lang="es-PE" smtClean="0"/>
-              <a:t>4/10/2022</a:t>
+              <a:t>24/12/2022</a:t>
             </a:fld>
             <a:endParaRPr lang="es-PE"/>
           </a:p>
@@ -476,7 +477,7 @@
           <a:p>
             <a:fld id="{5C595ADE-D6CE-4376-A575-4C72F21EB491}" type="datetimeFigureOut">
               <a:rPr lang="es-PE" smtClean="0"/>
-              <a:t>4/10/2022</a:t>
+              <a:t>24/12/2022</a:t>
             </a:fld>
             <a:endParaRPr lang="es-PE"/>
           </a:p>
@@ -686,7 +687,7 @@
           <a:p>
             <a:fld id="{5C595ADE-D6CE-4376-A575-4C72F21EB491}" type="datetimeFigureOut">
               <a:rPr lang="es-PE" smtClean="0"/>
-              <a:t>4/10/2022</a:t>
+              <a:t>24/12/2022</a:t>
             </a:fld>
             <a:endParaRPr lang="es-PE"/>
           </a:p>
@@ -886,7 +887,7 @@
           <a:p>
             <a:fld id="{5C595ADE-D6CE-4376-A575-4C72F21EB491}" type="datetimeFigureOut">
               <a:rPr lang="es-PE" smtClean="0"/>
-              <a:t>4/10/2022</a:t>
+              <a:t>24/12/2022</a:t>
             </a:fld>
             <a:endParaRPr lang="es-PE"/>
           </a:p>
@@ -1162,7 +1163,7 @@
           <a:p>
             <a:fld id="{5C595ADE-D6CE-4376-A575-4C72F21EB491}" type="datetimeFigureOut">
               <a:rPr lang="es-PE" smtClean="0"/>
-              <a:t>4/10/2022</a:t>
+              <a:t>24/12/2022</a:t>
             </a:fld>
             <a:endParaRPr lang="es-PE"/>
           </a:p>
@@ -1430,7 +1431,7 @@
           <a:p>
             <a:fld id="{5C595ADE-D6CE-4376-A575-4C72F21EB491}" type="datetimeFigureOut">
               <a:rPr lang="es-PE" smtClean="0"/>
-              <a:t>4/10/2022</a:t>
+              <a:t>24/12/2022</a:t>
             </a:fld>
             <a:endParaRPr lang="es-PE"/>
           </a:p>
@@ -1845,7 +1846,7 @@
           <a:p>
             <a:fld id="{5C595ADE-D6CE-4376-A575-4C72F21EB491}" type="datetimeFigureOut">
               <a:rPr lang="es-PE" smtClean="0"/>
-              <a:t>4/10/2022</a:t>
+              <a:t>24/12/2022</a:t>
             </a:fld>
             <a:endParaRPr lang="es-PE"/>
           </a:p>
@@ -1987,7 +1988,7 @@
           <a:p>
             <a:fld id="{5C595ADE-D6CE-4376-A575-4C72F21EB491}" type="datetimeFigureOut">
               <a:rPr lang="es-PE" smtClean="0"/>
-              <a:t>4/10/2022</a:t>
+              <a:t>24/12/2022</a:t>
             </a:fld>
             <a:endParaRPr lang="es-PE"/>
           </a:p>
@@ -2100,7 +2101,7 @@
           <a:p>
             <a:fld id="{5C595ADE-D6CE-4376-A575-4C72F21EB491}" type="datetimeFigureOut">
               <a:rPr lang="es-PE" smtClean="0"/>
-              <a:t>4/10/2022</a:t>
+              <a:t>24/12/2022</a:t>
             </a:fld>
             <a:endParaRPr lang="es-PE"/>
           </a:p>
@@ -2413,7 +2414,7 @@
           <a:p>
             <a:fld id="{5C595ADE-D6CE-4376-A575-4C72F21EB491}" type="datetimeFigureOut">
               <a:rPr lang="es-PE" smtClean="0"/>
-              <a:t>4/10/2022</a:t>
+              <a:t>24/12/2022</a:t>
             </a:fld>
             <a:endParaRPr lang="es-PE"/>
           </a:p>
@@ -2702,7 +2703,7 @@
           <a:p>
             <a:fld id="{5C595ADE-D6CE-4376-A575-4C72F21EB491}" type="datetimeFigureOut">
               <a:rPr lang="es-PE" smtClean="0"/>
-              <a:t>4/10/2022</a:t>
+              <a:t>24/12/2022</a:t>
             </a:fld>
             <a:endParaRPr lang="es-PE"/>
           </a:p>
@@ -2945,7 +2946,7 @@
           <a:p>
             <a:fld id="{5C595ADE-D6CE-4376-A575-4C72F21EB491}" type="datetimeFigureOut">
               <a:rPr lang="es-PE" smtClean="0"/>
-              <a:t>4/10/2022</a:t>
+              <a:t>24/12/2022</a:t>
             </a:fld>
             <a:endParaRPr lang="es-PE"/>
           </a:p>
@@ -6977,6 +6978,1113 @@
 </p:sld>
 </file>
 
+<file path=ppt/slides/slide5.xml><?xml version="1.0" encoding="utf-8"?>
+<p:sld xmlns:a="http://schemas.openxmlformats.org/drawingml/2006/main" xmlns:r="http://schemas.openxmlformats.org/officeDocument/2006/relationships" xmlns:p="http://schemas.openxmlformats.org/presentationml/2006/main">
+  <p:cSld>
+    <p:spTree>
+      <p:nvGrpSpPr>
+        <p:cNvPr id="1" name=""/>
+        <p:cNvGrpSpPr/>
+        <p:nvPr/>
+      </p:nvGrpSpPr>
+      <p:grpSpPr>
+        <a:xfrm>
+          <a:off x="0" y="0"/>
+          <a:ext cx="0" cy="0"/>
+          <a:chOff x="0" y="0"/>
+          <a:chExt cx="0" cy="0"/>
+        </a:xfrm>
+      </p:grpSpPr>
+      <p:pic>
+        <p:nvPicPr>
+          <p:cNvPr id="5" name="Imagen 4">
+            <a:extLst>
+              <a:ext uri="{FF2B5EF4-FFF2-40B4-BE49-F238E27FC236}">
+                <a16:creationId xmlns:a16="http://schemas.microsoft.com/office/drawing/2014/main" id="{0B8C810D-67CD-E6AA-8910-0CA4C4481B16}"/>
+              </a:ext>
+            </a:extLst>
+          </p:cNvPr>
+          <p:cNvPicPr>
+            <a:picLocks noChangeAspect="1"/>
+          </p:cNvPicPr>
+          <p:nvPr/>
+        </p:nvPicPr>
+        <p:blipFill>
+          <a:blip r:embed="rId2"/>
+          <a:stretch>
+            <a:fillRect/>
+          </a:stretch>
+        </p:blipFill>
+        <p:spPr>
+          <a:xfrm>
+            <a:off x="2521153" y="261652"/>
+            <a:ext cx="11823240" cy="6274902"/>
+          </a:xfrm>
+          <a:prstGeom prst="rect">
+            <a:avLst/>
+          </a:prstGeom>
+        </p:spPr>
+      </p:pic>
+      <p:sp>
+        <p:nvSpPr>
+          <p:cNvPr id="6" name="Rectángulo: esquinas redondeadas 5">
+            <a:extLst>
+              <a:ext uri="{FF2B5EF4-FFF2-40B4-BE49-F238E27FC236}">
+                <a16:creationId xmlns:a16="http://schemas.microsoft.com/office/drawing/2014/main" id="{65A0CA28-2D59-DC1F-0F59-A89454F49972}"/>
+              </a:ext>
+            </a:extLst>
+          </p:cNvPr>
+          <p:cNvSpPr/>
+          <p:nvPr/>
+        </p:nvSpPr>
+        <p:spPr>
+          <a:xfrm>
+            <a:off x="2405372" y="1983417"/>
+            <a:ext cx="1272300" cy="521959"/>
+          </a:xfrm>
+          <a:prstGeom prst="roundRect">
+            <a:avLst/>
+          </a:prstGeom>
+          <a:solidFill>
+            <a:srgbClr val="E5E5E5"/>
+          </a:solidFill>
+          <a:ln>
+            <a:solidFill>
+              <a:srgbClr val="A89E9D"/>
+            </a:solidFill>
+          </a:ln>
+        </p:spPr>
+        <p:style>
+          <a:lnRef idx="2">
+            <a:schemeClr val="accent1">
+              <a:shade val="50000"/>
+            </a:schemeClr>
+          </a:lnRef>
+          <a:fillRef idx="1">
+            <a:schemeClr val="accent1"/>
+          </a:fillRef>
+          <a:effectRef idx="0">
+            <a:schemeClr val="accent1"/>
+          </a:effectRef>
+          <a:fontRef idx="minor">
+            <a:schemeClr val="lt1"/>
+          </a:fontRef>
+        </p:style>
+        <p:txBody>
+          <a:bodyPr rtlCol="0" anchor="ctr"/>
+          <a:lstStyle/>
+          <a:p>
+            <a:pPr algn="ctr"/>
+            <a:endParaRPr lang="es-PE"/>
+          </a:p>
+        </p:txBody>
+      </p:sp>
+      <p:sp>
+        <p:nvSpPr>
+          <p:cNvPr id="7" name="Botón de acción: ir hacia atrás o anterior 6">
+            <a:hlinkClick r:id="" action="ppaction://hlinkshowjump?jump=previousslide" highlightClick="1"/>
+            <a:extLst>
+              <a:ext uri="{FF2B5EF4-FFF2-40B4-BE49-F238E27FC236}">
+                <a16:creationId xmlns:a16="http://schemas.microsoft.com/office/drawing/2014/main" id="{4B24F9F2-5C81-640E-547D-39CE7D06C394}"/>
+              </a:ext>
+            </a:extLst>
+          </p:cNvPr>
+          <p:cNvSpPr/>
+          <p:nvPr/>
+        </p:nvSpPr>
+        <p:spPr>
+          <a:xfrm>
+            <a:off x="2405372" y="1983718"/>
+            <a:ext cx="231563" cy="514936"/>
+          </a:xfrm>
+          <a:prstGeom prst="actionButtonBackPrevious">
+            <a:avLst/>
+          </a:prstGeom>
+          <a:noFill/>
+          <a:ln>
+            <a:solidFill>
+              <a:srgbClr val="A89E9D"/>
+            </a:solidFill>
+          </a:ln>
+        </p:spPr>
+        <p:style>
+          <a:lnRef idx="2">
+            <a:schemeClr val="accent1">
+              <a:shade val="50000"/>
+            </a:schemeClr>
+          </a:lnRef>
+          <a:fillRef idx="1">
+            <a:schemeClr val="accent1"/>
+          </a:fillRef>
+          <a:effectRef idx="0">
+            <a:schemeClr val="accent1"/>
+          </a:effectRef>
+          <a:fontRef idx="minor">
+            <a:schemeClr val="lt1"/>
+          </a:fontRef>
+        </p:style>
+        <p:txBody>
+          <a:bodyPr rtlCol="0" anchor="ctr"/>
+          <a:lstStyle/>
+          <a:p>
+            <a:pPr algn="ctr"/>
+            <a:endParaRPr lang="es-PE"/>
+          </a:p>
+        </p:txBody>
+      </p:sp>
+      <p:sp>
+        <p:nvSpPr>
+          <p:cNvPr id="8" name="Botón de acción: ir hacia atrás o anterior 7">
+            <a:hlinkClick r:id="" action="ppaction://hlinkshowjump?jump=previousslide" highlightClick="1"/>
+            <a:extLst>
+              <a:ext uri="{FF2B5EF4-FFF2-40B4-BE49-F238E27FC236}">
+                <a16:creationId xmlns:a16="http://schemas.microsoft.com/office/drawing/2014/main" id="{D840A9F8-5151-F1CF-1B70-953451EF87F5}"/>
+              </a:ext>
+            </a:extLst>
+          </p:cNvPr>
+          <p:cNvSpPr/>
+          <p:nvPr/>
+        </p:nvSpPr>
+        <p:spPr>
+          <a:xfrm flipH="1">
+            <a:off x="3530980" y="1990441"/>
+            <a:ext cx="231563" cy="514936"/>
+          </a:xfrm>
+          <a:prstGeom prst="actionButtonBackPrevious">
+            <a:avLst/>
+          </a:prstGeom>
+          <a:noFill/>
+          <a:ln>
+            <a:solidFill>
+              <a:srgbClr val="A89E9D"/>
+            </a:solidFill>
+          </a:ln>
+        </p:spPr>
+        <p:style>
+          <a:lnRef idx="2">
+            <a:schemeClr val="accent1">
+              <a:shade val="50000"/>
+            </a:schemeClr>
+          </a:lnRef>
+          <a:fillRef idx="1">
+            <a:schemeClr val="accent1"/>
+          </a:fillRef>
+          <a:effectRef idx="0">
+            <a:schemeClr val="accent1"/>
+          </a:effectRef>
+          <a:fontRef idx="minor">
+            <a:schemeClr val="lt1"/>
+          </a:fontRef>
+        </p:style>
+        <p:txBody>
+          <a:bodyPr rtlCol="0" anchor="ctr"/>
+          <a:lstStyle/>
+          <a:p>
+            <a:pPr algn="ctr"/>
+            <a:endParaRPr lang="es-PE"/>
+          </a:p>
+        </p:txBody>
+      </p:sp>
+      <p:pic>
+        <p:nvPicPr>
+          <p:cNvPr id="10" name="Imagen 9">
+            <a:extLst>
+              <a:ext uri="{FF2B5EF4-FFF2-40B4-BE49-F238E27FC236}">
+                <a16:creationId xmlns:a16="http://schemas.microsoft.com/office/drawing/2014/main" id="{D5359341-9735-E9EB-2CA3-95CD7D0A7F23}"/>
+              </a:ext>
+            </a:extLst>
+          </p:cNvPr>
+          <p:cNvPicPr>
+            <a:picLocks noChangeAspect="1"/>
+          </p:cNvPicPr>
+          <p:nvPr/>
+        </p:nvPicPr>
+        <p:blipFill>
+          <a:blip r:embed="rId3">
+            <a:extLst>
+              <a:ext uri="{28A0092B-C50C-407E-A947-70E740481C1C}">
+                <a14:useLocalDpi xmlns:a14="http://schemas.microsoft.com/office/drawing/2010/main" val="0"/>
+              </a:ext>
+            </a:extLst>
+          </a:blip>
+          <a:stretch>
+            <a:fillRect/>
+          </a:stretch>
+        </p:blipFill>
+        <p:spPr>
+          <a:xfrm>
+            <a:off x="9219382" y="2083492"/>
+            <a:ext cx="898196" cy="809013"/>
+          </a:xfrm>
+          <a:prstGeom prst="rect">
+            <a:avLst/>
+          </a:prstGeom>
+        </p:spPr>
+      </p:pic>
+      <p:pic>
+        <p:nvPicPr>
+          <p:cNvPr id="12" name="Imagen 11">
+            <a:extLst>
+              <a:ext uri="{FF2B5EF4-FFF2-40B4-BE49-F238E27FC236}">
+                <a16:creationId xmlns:a16="http://schemas.microsoft.com/office/drawing/2014/main" id="{E42B258A-9791-F7DF-2E18-C98450F3B1E6}"/>
+              </a:ext>
+            </a:extLst>
+          </p:cNvPr>
+          <p:cNvPicPr>
+            <a:picLocks noChangeAspect="1"/>
+          </p:cNvPicPr>
+          <p:nvPr/>
+        </p:nvPicPr>
+        <p:blipFill>
+          <a:blip r:embed="rId4">
+            <a:extLst>
+              <a:ext uri="{28A0092B-C50C-407E-A947-70E740481C1C}">
+                <a14:useLocalDpi xmlns:a14="http://schemas.microsoft.com/office/drawing/2010/main" val="0"/>
+              </a:ext>
+            </a:extLst>
+          </a:blip>
+          <a:stretch>
+            <a:fillRect/>
+          </a:stretch>
+        </p:blipFill>
+        <p:spPr>
+          <a:xfrm>
+            <a:off x="5529023" y="3399103"/>
+            <a:ext cx="1184856" cy="57332"/>
+          </a:xfrm>
+          <a:prstGeom prst="rect">
+            <a:avLst/>
+          </a:prstGeom>
+        </p:spPr>
+      </p:pic>
+      <p:pic>
+        <p:nvPicPr>
+          <p:cNvPr id="14" name="Imagen 13">
+            <a:extLst>
+              <a:ext uri="{FF2B5EF4-FFF2-40B4-BE49-F238E27FC236}">
+                <a16:creationId xmlns:a16="http://schemas.microsoft.com/office/drawing/2014/main" id="{1A63426E-0D80-6A06-CCF0-8EDD1A8E9671}"/>
+              </a:ext>
+            </a:extLst>
+          </p:cNvPr>
+          <p:cNvPicPr>
+            <a:picLocks noChangeAspect="1"/>
+          </p:cNvPicPr>
+          <p:nvPr/>
+        </p:nvPicPr>
+        <p:blipFill>
+          <a:blip r:embed="rId5">
+            <a:extLst>
+              <a:ext uri="{28A0092B-C50C-407E-A947-70E740481C1C}">
+                <a14:useLocalDpi xmlns:a14="http://schemas.microsoft.com/office/drawing/2010/main" val="0"/>
+              </a:ext>
+            </a:extLst>
+          </a:blip>
+          <a:stretch>
+            <a:fillRect/>
+          </a:stretch>
+        </p:blipFill>
+        <p:spPr>
+          <a:xfrm>
+            <a:off x="5379657" y="1795975"/>
+            <a:ext cx="312139" cy="216586"/>
+          </a:xfrm>
+          <a:prstGeom prst="rect">
+            <a:avLst/>
+          </a:prstGeom>
+        </p:spPr>
+      </p:pic>
+      <p:pic>
+        <p:nvPicPr>
+          <p:cNvPr id="16" name="Imagen 15">
+            <a:extLst>
+              <a:ext uri="{FF2B5EF4-FFF2-40B4-BE49-F238E27FC236}">
+                <a16:creationId xmlns:a16="http://schemas.microsoft.com/office/drawing/2014/main" id="{1FC68B0B-1151-87B5-CB75-4ACC65F6070D}"/>
+              </a:ext>
+            </a:extLst>
+          </p:cNvPr>
+          <p:cNvPicPr>
+            <a:picLocks noChangeAspect="1"/>
+          </p:cNvPicPr>
+          <p:nvPr/>
+        </p:nvPicPr>
+        <p:blipFill>
+          <a:blip r:embed="rId6">
+            <a:duotone>
+              <a:prstClr val="black"/>
+              <a:srgbClr val="A3A0A1">
+                <a:tint val="45000"/>
+                <a:satMod val="400000"/>
+              </a:srgbClr>
+            </a:duotone>
+            <a:extLst>
+              <a:ext uri="{28A0092B-C50C-407E-A947-70E740481C1C}">
+                <a14:useLocalDpi xmlns:a14="http://schemas.microsoft.com/office/drawing/2010/main" val="0"/>
+              </a:ext>
+            </a:extLst>
+          </a:blip>
+          <a:stretch>
+            <a:fillRect/>
+          </a:stretch>
+        </p:blipFill>
+        <p:spPr>
+          <a:xfrm>
+            <a:off x="3543983" y="1548978"/>
+            <a:ext cx="2884801" cy="1414102"/>
+          </a:xfrm>
+          <a:prstGeom prst="rect">
+            <a:avLst/>
+          </a:prstGeom>
+        </p:spPr>
+      </p:pic>
+      <p:pic>
+        <p:nvPicPr>
+          <p:cNvPr id="18" name="Imagen 17">
+            <a:extLst>
+              <a:ext uri="{FF2B5EF4-FFF2-40B4-BE49-F238E27FC236}">
+                <a16:creationId xmlns:a16="http://schemas.microsoft.com/office/drawing/2014/main" id="{7F880A01-E3CD-E8E9-6DBC-212CE0CFBD0F}"/>
+              </a:ext>
+            </a:extLst>
+          </p:cNvPr>
+          <p:cNvPicPr>
+            <a:picLocks noChangeAspect="1"/>
+          </p:cNvPicPr>
+          <p:nvPr/>
+        </p:nvPicPr>
+        <p:blipFill>
+          <a:blip r:embed="rId7">
+            <a:extLst>
+              <a:ext uri="{28A0092B-C50C-407E-A947-70E740481C1C}">
+                <a14:useLocalDpi xmlns:a14="http://schemas.microsoft.com/office/drawing/2010/main" val="0"/>
+              </a:ext>
+            </a:extLst>
+          </a:blip>
+          <a:stretch>
+            <a:fillRect/>
+          </a:stretch>
+        </p:blipFill>
+        <p:spPr>
+          <a:xfrm>
+            <a:off x="5173255" y="2175921"/>
+            <a:ext cx="242066" cy="159254"/>
+          </a:xfrm>
+          <a:prstGeom prst="rect">
+            <a:avLst/>
+          </a:prstGeom>
+        </p:spPr>
+      </p:pic>
+      <p:pic>
+        <p:nvPicPr>
+          <p:cNvPr id="20" name="Imagen 19">
+            <a:extLst>
+              <a:ext uri="{FF2B5EF4-FFF2-40B4-BE49-F238E27FC236}">
+                <a16:creationId xmlns:a16="http://schemas.microsoft.com/office/drawing/2014/main" id="{41E7D799-EF2C-807F-805D-AA3190241FB7}"/>
+              </a:ext>
+            </a:extLst>
+          </p:cNvPr>
+          <p:cNvPicPr>
+            <a:picLocks noChangeAspect="1"/>
+          </p:cNvPicPr>
+          <p:nvPr/>
+        </p:nvPicPr>
+        <p:blipFill>
+          <a:blip r:embed="rId8">
+            <a:extLst>
+              <a:ext uri="{28A0092B-C50C-407E-A947-70E740481C1C}">
+                <a14:useLocalDpi xmlns:a14="http://schemas.microsoft.com/office/drawing/2010/main" val="0"/>
+              </a:ext>
+            </a:extLst>
+          </a:blip>
+          <a:stretch>
+            <a:fillRect/>
+          </a:stretch>
+        </p:blipFill>
+        <p:spPr>
+          <a:xfrm>
+            <a:off x="4924419" y="1692334"/>
+            <a:ext cx="242067" cy="216586"/>
+          </a:xfrm>
+          <a:prstGeom prst="rect">
+            <a:avLst/>
+          </a:prstGeom>
+        </p:spPr>
+      </p:pic>
+      <p:pic>
+        <p:nvPicPr>
+          <p:cNvPr id="22" name="Imagen 21">
+            <a:extLst>
+              <a:ext uri="{FF2B5EF4-FFF2-40B4-BE49-F238E27FC236}">
+                <a16:creationId xmlns:a16="http://schemas.microsoft.com/office/drawing/2014/main" id="{9B535E1E-960E-59B9-F295-FDB2E8BD7B21}"/>
+              </a:ext>
+            </a:extLst>
+          </p:cNvPr>
+          <p:cNvPicPr>
+            <a:picLocks noChangeAspect="1"/>
+          </p:cNvPicPr>
+          <p:nvPr/>
+        </p:nvPicPr>
+        <p:blipFill>
+          <a:blip r:embed="rId9">
+            <a:extLst>
+              <a:ext uri="{28A0092B-C50C-407E-A947-70E740481C1C}">
+                <a14:useLocalDpi xmlns:a14="http://schemas.microsoft.com/office/drawing/2010/main" val="0"/>
+              </a:ext>
+            </a:extLst>
+          </a:blip>
+          <a:stretch>
+            <a:fillRect/>
+          </a:stretch>
+        </p:blipFill>
+        <p:spPr>
+          <a:xfrm>
+            <a:off x="5861283" y="2180492"/>
+            <a:ext cx="1388700" cy="573317"/>
+          </a:xfrm>
+          <a:prstGeom prst="rect">
+            <a:avLst/>
+          </a:prstGeom>
+        </p:spPr>
+      </p:pic>
+      <p:pic>
+        <p:nvPicPr>
+          <p:cNvPr id="24" name="Imagen 23">
+            <a:extLst>
+              <a:ext uri="{FF2B5EF4-FFF2-40B4-BE49-F238E27FC236}">
+                <a16:creationId xmlns:a16="http://schemas.microsoft.com/office/drawing/2014/main" id="{8623DF0F-6F36-1DBF-F967-8C65F04B6F1E}"/>
+              </a:ext>
+            </a:extLst>
+          </p:cNvPr>
+          <p:cNvPicPr>
+            <a:picLocks noChangeAspect="1"/>
+          </p:cNvPicPr>
+          <p:nvPr/>
+        </p:nvPicPr>
+        <p:blipFill>
+          <a:blip r:embed="rId10">
+            <a:extLst>
+              <a:ext uri="{28A0092B-C50C-407E-A947-70E740481C1C}">
+                <a14:useLocalDpi xmlns:a14="http://schemas.microsoft.com/office/drawing/2010/main" val="0"/>
+              </a:ext>
+            </a:extLst>
+          </a:blip>
+          <a:stretch>
+            <a:fillRect/>
+          </a:stretch>
+        </p:blipFill>
+        <p:spPr>
+          <a:xfrm>
+            <a:off x="7931573" y="3798615"/>
+            <a:ext cx="930047" cy="407692"/>
+          </a:xfrm>
+          <a:prstGeom prst="rect">
+            <a:avLst/>
+          </a:prstGeom>
+        </p:spPr>
+      </p:pic>
+      <p:pic>
+        <p:nvPicPr>
+          <p:cNvPr id="26" name="Imagen 25">
+            <a:extLst>
+              <a:ext uri="{FF2B5EF4-FFF2-40B4-BE49-F238E27FC236}">
+                <a16:creationId xmlns:a16="http://schemas.microsoft.com/office/drawing/2014/main" id="{AC83D928-61B9-6B34-D6E9-A5F48759A13D}"/>
+              </a:ext>
+            </a:extLst>
+          </p:cNvPr>
+          <p:cNvPicPr>
+            <a:picLocks noChangeAspect="1"/>
+          </p:cNvPicPr>
+          <p:nvPr/>
+        </p:nvPicPr>
+        <p:blipFill>
+          <a:blip r:embed="rId11">
+            <a:extLst>
+              <a:ext uri="{28A0092B-C50C-407E-A947-70E740481C1C}">
+                <a14:useLocalDpi xmlns:a14="http://schemas.microsoft.com/office/drawing/2010/main" val="0"/>
+              </a:ext>
+            </a:extLst>
+          </a:blip>
+          <a:stretch>
+            <a:fillRect/>
+          </a:stretch>
+        </p:blipFill>
+        <p:spPr>
+          <a:xfrm>
+            <a:off x="7466039" y="2572380"/>
+            <a:ext cx="879086" cy="426802"/>
+          </a:xfrm>
+          <a:prstGeom prst="rect">
+            <a:avLst/>
+          </a:prstGeom>
+        </p:spPr>
+      </p:pic>
+      <p:sp>
+        <p:nvSpPr>
+          <p:cNvPr id="2" name="Forma libre: forma 1">
+            <a:extLst>
+              <a:ext uri="{FF2B5EF4-FFF2-40B4-BE49-F238E27FC236}">
+                <a16:creationId xmlns:a16="http://schemas.microsoft.com/office/drawing/2014/main" id="{25CA73A0-22FD-56E6-4090-91B816C42382}"/>
+              </a:ext>
+            </a:extLst>
+          </p:cNvPr>
+          <p:cNvSpPr/>
+          <p:nvPr/>
+        </p:nvSpPr>
+        <p:spPr>
+          <a:xfrm>
+            <a:off x="398206" y="2561464"/>
+            <a:ext cx="1539620" cy="780354"/>
+          </a:xfrm>
+          <a:custGeom>
+            <a:avLst/>
+            <a:gdLst>
+              <a:gd name="connsiteX0" fmla="*/ 0 w 2053883"/>
+              <a:gd name="connsiteY0" fmla="*/ 1041009 h 1041009"/>
+              <a:gd name="connsiteX1" fmla="*/ 787791 w 2053883"/>
+              <a:gd name="connsiteY1" fmla="*/ 0 h 1041009"/>
+              <a:gd name="connsiteX2" fmla="*/ 1448972 w 2053883"/>
+              <a:gd name="connsiteY2" fmla="*/ 1026941 h 1041009"/>
+              <a:gd name="connsiteX3" fmla="*/ 2053883 w 2053883"/>
+              <a:gd name="connsiteY3" fmla="*/ 84406 h 1041009"/>
+            </a:gdLst>
+            <a:ahLst/>
+            <a:cxnLst>
+              <a:cxn ang="0">
+                <a:pos x="connsiteX0" y="connsiteY0"/>
+              </a:cxn>
+              <a:cxn ang="0">
+                <a:pos x="connsiteX1" y="connsiteY1"/>
+              </a:cxn>
+              <a:cxn ang="0">
+                <a:pos x="connsiteX2" y="connsiteY2"/>
+              </a:cxn>
+              <a:cxn ang="0">
+                <a:pos x="connsiteX3" y="connsiteY3"/>
+              </a:cxn>
+            </a:cxnLst>
+            <a:rect l="l" t="t" r="r" b="b"/>
+            <a:pathLst>
+              <a:path w="2053883" h="1041009">
+                <a:moveTo>
+                  <a:pt x="0" y="1041009"/>
+                </a:moveTo>
+                <a:lnTo>
+                  <a:pt x="787791" y="0"/>
+                </a:lnTo>
+                <a:lnTo>
+                  <a:pt x="1448972" y="1026941"/>
+                </a:lnTo>
+                <a:lnTo>
+                  <a:pt x="2053883" y="84406"/>
+                </a:lnTo>
+              </a:path>
+            </a:pathLst>
+          </a:custGeom>
+          <a:noFill/>
+          <a:ln w="76200">
+            <a:solidFill>
+              <a:srgbClr val="A5A1A1"/>
+            </a:solidFill>
+          </a:ln>
+        </p:spPr>
+        <p:style>
+          <a:lnRef idx="2">
+            <a:schemeClr val="accent1">
+              <a:shade val="50000"/>
+            </a:schemeClr>
+          </a:lnRef>
+          <a:fillRef idx="1">
+            <a:schemeClr val="accent1"/>
+          </a:fillRef>
+          <a:effectRef idx="0">
+            <a:schemeClr val="accent1"/>
+          </a:effectRef>
+          <a:fontRef idx="minor">
+            <a:schemeClr val="lt1"/>
+          </a:fontRef>
+        </p:style>
+        <p:txBody>
+          <a:bodyPr rtlCol="0" anchor="ctr"/>
+          <a:lstStyle/>
+          <a:p>
+            <a:pPr algn="ctr"/>
+            <a:endParaRPr lang="es-PE"/>
+          </a:p>
+        </p:txBody>
+      </p:sp>
+      <p:sp>
+        <p:nvSpPr>
+          <p:cNvPr id="3" name="Forma libre: forma 2">
+            <a:extLst>
+              <a:ext uri="{FF2B5EF4-FFF2-40B4-BE49-F238E27FC236}">
+                <a16:creationId xmlns:a16="http://schemas.microsoft.com/office/drawing/2014/main" id="{323E84F6-E9F2-0C14-4FFE-8517682CCF26}"/>
+              </a:ext>
+            </a:extLst>
+          </p:cNvPr>
+          <p:cNvSpPr/>
+          <p:nvPr/>
+        </p:nvSpPr>
+        <p:spPr>
+          <a:xfrm>
+            <a:off x="475275" y="3545251"/>
+            <a:ext cx="1539620" cy="840058"/>
+          </a:xfrm>
+          <a:custGeom>
+            <a:avLst/>
+            <a:gdLst>
+              <a:gd name="connsiteX0" fmla="*/ 0 w 2053883"/>
+              <a:gd name="connsiteY0" fmla="*/ 1041009 h 1041009"/>
+              <a:gd name="connsiteX1" fmla="*/ 787791 w 2053883"/>
+              <a:gd name="connsiteY1" fmla="*/ 0 h 1041009"/>
+              <a:gd name="connsiteX2" fmla="*/ 1448972 w 2053883"/>
+              <a:gd name="connsiteY2" fmla="*/ 1026941 h 1041009"/>
+              <a:gd name="connsiteX3" fmla="*/ 2053883 w 2053883"/>
+              <a:gd name="connsiteY3" fmla="*/ 84406 h 1041009"/>
+              <a:gd name="connsiteX0" fmla="*/ 19173 w 2073056"/>
+              <a:gd name="connsiteY0" fmla="*/ 1022242 h 1022242"/>
+              <a:gd name="connsiteX1" fmla="*/ 0 w 2073056"/>
+              <a:gd name="connsiteY1" fmla="*/ 0 h 1022242"/>
+              <a:gd name="connsiteX2" fmla="*/ 1468145 w 2073056"/>
+              <a:gd name="connsiteY2" fmla="*/ 1008174 h 1022242"/>
+              <a:gd name="connsiteX3" fmla="*/ 2073056 w 2073056"/>
+              <a:gd name="connsiteY3" fmla="*/ 65639 h 1022242"/>
+              <a:gd name="connsiteX0" fmla="*/ 19173 w 2073056"/>
+              <a:gd name="connsiteY0" fmla="*/ 1022242 h 1064473"/>
+              <a:gd name="connsiteX1" fmla="*/ 0 w 2073056"/>
+              <a:gd name="connsiteY1" fmla="*/ 0 h 1064473"/>
+              <a:gd name="connsiteX2" fmla="*/ 717481 w 2073056"/>
+              <a:gd name="connsiteY2" fmla="*/ 1064473 h 1064473"/>
+              <a:gd name="connsiteX3" fmla="*/ 2073056 w 2073056"/>
+              <a:gd name="connsiteY3" fmla="*/ 65639 h 1064473"/>
+              <a:gd name="connsiteX0" fmla="*/ 19173 w 717481"/>
+              <a:gd name="connsiteY0" fmla="*/ 1106736 h 1148967"/>
+              <a:gd name="connsiteX1" fmla="*/ 0 w 717481"/>
+              <a:gd name="connsiteY1" fmla="*/ 84494 h 1148967"/>
+              <a:gd name="connsiteX2" fmla="*/ 717481 w 717481"/>
+              <a:gd name="connsiteY2" fmla="*/ 1148967 h 1148967"/>
+              <a:gd name="connsiteX3" fmla="*/ 684329 w 717481"/>
+              <a:gd name="connsiteY3" fmla="*/ 0 h 1148967"/>
+              <a:gd name="connsiteX0" fmla="*/ 19173 w 998979"/>
+              <a:gd name="connsiteY0" fmla="*/ 1106736 h 1130201"/>
+              <a:gd name="connsiteX1" fmla="*/ 0 w 998979"/>
+              <a:gd name="connsiteY1" fmla="*/ 84494 h 1130201"/>
+              <a:gd name="connsiteX2" fmla="*/ 998979 w 998979"/>
+              <a:gd name="connsiteY2" fmla="*/ 1130201 h 1130201"/>
+              <a:gd name="connsiteX3" fmla="*/ 684329 w 998979"/>
+              <a:gd name="connsiteY3" fmla="*/ 0 h 1130201"/>
+              <a:gd name="connsiteX0" fmla="*/ 19173 w 998979"/>
+              <a:gd name="connsiteY0" fmla="*/ 1022242 h 1045707"/>
+              <a:gd name="connsiteX1" fmla="*/ 0 w 998979"/>
+              <a:gd name="connsiteY1" fmla="*/ 0 h 1045707"/>
+              <a:gd name="connsiteX2" fmla="*/ 998979 w 998979"/>
+              <a:gd name="connsiteY2" fmla="*/ 1045707 h 1045707"/>
+              <a:gd name="connsiteX3" fmla="*/ 965827 w 998979"/>
+              <a:gd name="connsiteY3" fmla="*/ 46872 h 1045707"/>
+              <a:gd name="connsiteX0" fmla="*/ 19173 w 1022127"/>
+              <a:gd name="connsiteY0" fmla="*/ 1069204 h 1092669"/>
+              <a:gd name="connsiteX1" fmla="*/ 0 w 1022127"/>
+              <a:gd name="connsiteY1" fmla="*/ 46962 h 1092669"/>
+              <a:gd name="connsiteX2" fmla="*/ 998979 w 1022127"/>
+              <a:gd name="connsiteY2" fmla="*/ 1092669 h 1092669"/>
+              <a:gd name="connsiteX3" fmla="*/ 1022127 w 1022127"/>
+              <a:gd name="connsiteY3" fmla="*/ 0 h 1092669"/>
+              <a:gd name="connsiteX0" fmla="*/ 19173 w 1024427"/>
+              <a:gd name="connsiteY0" fmla="*/ 1069204 h 1092669"/>
+              <a:gd name="connsiteX1" fmla="*/ 0 w 1024427"/>
+              <a:gd name="connsiteY1" fmla="*/ 46962 h 1092669"/>
+              <a:gd name="connsiteX2" fmla="*/ 998979 w 1024427"/>
+              <a:gd name="connsiteY2" fmla="*/ 1092669 h 1092669"/>
+              <a:gd name="connsiteX3" fmla="*/ 1024427 w 1024427"/>
+              <a:gd name="connsiteY3" fmla="*/ 300495 h 1092669"/>
+              <a:gd name="connsiteX4" fmla="*/ 1022127 w 1024427"/>
+              <a:gd name="connsiteY4" fmla="*/ 0 h 1092669"/>
+              <a:gd name="connsiteX0" fmla="*/ 19173 w 2185655"/>
+              <a:gd name="connsiteY0" fmla="*/ 1022242 h 1045707"/>
+              <a:gd name="connsiteX1" fmla="*/ 0 w 2185655"/>
+              <a:gd name="connsiteY1" fmla="*/ 0 h 1045707"/>
+              <a:gd name="connsiteX2" fmla="*/ 998979 w 2185655"/>
+              <a:gd name="connsiteY2" fmla="*/ 1045707 h 1045707"/>
+              <a:gd name="connsiteX3" fmla="*/ 1024427 w 2185655"/>
+              <a:gd name="connsiteY3" fmla="*/ 253533 h 1045707"/>
+              <a:gd name="connsiteX4" fmla="*/ 2185655 w 2185655"/>
+              <a:gd name="connsiteY4" fmla="*/ 1022735 h 1045707"/>
+              <a:gd name="connsiteX0" fmla="*/ 19173 w 2185655"/>
+              <a:gd name="connsiteY0" fmla="*/ 1022242 h 1045707"/>
+              <a:gd name="connsiteX1" fmla="*/ 0 w 2185655"/>
+              <a:gd name="connsiteY1" fmla="*/ 0 h 1045707"/>
+              <a:gd name="connsiteX2" fmla="*/ 998979 w 2185655"/>
+              <a:gd name="connsiteY2" fmla="*/ 1045707 h 1045707"/>
+              <a:gd name="connsiteX3" fmla="*/ 968127 w 2185655"/>
+              <a:gd name="connsiteY3" fmla="*/ 103401 h 1045707"/>
+              <a:gd name="connsiteX4" fmla="*/ 2185655 w 2185655"/>
+              <a:gd name="connsiteY4" fmla="*/ 1022735 h 1045707"/>
+              <a:gd name="connsiteX0" fmla="*/ 19173 w 2185655"/>
+              <a:gd name="connsiteY0" fmla="*/ 1022242 h 1045707"/>
+              <a:gd name="connsiteX1" fmla="*/ 0 w 2185655"/>
+              <a:gd name="connsiteY1" fmla="*/ 0 h 1045707"/>
+              <a:gd name="connsiteX2" fmla="*/ 998979 w 2185655"/>
+              <a:gd name="connsiteY2" fmla="*/ 1045707 h 1045707"/>
+              <a:gd name="connsiteX3" fmla="*/ 1008788 w 2185655"/>
+              <a:gd name="connsiteY3" fmla="*/ 22079 h 1045707"/>
+              <a:gd name="connsiteX4" fmla="*/ 2185655 w 2185655"/>
+              <a:gd name="connsiteY4" fmla="*/ 1022735 h 1045707"/>
+              <a:gd name="connsiteX0" fmla="*/ 19173 w 2185655"/>
+              <a:gd name="connsiteY0" fmla="*/ 1066821 h 1090286"/>
+              <a:gd name="connsiteX1" fmla="*/ 0 w 2185655"/>
+              <a:gd name="connsiteY1" fmla="*/ 44579 h 1090286"/>
+              <a:gd name="connsiteX2" fmla="*/ 998979 w 2185655"/>
+              <a:gd name="connsiteY2" fmla="*/ 1090286 h 1090286"/>
+              <a:gd name="connsiteX3" fmla="*/ 1008788 w 2185655"/>
+              <a:gd name="connsiteY3" fmla="*/ 5667 h 1090286"/>
+              <a:gd name="connsiteX4" fmla="*/ 2185655 w 2185655"/>
+              <a:gd name="connsiteY4" fmla="*/ 1067314 h 1090286"/>
+              <a:gd name="connsiteX0" fmla="*/ 19173 w 2185655"/>
+              <a:gd name="connsiteY0" fmla="*/ 1097190 h 1120655"/>
+              <a:gd name="connsiteX1" fmla="*/ 0 w 2185655"/>
+              <a:gd name="connsiteY1" fmla="*/ 74948 h 1120655"/>
+              <a:gd name="connsiteX2" fmla="*/ 998979 w 2185655"/>
+              <a:gd name="connsiteY2" fmla="*/ 1120655 h 1120655"/>
+              <a:gd name="connsiteX3" fmla="*/ 1008788 w 2185655"/>
+              <a:gd name="connsiteY3" fmla="*/ 5540 h 1120655"/>
+              <a:gd name="connsiteX4" fmla="*/ 2185655 w 2185655"/>
+              <a:gd name="connsiteY4" fmla="*/ 1097683 h 1120655"/>
+              <a:gd name="connsiteX0" fmla="*/ 19173 w 2185655"/>
+              <a:gd name="connsiteY0" fmla="*/ 1097190 h 1120655"/>
+              <a:gd name="connsiteX1" fmla="*/ 0 w 2185655"/>
+              <a:gd name="connsiteY1" fmla="*/ 74948 h 1120655"/>
+              <a:gd name="connsiteX2" fmla="*/ 998979 w 2185655"/>
+              <a:gd name="connsiteY2" fmla="*/ 1120655 h 1120655"/>
+              <a:gd name="connsiteX3" fmla="*/ 1008788 w 2185655"/>
+              <a:gd name="connsiteY3" fmla="*/ 5540 h 1120655"/>
+              <a:gd name="connsiteX4" fmla="*/ 2185655 w 2185655"/>
+              <a:gd name="connsiteY4" fmla="*/ 1097683 h 1120655"/>
+            </a:gdLst>
+            <a:ahLst/>
+            <a:cxnLst>
+              <a:cxn ang="0">
+                <a:pos x="connsiteX0" y="connsiteY0"/>
+              </a:cxn>
+              <a:cxn ang="0">
+                <a:pos x="connsiteX1" y="connsiteY1"/>
+              </a:cxn>
+              <a:cxn ang="0">
+                <a:pos x="connsiteX2" y="connsiteY2"/>
+              </a:cxn>
+              <a:cxn ang="0">
+                <a:pos x="connsiteX3" y="connsiteY3"/>
+              </a:cxn>
+              <a:cxn ang="0">
+                <a:pos x="connsiteX4" y="connsiteY4"/>
+              </a:cxn>
+            </a:cxnLst>
+            <a:rect l="l" t="t" r="r" b="b"/>
+            <a:pathLst>
+              <a:path w="2185655" h="1120655">
+                <a:moveTo>
+                  <a:pt x="19173" y="1097190"/>
+                </a:moveTo>
+                <a:lnTo>
+                  <a:pt x="0" y="74948"/>
+                </a:lnTo>
+                <a:lnTo>
+                  <a:pt x="998979" y="1120655"/>
+                </a:lnTo>
+                <a:cubicBezTo>
+                  <a:pt x="1002249" y="779446"/>
+                  <a:pt x="1005518" y="346749"/>
+                  <a:pt x="1008788" y="5540"/>
+                </a:cubicBezTo>
+                <a:cubicBezTo>
+                  <a:pt x="1008021" y="-94625"/>
+                  <a:pt x="2186422" y="1197848"/>
+                  <a:pt x="2185655" y="1097683"/>
+                </a:cubicBezTo>
+              </a:path>
+            </a:pathLst>
+          </a:custGeom>
+          <a:noFill/>
+          <a:ln w="76200">
+            <a:solidFill>
+              <a:srgbClr val="A5A1A1"/>
+            </a:solidFill>
+          </a:ln>
+        </p:spPr>
+        <p:style>
+          <a:lnRef idx="2">
+            <a:schemeClr val="accent1">
+              <a:shade val="50000"/>
+            </a:schemeClr>
+          </a:lnRef>
+          <a:fillRef idx="1">
+            <a:schemeClr val="accent1"/>
+          </a:fillRef>
+          <a:effectRef idx="0">
+            <a:schemeClr val="accent1"/>
+          </a:effectRef>
+          <a:fontRef idx="minor">
+            <a:schemeClr val="lt1"/>
+          </a:fontRef>
+        </p:style>
+        <p:txBody>
+          <a:bodyPr rtlCol="0" anchor="ctr"/>
+          <a:lstStyle/>
+          <a:p>
+            <a:pPr algn="ctr"/>
+            <a:endParaRPr lang="es-PE"/>
+          </a:p>
+        </p:txBody>
+      </p:sp>
+      <p:sp>
+        <p:nvSpPr>
+          <p:cNvPr id="9" name="Forma libre: forma 8">
+            <a:extLst>
+              <a:ext uri="{FF2B5EF4-FFF2-40B4-BE49-F238E27FC236}">
+                <a16:creationId xmlns:a16="http://schemas.microsoft.com/office/drawing/2014/main" id="{EA7E6E3A-9F42-C857-F57E-CD38E412C291}"/>
+              </a:ext>
+            </a:extLst>
+          </p:cNvPr>
+          <p:cNvSpPr/>
+          <p:nvPr/>
+        </p:nvSpPr>
+        <p:spPr>
+          <a:xfrm>
+            <a:off x="398206" y="4737926"/>
+            <a:ext cx="1539620" cy="840057"/>
+          </a:xfrm>
+          <a:custGeom>
+            <a:avLst/>
+            <a:gdLst>
+              <a:gd name="connsiteX0" fmla="*/ 0 w 1511300"/>
+              <a:gd name="connsiteY0" fmla="*/ 571602 h 571602"/>
+              <a:gd name="connsiteX1" fmla="*/ 342900 w 1511300"/>
+              <a:gd name="connsiteY1" fmla="*/ 102 h 571602"/>
+              <a:gd name="connsiteX2" fmla="*/ 774700 w 1511300"/>
+              <a:gd name="connsiteY2" fmla="*/ 520802 h 571602"/>
+              <a:gd name="connsiteX3" fmla="*/ 1104900 w 1511300"/>
+              <a:gd name="connsiteY3" fmla="*/ 50902 h 571602"/>
+              <a:gd name="connsiteX4" fmla="*/ 1511300 w 1511300"/>
+              <a:gd name="connsiteY4" fmla="*/ 558902 h 571602"/>
+              <a:gd name="connsiteX0" fmla="*/ 0 w 1511300"/>
+              <a:gd name="connsiteY0" fmla="*/ 577906 h 577906"/>
+              <a:gd name="connsiteX1" fmla="*/ 342900 w 1511300"/>
+              <a:gd name="connsiteY1" fmla="*/ 6406 h 577906"/>
+              <a:gd name="connsiteX2" fmla="*/ 774700 w 1511300"/>
+              <a:gd name="connsiteY2" fmla="*/ 527106 h 577906"/>
+              <a:gd name="connsiteX3" fmla="*/ 1147763 w 1511300"/>
+              <a:gd name="connsiteY3" fmla="*/ 56 h 577906"/>
+              <a:gd name="connsiteX4" fmla="*/ 1511300 w 1511300"/>
+              <a:gd name="connsiteY4" fmla="*/ 565206 h 577906"/>
+              <a:gd name="connsiteX0" fmla="*/ 0 w 1511300"/>
+              <a:gd name="connsiteY0" fmla="*/ 577902 h 577902"/>
+              <a:gd name="connsiteX1" fmla="*/ 342900 w 1511300"/>
+              <a:gd name="connsiteY1" fmla="*/ 6402 h 577902"/>
+              <a:gd name="connsiteX2" fmla="*/ 760413 w 1511300"/>
+              <a:gd name="connsiteY2" fmla="*/ 574727 h 577902"/>
+              <a:gd name="connsiteX3" fmla="*/ 1147763 w 1511300"/>
+              <a:gd name="connsiteY3" fmla="*/ 52 h 577902"/>
+              <a:gd name="connsiteX4" fmla="*/ 1511300 w 1511300"/>
+              <a:gd name="connsiteY4" fmla="*/ 565202 h 577902"/>
+              <a:gd name="connsiteX0" fmla="*/ 0 w 1147763"/>
+              <a:gd name="connsiteY0" fmla="*/ 577902 h 577902"/>
+              <a:gd name="connsiteX1" fmla="*/ 342900 w 1147763"/>
+              <a:gd name="connsiteY1" fmla="*/ 6402 h 577902"/>
+              <a:gd name="connsiteX2" fmla="*/ 760413 w 1147763"/>
+              <a:gd name="connsiteY2" fmla="*/ 574727 h 577902"/>
+              <a:gd name="connsiteX3" fmla="*/ 1147763 w 1147763"/>
+              <a:gd name="connsiteY3" fmla="*/ 52 h 577902"/>
+            </a:gdLst>
+            <a:ahLst/>
+            <a:cxnLst>
+              <a:cxn ang="0">
+                <a:pos x="connsiteX0" y="connsiteY0"/>
+              </a:cxn>
+              <a:cxn ang="0">
+                <a:pos x="connsiteX1" y="connsiteY1"/>
+              </a:cxn>
+              <a:cxn ang="0">
+                <a:pos x="connsiteX2" y="connsiteY2"/>
+              </a:cxn>
+              <a:cxn ang="0">
+                <a:pos x="connsiteX3" y="connsiteY3"/>
+              </a:cxn>
+            </a:cxnLst>
+            <a:rect l="l" t="t" r="r" b="b"/>
+            <a:pathLst>
+              <a:path w="1147763" h="577902">
+                <a:moveTo>
+                  <a:pt x="0" y="577902"/>
+                </a:moveTo>
+                <a:cubicBezTo>
+                  <a:pt x="106891" y="296385"/>
+                  <a:pt x="216165" y="6931"/>
+                  <a:pt x="342900" y="6402"/>
+                </a:cubicBezTo>
+                <a:cubicBezTo>
+                  <a:pt x="469635" y="5873"/>
+                  <a:pt x="626269" y="575785"/>
+                  <a:pt x="760413" y="574727"/>
+                </a:cubicBezTo>
+                <a:cubicBezTo>
+                  <a:pt x="894557" y="573669"/>
+                  <a:pt x="1024996" y="-6298"/>
+                  <a:pt x="1147763" y="52"/>
+                </a:cubicBezTo>
+              </a:path>
+            </a:pathLst>
+          </a:custGeom>
+          <a:noFill/>
+          <a:ln w="76200">
+            <a:solidFill>
+              <a:srgbClr val="A5A1A1"/>
+            </a:solidFill>
+          </a:ln>
+        </p:spPr>
+        <p:style>
+          <a:lnRef idx="2">
+            <a:schemeClr val="accent1">
+              <a:shade val="50000"/>
+            </a:schemeClr>
+          </a:lnRef>
+          <a:fillRef idx="1">
+            <a:schemeClr val="accent1"/>
+          </a:fillRef>
+          <a:effectRef idx="0">
+            <a:schemeClr val="accent1"/>
+          </a:effectRef>
+          <a:fontRef idx="minor">
+            <a:schemeClr val="lt1"/>
+          </a:fontRef>
+        </p:style>
+        <p:txBody>
+          <a:bodyPr rtlCol="0" anchor="ctr"/>
+          <a:lstStyle/>
+          <a:p>
+            <a:pPr algn="ctr"/>
+            <a:endParaRPr lang="es-PE"/>
+          </a:p>
+        </p:txBody>
+      </p:sp>
+      <p:sp>
+        <p:nvSpPr>
+          <p:cNvPr id="11" name="Forma libre: forma 10">
+            <a:extLst>
+              <a:ext uri="{FF2B5EF4-FFF2-40B4-BE49-F238E27FC236}">
+                <a16:creationId xmlns:a16="http://schemas.microsoft.com/office/drawing/2014/main" id="{F87A149B-770B-0553-E712-44483245AAC9}"/>
+              </a:ext>
+            </a:extLst>
+          </p:cNvPr>
+          <p:cNvSpPr/>
+          <p:nvPr/>
+        </p:nvSpPr>
+        <p:spPr>
+          <a:xfrm>
+            <a:off x="475275" y="5824025"/>
+            <a:ext cx="1462551" cy="872197"/>
+          </a:xfrm>
+          <a:custGeom>
+            <a:avLst/>
+            <a:gdLst>
+              <a:gd name="connsiteX0" fmla="*/ 0 w 1420837"/>
+              <a:gd name="connsiteY0" fmla="*/ 872197 h 872197"/>
+              <a:gd name="connsiteX1" fmla="*/ 0 w 1420837"/>
+              <a:gd name="connsiteY1" fmla="*/ 14067 h 872197"/>
+              <a:gd name="connsiteX2" fmla="*/ 661182 w 1420837"/>
+              <a:gd name="connsiteY2" fmla="*/ 14067 h 872197"/>
+              <a:gd name="connsiteX3" fmla="*/ 661182 w 1420837"/>
+              <a:gd name="connsiteY3" fmla="*/ 872197 h 872197"/>
+              <a:gd name="connsiteX4" fmla="*/ 1420837 w 1420837"/>
+              <a:gd name="connsiteY4" fmla="*/ 872197 h 872197"/>
+              <a:gd name="connsiteX5" fmla="*/ 1420837 w 1420837"/>
+              <a:gd name="connsiteY5" fmla="*/ 0 h 872197"/>
+            </a:gdLst>
+            <a:ahLst/>
+            <a:cxnLst>
+              <a:cxn ang="0">
+                <a:pos x="connsiteX0" y="connsiteY0"/>
+              </a:cxn>
+              <a:cxn ang="0">
+                <a:pos x="connsiteX1" y="connsiteY1"/>
+              </a:cxn>
+              <a:cxn ang="0">
+                <a:pos x="connsiteX2" y="connsiteY2"/>
+              </a:cxn>
+              <a:cxn ang="0">
+                <a:pos x="connsiteX3" y="connsiteY3"/>
+              </a:cxn>
+              <a:cxn ang="0">
+                <a:pos x="connsiteX4" y="connsiteY4"/>
+              </a:cxn>
+              <a:cxn ang="0">
+                <a:pos x="connsiteX5" y="connsiteY5"/>
+              </a:cxn>
+            </a:cxnLst>
+            <a:rect l="l" t="t" r="r" b="b"/>
+            <a:pathLst>
+              <a:path w="1420837" h="872197">
+                <a:moveTo>
+                  <a:pt x="0" y="872197"/>
+                </a:moveTo>
+                <a:lnTo>
+                  <a:pt x="0" y="14067"/>
+                </a:lnTo>
+                <a:lnTo>
+                  <a:pt x="661182" y="14067"/>
+                </a:lnTo>
+                <a:lnTo>
+                  <a:pt x="661182" y="872197"/>
+                </a:lnTo>
+                <a:lnTo>
+                  <a:pt x="1420837" y="872197"/>
+                </a:lnTo>
+                <a:lnTo>
+                  <a:pt x="1420837" y="0"/>
+                </a:lnTo>
+              </a:path>
+            </a:pathLst>
+          </a:custGeom>
+          <a:noFill/>
+          <a:ln w="76200">
+            <a:solidFill>
+              <a:srgbClr val="A5A1A1"/>
+            </a:solidFill>
+          </a:ln>
+        </p:spPr>
+        <p:style>
+          <a:lnRef idx="2">
+            <a:schemeClr val="accent1">
+              <a:shade val="50000"/>
+            </a:schemeClr>
+          </a:lnRef>
+          <a:fillRef idx="1">
+            <a:schemeClr val="accent1"/>
+          </a:fillRef>
+          <a:effectRef idx="0">
+            <a:schemeClr val="accent1"/>
+          </a:effectRef>
+          <a:fontRef idx="minor">
+            <a:schemeClr val="lt1"/>
+          </a:fontRef>
+        </p:style>
+        <p:txBody>
+          <a:bodyPr rtlCol="0" anchor="ctr"/>
+          <a:lstStyle/>
+          <a:p>
+            <a:pPr algn="ctr"/>
+            <a:endParaRPr lang="es-PE"/>
+          </a:p>
+        </p:txBody>
+      </p:sp>
+    </p:spTree>
+    <p:extLst>
+      <p:ext uri="{BB962C8B-B14F-4D97-AF65-F5344CB8AC3E}">
+        <p14:creationId xmlns:p14="http://schemas.microsoft.com/office/powerpoint/2010/main" val="379802552"/>
+      </p:ext>
+    </p:extLst>
+  </p:cSld>
+  <p:clrMapOvr>
+    <a:masterClrMapping/>
+  </p:clrMapOvr>
+</p:sld>
+</file>
+
 <file path=ppt/theme/theme1.xml><?xml version="1.0" encoding="utf-8"?>
 <a:theme xmlns:a="http://schemas.openxmlformats.org/drawingml/2006/main" name="Tema de Office">
   <a:themeElements>

</xml_diff>

<commit_message>
Se añadieron todas las tarjetas de efectos mas sus colores y sombras ;v
</commit_message>
<xml_diff>
--- a/Recursos.pptx
+++ b/Recursos.pptx
@@ -10,6 +10,7 @@
     <p:sldId id="258" r:id="rId4"/>
     <p:sldId id="259" r:id="rId5"/>
     <p:sldId id="260" r:id="rId6"/>
+    <p:sldId id="261" r:id="rId7"/>
   </p:sldIdLst>
   <p:sldSz cx="12192000" cy="6858000"/>
   <p:notesSz cx="6858000" cy="9144000"/>
@@ -277,7 +278,7 @@
           <a:p>
             <a:fld id="{5C595ADE-D6CE-4376-A575-4C72F21EB491}" type="datetimeFigureOut">
               <a:rPr lang="es-PE" smtClean="0"/>
-              <a:t>24/12/2022</a:t>
+              <a:t>25/12/2022</a:t>
             </a:fld>
             <a:endParaRPr lang="es-PE"/>
           </a:p>
@@ -477,7 +478,7 @@
           <a:p>
             <a:fld id="{5C595ADE-D6CE-4376-A575-4C72F21EB491}" type="datetimeFigureOut">
               <a:rPr lang="es-PE" smtClean="0"/>
-              <a:t>24/12/2022</a:t>
+              <a:t>25/12/2022</a:t>
             </a:fld>
             <a:endParaRPr lang="es-PE"/>
           </a:p>
@@ -687,7 +688,7 @@
           <a:p>
             <a:fld id="{5C595ADE-D6CE-4376-A575-4C72F21EB491}" type="datetimeFigureOut">
               <a:rPr lang="es-PE" smtClean="0"/>
-              <a:t>24/12/2022</a:t>
+              <a:t>25/12/2022</a:t>
             </a:fld>
             <a:endParaRPr lang="es-PE"/>
           </a:p>
@@ -887,7 +888,7 @@
           <a:p>
             <a:fld id="{5C595ADE-D6CE-4376-A575-4C72F21EB491}" type="datetimeFigureOut">
               <a:rPr lang="es-PE" smtClean="0"/>
-              <a:t>24/12/2022</a:t>
+              <a:t>25/12/2022</a:t>
             </a:fld>
             <a:endParaRPr lang="es-PE"/>
           </a:p>
@@ -1163,7 +1164,7 @@
           <a:p>
             <a:fld id="{5C595ADE-D6CE-4376-A575-4C72F21EB491}" type="datetimeFigureOut">
               <a:rPr lang="es-PE" smtClean="0"/>
-              <a:t>24/12/2022</a:t>
+              <a:t>25/12/2022</a:t>
             </a:fld>
             <a:endParaRPr lang="es-PE"/>
           </a:p>
@@ -1431,7 +1432,7 @@
           <a:p>
             <a:fld id="{5C595ADE-D6CE-4376-A575-4C72F21EB491}" type="datetimeFigureOut">
               <a:rPr lang="es-PE" smtClean="0"/>
-              <a:t>24/12/2022</a:t>
+              <a:t>25/12/2022</a:t>
             </a:fld>
             <a:endParaRPr lang="es-PE"/>
           </a:p>
@@ -1846,7 +1847,7 @@
           <a:p>
             <a:fld id="{5C595ADE-D6CE-4376-A575-4C72F21EB491}" type="datetimeFigureOut">
               <a:rPr lang="es-PE" smtClean="0"/>
-              <a:t>24/12/2022</a:t>
+              <a:t>25/12/2022</a:t>
             </a:fld>
             <a:endParaRPr lang="es-PE"/>
           </a:p>
@@ -1988,7 +1989,7 @@
           <a:p>
             <a:fld id="{5C595ADE-D6CE-4376-A575-4C72F21EB491}" type="datetimeFigureOut">
               <a:rPr lang="es-PE" smtClean="0"/>
-              <a:t>24/12/2022</a:t>
+              <a:t>25/12/2022</a:t>
             </a:fld>
             <a:endParaRPr lang="es-PE"/>
           </a:p>
@@ -2101,7 +2102,7 @@
           <a:p>
             <a:fld id="{5C595ADE-D6CE-4376-A575-4C72F21EB491}" type="datetimeFigureOut">
               <a:rPr lang="es-PE" smtClean="0"/>
-              <a:t>24/12/2022</a:t>
+              <a:t>25/12/2022</a:t>
             </a:fld>
             <a:endParaRPr lang="es-PE"/>
           </a:p>
@@ -2414,7 +2415,7 @@
           <a:p>
             <a:fld id="{5C595ADE-D6CE-4376-A575-4C72F21EB491}" type="datetimeFigureOut">
               <a:rPr lang="es-PE" smtClean="0"/>
-              <a:t>24/12/2022</a:t>
+              <a:t>25/12/2022</a:t>
             </a:fld>
             <a:endParaRPr lang="es-PE"/>
           </a:p>
@@ -2703,7 +2704,7 @@
           <a:p>
             <a:fld id="{5C595ADE-D6CE-4376-A575-4C72F21EB491}" type="datetimeFigureOut">
               <a:rPr lang="es-PE" smtClean="0"/>
-              <a:t>24/12/2022</a:t>
+              <a:t>25/12/2022</a:t>
             </a:fld>
             <a:endParaRPr lang="es-PE"/>
           </a:p>
@@ -2946,7 +2947,7 @@
           <a:p>
             <a:fld id="{5C595ADE-D6CE-4376-A575-4C72F21EB491}" type="datetimeFigureOut">
               <a:rPr lang="es-PE" smtClean="0"/>
-              <a:t>24/12/2022</a:t>
+              <a:t>25/12/2022</a:t>
             </a:fld>
             <a:endParaRPr lang="es-PE"/>
           </a:p>
@@ -8085,6 +8086,782 @@
 </p:sld>
 </file>
 
+<file path=ppt/slides/slide6.xml><?xml version="1.0" encoding="utf-8"?>
+<p:sld xmlns:a="http://schemas.openxmlformats.org/drawingml/2006/main" xmlns:r="http://schemas.openxmlformats.org/officeDocument/2006/relationships" xmlns:p="http://schemas.openxmlformats.org/presentationml/2006/main">
+  <p:cSld>
+    <p:spTree>
+      <p:nvGrpSpPr>
+        <p:cNvPr id="1" name=""/>
+        <p:cNvGrpSpPr/>
+        <p:nvPr/>
+      </p:nvGrpSpPr>
+      <p:grpSpPr>
+        <a:xfrm>
+          <a:off x="0" y="0"/>
+          <a:ext cx="0" cy="0"/>
+          <a:chOff x="0" y="0"/>
+          <a:chExt cx="0" cy="0"/>
+        </a:xfrm>
+      </p:grpSpPr>
+      <p:pic>
+        <p:nvPicPr>
+          <p:cNvPr id="5" name="Imagen 4">
+            <a:extLst>
+              <a:ext uri="{FF2B5EF4-FFF2-40B4-BE49-F238E27FC236}">
+                <a16:creationId xmlns:a16="http://schemas.microsoft.com/office/drawing/2014/main" id="{6188EA28-F7B2-99F0-984D-6CDA91346B8F}"/>
+              </a:ext>
+            </a:extLst>
+          </p:cNvPr>
+          <p:cNvPicPr>
+            <a:picLocks noChangeAspect="1"/>
+          </p:cNvPicPr>
+          <p:nvPr/>
+        </p:nvPicPr>
+        <p:blipFill>
+          <a:blip r:embed="rId2"/>
+          <a:stretch>
+            <a:fillRect/>
+          </a:stretch>
+        </p:blipFill>
+        <p:spPr>
+          <a:xfrm>
+            <a:off x="0" y="628859"/>
+            <a:ext cx="12192000" cy="5600281"/>
+          </a:xfrm>
+          <a:prstGeom prst="rect">
+            <a:avLst/>
+          </a:prstGeom>
+        </p:spPr>
+      </p:pic>
+      <p:sp>
+        <p:nvSpPr>
+          <p:cNvPr id="6" name="Rectángulo: esquinas redondeadas 5">
+            <a:extLst>
+              <a:ext uri="{FF2B5EF4-FFF2-40B4-BE49-F238E27FC236}">
+                <a16:creationId xmlns:a16="http://schemas.microsoft.com/office/drawing/2014/main" id="{97562B3C-2272-4D8B-43E0-8BA0F4167E60}"/>
+              </a:ext>
+            </a:extLst>
+          </p:cNvPr>
+          <p:cNvSpPr/>
+          <p:nvPr/>
+        </p:nvSpPr>
+        <p:spPr>
+          <a:xfrm>
+            <a:off x="1368937" y="2363353"/>
+            <a:ext cx="2105784" cy="1629339"/>
+          </a:xfrm>
+          <a:prstGeom prst="roundRect">
+            <a:avLst/>
+          </a:prstGeom>
+        </p:spPr>
+        <p:style>
+          <a:lnRef idx="2">
+            <a:schemeClr val="accent1">
+              <a:shade val="50000"/>
+            </a:schemeClr>
+          </a:lnRef>
+          <a:fillRef idx="1">
+            <a:schemeClr val="accent1"/>
+          </a:fillRef>
+          <a:effectRef idx="0">
+            <a:schemeClr val="accent1"/>
+          </a:effectRef>
+          <a:fontRef idx="minor">
+            <a:schemeClr val="lt1"/>
+          </a:fontRef>
+        </p:style>
+        <p:txBody>
+          <a:bodyPr rtlCol="0" anchor="ctr"/>
+          <a:lstStyle/>
+          <a:p>
+            <a:pPr algn="ctr"/>
+            <a:endParaRPr lang="es-PE"/>
+          </a:p>
+        </p:txBody>
+      </p:sp>
+      <p:sp>
+        <p:nvSpPr>
+          <p:cNvPr id="7" name="Rectángulo: esquinas redondeadas 6">
+            <a:extLst>
+              <a:ext uri="{FF2B5EF4-FFF2-40B4-BE49-F238E27FC236}">
+                <a16:creationId xmlns:a16="http://schemas.microsoft.com/office/drawing/2014/main" id="{57534299-8D65-5A01-6F66-7E31B58C87A8}"/>
+              </a:ext>
+            </a:extLst>
+          </p:cNvPr>
+          <p:cNvSpPr/>
+          <p:nvPr/>
+        </p:nvSpPr>
+        <p:spPr>
+          <a:xfrm>
+            <a:off x="3598316" y="4557931"/>
+            <a:ext cx="2188709" cy="1430655"/>
+          </a:xfrm>
+          <a:prstGeom prst="roundRect">
+            <a:avLst/>
+          </a:prstGeom>
+        </p:spPr>
+        <p:style>
+          <a:lnRef idx="2">
+            <a:schemeClr val="accent1">
+              <a:shade val="50000"/>
+            </a:schemeClr>
+          </a:lnRef>
+          <a:fillRef idx="1">
+            <a:schemeClr val="accent1"/>
+          </a:fillRef>
+          <a:effectRef idx="0">
+            <a:schemeClr val="accent1"/>
+          </a:effectRef>
+          <a:fontRef idx="minor">
+            <a:schemeClr val="lt1"/>
+          </a:fontRef>
+        </p:style>
+        <p:txBody>
+          <a:bodyPr rtlCol="0" anchor="ctr"/>
+          <a:lstStyle/>
+          <a:p>
+            <a:pPr algn="ctr"/>
+            <a:endParaRPr lang="es-PE"/>
+          </a:p>
+        </p:txBody>
+      </p:sp>
+      <p:sp>
+        <p:nvSpPr>
+          <p:cNvPr id="8" name="Rectángulo: esquinas redondeadas 7">
+            <a:extLst>
+              <a:ext uri="{FF2B5EF4-FFF2-40B4-BE49-F238E27FC236}">
+                <a16:creationId xmlns:a16="http://schemas.microsoft.com/office/drawing/2014/main" id="{939090F0-FD75-FC7E-2202-5D6744A0C43F}"/>
+              </a:ext>
+            </a:extLst>
+          </p:cNvPr>
+          <p:cNvSpPr/>
+          <p:nvPr/>
+        </p:nvSpPr>
+        <p:spPr>
+          <a:xfrm>
+            <a:off x="3600194" y="2363351"/>
+            <a:ext cx="2255323" cy="2033927"/>
+          </a:xfrm>
+          <a:prstGeom prst="roundRect">
+            <a:avLst/>
+          </a:prstGeom>
+        </p:spPr>
+        <p:style>
+          <a:lnRef idx="2">
+            <a:schemeClr val="accent1">
+              <a:shade val="50000"/>
+            </a:schemeClr>
+          </a:lnRef>
+          <a:fillRef idx="1">
+            <a:schemeClr val="accent1"/>
+          </a:fillRef>
+          <a:effectRef idx="0">
+            <a:schemeClr val="accent1"/>
+          </a:effectRef>
+          <a:fontRef idx="minor">
+            <a:schemeClr val="lt1"/>
+          </a:fontRef>
+        </p:style>
+        <p:txBody>
+          <a:bodyPr rtlCol="0" anchor="ctr"/>
+          <a:lstStyle/>
+          <a:p>
+            <a:pPr algn="ctr"/>
+            <a:endParaRPr lang="es-PE"/>
+          </a:p>
+        </p:txBody>
+      </p:sp>
+      <p:sp>
+        <p:nvSpPr>
+          <p:cNvPr id="10" name="Rectángulo 9">
+            <a:extLst>
+              <a:ext uri="{FF2B5EF4-FFF2-40B4-BE49-F238E27FC236}">
+                <a16:creationId xmlns:a16="http://schemas.microsoft.com/office/drawing/2014/main" id="{CBEF5FBB-6456-4683-4C32-1A4D928AE95A}"/>
+              </a:ext>
+            </a:extLst>
+          </p:cNvPr>
+          <p:cNvSpPr/>
+          <p:nvPr/>
+        </p:nvSpPr>
+        <p:spPr>
+          <a:xfrm>
+            <a:off x="1749557" y="2436125"/>
+            <a:ext cx="1383391" cy="369332"/>
+          </a:xfrm>
+          <a:prstGeom prst="rect">
+            <a:avLst/>
+          </a:prstGeom>
+          <a:noFill/>
+        </p:spPr>
+        <p:txBody>
+          <a:bodyPr wrap="none" lIns="91440" tIns="45720" rIns="91440" bIns="45720">
+            <a:spAutoFit/>
+          </a:bodyPr>
+          <a:lstStyle/>
+          <a:p>
+            <a:pPr algn="ctr"/>
+            <a:r>
+              <a:rPr lang="es-ES" b="0" cap="none" spc="0" dirty="0">
+                <a:ln w="0"/>
+                <a:solidFill>
+                  <a:schemeClr val="tx1"/>
+                </a:solidFill>
+                <a:effectLst>
+                  <a:outerShdw blurRad="38100" dist="19050" dir="2700000" algn="tl" rotWithShape="0">
+                    <a:schemeClr val="dk1">
+                      <a:alpha val="40000"/>
+                    </a:schemeClr>
+                  </a:outerShdw>
+                </a:effectLst>
+              </a:rPr>
+              <a:t>Amplificador</a:t>
+            </a:r>
+          </a:p>
+        </p:txBody>
+      </p:sp>
+      <p:sp>
+        <p:nvSpPr>
+          <p:cNvPr id="12" name="Rectángulo 11">
+            <a:extLst>
+              <a:ext uri="{FF2B5EF4-FFF2-40B4-BE49-F238E27FC236}">
+                <a16:creationId xmlns:a16="http://schemas.microsoft.com/office/drawing/2014/main" id="{FEC7459B-D1FB-A565-377F-B771F68C2207}"/>
+              </a:ext>
+            </a:extLst>
+          </p:cNvPr>
+          <p:cNvSpPr/>
+          <p:nvPr/>
+        </p:nvSpPr>
+        <p:spPr>
+          <a:xfrm>
+            <a:off x="4201204" y="2842836"/>
+            <a:ext cx="1053302" cy="584775"/>
+          </a:xfrm>
+          <a:prstGeom prst="rect">
+            <a:avLst/>
+          </a:prstGeom>
+          <a:noFill/>
+        </p:spPr>
+        <p:txBody>
+          <a:bodyPr wrap="none" lIns="91440" tIns="45720" rIns="91440" bIns="45720">
+            <a:spAutoFit/>
+          </a:bodyPr>
+          <a:lstStyle/>
+          <a:p>
+            <a:pPr algn="ctr"/>
+            <a:r>
+              <a:rPr lang="es-ES" sz="3200" b="0" cap="none" spc="0" dirty="0">
+                <a:ln w="0"/>
+                <a:solidFill>
+                  <a:schemeClr val="tx1"/>
+                </a:solidFill>
+                <a:effectLst>
+                  <a:outerShdw blurRad="38100" dist="19050" dir="2700000" algn="tl" rotWithShape="0">
+                    <a:schemeClr val="dk1">
+                      <a:alpha val="40000"/>
+                    </a:schemeClr>
+                  </a:outerShdw>
+                </a:effectLst>
+              </a:rPr>
+              <a:t>Filtro</a:t>
+            </a:r>
+          </a:p>
+        </p:txBody>
+      </p:sp>
+      <p:sp>
+        <p:nvSpPr>
+          <p:cNvPr id="13" name="Rectángulo: esquinas redondeadas 12">
+            <a:extLst>
+              <a:ext uri="{FF2B5EF4-FFF2-40B4-BE49-F238E27FC236}">
+                <a16:creationId xmlns:a16="http://schemas.microsoft.com/office/drawing/2014/main" id="{C52DB345-88FC-CFC1-9488-BC8C6117A50A}"/>
+              </a:ext>
+            </a:extLst>
+          </p:cNvPr>
+          <p:cNvSpPr/>
+          <p:nvPr/>
+        </p:nvSpPr>
+        <p:spPr>
+          <a:xfrm>
+            <a:off x="1333752" y="4164404"/>
+            <a:ext cx="2140970" cy="1824184"/>
+          </a:xfrm>
+          <a:prstGeom prst="roundRect">
+            <a:avLst/>
+          </a:prstGeom>
+        </p:spPr>
+        <p:style>
+          <a:lnRef idx="2">
+            <a:schemeClr val="accent1">
+              <a:shade val="50000"/>
+            </a:schemeClr>
+          </a:lnRef>
+          <a:fillRef idx="1">
+            <a:schemeClr val="accent1"/>
+          </a:fillRef>
+          <a:effectRef idx="0">
+            <a:schemeClr val="accent1"/>
+          </a:effectRef>
+          <a:fontRef idx="minor">
+            <a:schemeClr val="lt1"/>
+          </a:fontRef>
+        </p:style>
+        <p:txBody>
+          <a:bodyPr rtlCol="0" anchor="ctr"/>
+          <a:lstStyle/>
+          <a:p>
+            <a:pPr algn="ctr"/>
+            <a:endParaRPr lang="es-PE"/>
+          </a:p>
+        </p:txBody>
+      </p:sp>
+      <p:sp>
+        <p:nvSpPr>
+          <p:cNvPr id="17" name="Rectángulo: esquinas redondeadas 16">
+            <a:extLst>
+              <a:ext uri="{FF2B5EF4-FFF2-40B4-BE49-F238E27FC236}">
+                <a16:creationId xmlns:a16="http://schemas.microsoft.com/office/drawing/2014/main" id="{FE4D190D-775E-2CF0-4FC0-03676506CE8E}"/>
+              </a:ext>
+            </a:extLst>
+          </p:cNvPr>
+          <p:cNvSpPr/>
+          <p:nvPr/>
+        </p:nvSpPr>
+        <p:spPr>
+          <a:xfrm>
+            <a:off x="8212248" y="2436125"/>
+            <a:ext cx="1221030" cy="3552462"/>
+          </a:xfrm>
+          <a:prstGeom prst="roundRect">
+            <a:avLst/>
+          </a:prstGeom>
+        </p:spPr>
+        <p:style>
+          <a:lnRef idx="2">
+            <a:schemeClr val="accent1">
+              <a:shade val="50000"/>
+            </a:schemeClr>
+          </a:lnRef>
+          <a:fillRef idx="1">
+            <a:schemeClr val="accent1"/>
+          </a:fillRef>
+          <a:effectRef idx="0">
+            <a:schemeClr val="accent1"/>
+          </a:effectRef>
+          <a:fontRef idx="minor">
+            <a:schemeClr val="lt1"/>
+          </a:fontRef>
+        </p:style>
+        <p:txBody>
+          <a:bodyPr rtlCol="0" anchor="ctr"/>
+          <a:lstStyle/>
+          <a:p>
+            <a:pPr algn="ctr"/>
+            <a:endParaRPr lang="es-PE"/>
+          </a:p>
+        </p:txBody>
+      </p:sp>
+      <p:sp>
+        <p:nvSpPr>
+          <p:cNvPr id="24" name="Rectángulo: esquinas redondeadas 23">
+            <a:extLst>
+              <a:ext uri="{FF2B5EF4-FFF2-40B4-BE49-F238E27FC236}">
+                <a16:creationId xmlns:a16="http://schemas.microsoft.com/office/drawing/2014/main" id="{E72A675B-D720-39EC-34D1-65C5D0C6371A}"/>
+              </a:ext>
+            </a:extLst>
+          </p:cNvPr>
+          <p:cNvSpPr/>
+          <p:nvPr/>
+        </p:nvSpPr>
+        <p:spPr>
+          <a:xfrm>
+            <a:off x="5980990" y="2363353"/>
+            <a:ext cx="2105784" cy="1629339"/>
+          </a:xfrm>
+          <a:prstGeom prst="roundRect">
+            <a:avLst/>
+          </a:prstGeom>
+        </p:spPr>
+        <p:style>
+          <a:lnRef idx="2">
+            <a:schemeClr val="accent1">
+              <a:shade val="50000"/>
+            </a:schemeClr>
+          </a:lnRef>
+          <a:fillRef idx="1">
+            <a:schemeClr val="accent1"/>
+          </a:fillRef>
+          <a:effectRef idx="0">
+            <a:schemeClr val="accent1"/>
+          </a:effectRef>
+          <a:fontRef idx="minor">
+            <a:schemeClr val="lt1"/>
+          </a:fontRef>
+        </p:style>
+        <p:txBody>
+          <a:bodyPr rtlCol="0" anchor="ctr"/>
+          <a:lstStyle/>
+          <a:p>
+            <a:pPr algn="ctr"/>
+            <a:endParaRPr lang="es-PE"/>
+          </a:p>
+        </p:txBody>
+      </p:sp>
+      <p:sp>
+        <p:nvSpPr>
+          <p:cNvPr id="26" name="Rectángulo: esquinas redondeadas 25">
+            <a:extLst>
+              <a:ext uri="{FF2B5EF4-FFF2-40B4-BE49-F238E27FC236}">
+                <a16:creationId xmlns:a16="http://schemas.microsoft.com/office/drawing/2014/main" id="{37C19B80-906F-93E0-CF46-9503EF34B878}"/>
+              </a:ext>
+            </a:extLst>
+          </p:cNvPr>
+          <p:cNvSpPr/>
+          <p:nvPr/>
+        </p:nvSpPr>
+        <p:spPr>
+          <a:xfrm>
+            <a:off x="5945805" y="4164404"/>
+            <a:ext cx="2140970" cy="1824183"/>
+          </a:xfrm>
+          <a:prstGeom prst="roundRect">
+            <a:avLst/>
+          </a:prstGeom>
+        </p:spPr>
+        <p:style>
+          <a:lnRef idx="2">
+            <a:schemeClr val="accent1">
+              <a:shade val="50000"/>
+            </a:schemeClr>
+          </a:lnRef>
+          <a:fillRef idx="1">
+            <a:schemeClr val="accent1"/>
+          </a:fillRef>
+          <a:effectRef idx="0">
+            <a:schemeClr val="accent1"/>
+          </a:effectRef>
+          <a:fontRef idx="minor">
+            <a:schemeClr val="lt1"/>
+          </a:fontRef>
+        </p:style>
+        <p:txBody>
+          <a:bodyPr rtlCol="0" anchor="ctr"/>
+          <a:lstStyle/>
+          <a:p>
+            <a:pPr algn="ctr"/>
+            <a:endParaRPr lang="es-PE"/>
+          </a:p>
+        </p:txBody>
+      </p:sp>
+      <p:sp>
+        <p:nvSpPr>
+          <p:cNvPr id="27" name="Rectángulo 26">
+            <a:extLst>
+              <a:ext uri="{FF2B5EF4-FFF2-40B4-BE49-F238E27FC236}">
+                <a16:creationId xmlns:a16="http://schemas.microsoft.com/office/drawing/2014/main" id="{9156F210-DC3D-B12F-8F30-86CBFD7D4080}"/>
+              </a:ext>
+            </a:extLst>
+          </p:cNvPr>
+          <p:cNvSpPr/>
+          <p:nvPr/>
+        </p:nvSpPr>
+        <p:spPr>
+          <a:xfrm>
+            <a:off x="4042594" y="4980871"/>
+            <a:ext cx="1449691" cy="461665"/>
+          </a:xfrm>
+          <a:prstGeom prst="rect">
+            <a:avLst/>
+          </a:prstGeom>
+          <a:noFill/>
+        </p:spPr>
+        <p:txBody>
+          <a:bodyPr wrap="none" lIns="91440" tIns="45720" rIns="91440" bIns="45720">
+            <a:spAutoFit/>
+          </a:bodyPr>
+          <a:lstStyle/>
+          <a:p>
+            <a:pPr algn="ctr"/>
+            <a:r>
+              <a:rPr lang="es-ES" sz="2400" dirty="0">
+                <a:ln w="0"/>
+                <a:effectLst>
+                  <a:outerShdw blurRad="38100" dist="19050" dir="2700000" algn="tl" rotWithShape="0">
+                    <a:schemeClr val="dk1">
+                      <a:alpha val="40000"/>
+                    </a:schemeClr>
+                  </a:outerShdw>
+                </a:effectLst>
+              </a:rPr>
+              <a:t>Distorsión</a:t>
+            </a:r>
+            <a:endParaRPr lang="es-ES" sz="2400" b="0" cap="none" spc="0" dirty="0">
+              <a:ln w="0"/>
+              <a:solidFill>
+                <a:schemeClr val="tx1"/>
+              </a:solidFill>
+              <a:effectLst>
+                <a:outerShdw blurRad="38100" dist="19050" dir="2700000" algn="tl" rotWithShape="0">
+                  <a:schemeClr val="dk1">
+                    <a:alpha val="40000"/>
+                  </a:schemeClr>
+                </a:outerShdw>
+              </a:effectLst>
+            </a:endParaRPr>
+          </a:p>
+        </p:txBody>
+      </p:sp>
+      <p:sp>
+        <p:nvSpPr>
+          <p:cNvPr id="21" name="Rectángulo 20">
+            <a:extLst>
+              <a:ext uri="{FF2B5EF4-FFF2-40B4-BE49-F238E27FC236}">
+                <a16:creationId xmlns:a16="http://schemas.microsoft.com/office/drawing/2014/main" id="{2422DECB-5A4E-D9C3-D687-624AFD8A9F25}"/>
+              </a:ext>
+            </a:extLst>
+          </p:cNvPr>
+          <p:cNvSpPr/>
+          <p:nvPr/>
+        </p:nvSpPr>
+        <p:spPr>
+          <a:xfrm>
+            <a:off x="1991189" y="4784107"/>
+            <a:ext cx="815864" cy="584775"/>
+          </a:xfrm>
+          <a:prstGeom prst="rect">
+            <a:avLst/>
+          </a:prstGeom>
+          <a:noFill/>
+        </p:spPr>
+        <p:txBody>
+          <a:bodyPr wrap="none" lIns="91440" tIns="45720" rIns="91440" bIns="45720">
+            <a:spAutoFit/>
+          </a:bodyPr>
+          <a:lstStyle/>
+          <a:p>
+            <a:pPr algn="ctr"/>
+            <a:r>
+              <a:rPr lang="es-ES" sz="3200" b="0" cap="none" spc="0" dirty="0">
+                <a:ln w="0"/>
+                <a:solidFill>
+                  <a:schemeClr val="tx1"/>
+                </a:solidFill>
+                <a:effectLst>
+                  <a:outerShdw blurRad="38100" dist="19050" dir="2700000" algn="tl" rotWithShape="0">
+                    <a:schemeClr val="dk1">
+                      <a:alpha val="40000"/>
+                    </a:schemeClr>
+                  </a:outerShdw>
+                </a:effectLst>
+              </a:rPr>
+              <a:t>LFO</a:t>
+            </a:r>
+          </a:p>
+        </p:txBody>
+      </p:sp>
+      <p:sp>
+        <p:nvSpPr>
+          <p:cNvPr id="20" name="Rectángulo 19">
+            <a:extLst>
+              <a:ext uri="{FF2B5EF4-FFF2-40B4-BE49-F238E27FC236}">
+                <a16:creationId xmlns:a16="http://schemas.microsoft.com/office/drawing/2014/main" id="{452D7329-D1DE-8E0B-A53F-AC70B491D7E8}"/>
+              </a:ext>
+            </a:extLst>
+          </p:cNvPr>
+          <p:cNvSpPr/>
+          <p:nvPr/>
+        </p:nvSpPr>
+        <p:spPr>
+          <a:xfrm>
+            <a:off x="6369096" y="2472908"/>
+            <a:ext cx="1346395" cy="584775"/>
+          </a:xfrm>
+          <a:prstGeom prst="rect">
+            <a:avLst/>
+          </a:prstGeom>
+          <a:noFill/>
+        </p:spPr>
+        <p:txBody>
+          <a:bodyPr wrap="none" lIns="91440" tIns="45720" rIns="91440" bIns="45720">
+            <a:spAutoFit/>
+          </a:bodyPr>
+          <a:lstStyle/>
+          <a:p>
+            <a:pPr algn="ctr"/>
+            <a:r>
+              <a:rPr lang="es-ES" sz="3200" b="0" cap="none" spc="0" dirty="0">
+                <a:ln w="0"/>
+                <a:solidFill>
+                  <a:schemeClr val="tx1"/>
+                </a:solidFill>
+                <a:effectLst>
+                  <a:outerShdw blurRad="38100" dist="19050" dir="2700000" algn="tl" rotWithShape="0">
+                    <a:schemeClr val="dk1">
+                      <a:alpha val="40000"/>
+                    </a:schemeClr>
+                  </a:outerShdw>
+                </a:effectLst>
+              </a:rPr>
+              <a:t>Reverb</a:t>
+            </a:r>
+          </a:p>
+        </p:txBody>
+      </p:sp>
+      <p:sp>
+        <p:nvSpPr>
+          <p:cNvPr id="28" name="Rectángulo 27">
+            <a:extLst>
+              <a:ext uri="{FF2B5EF4-FFF2-40B4-BE49-F238E27FC236}">
+                <a16:creationId xmlns:a16="http://schemas.microsoft.com/office/drawing/2014/main" id="{9D705A4C-D033-3B43-EF79-43463AD67757}"/>
+              </a:ext>
+            </a:extLst>
+          </p:cNvPr>
+          <p:cNvSpPr/>
+          <p:nvPr/>
+        </p:nvSpPr>
+        <p:spPr>
+          <a:xfrm>
+            <a:off x="6633524" y="4831403"/>
+            <a:ext cx="765531" cy="584775"/>
+          </a:xfrm>
+          <a:prstGeom prst="rect">
+            <a:avLst/>
+          </a:prstGeom>
+          <a:noFill/>
+        </p:spPr>
+        <p:txBody>
+          <a:bodyPr wrap="none" lIns="91440" tIns="45720" rIns="91440" bIns="45720">
+            <a:spAutoFit/>
+          </a:bodyPr>
+          <a:lstStyle/>
+          <a:p>
+            <a:pPr algn="ctr"/>
+            <a:r>
+              <a:rPr lang="es-ES" sz="3200" b="0" cap="none" spc="0" dirty="0">
+                <a:ln w="0"/>
+                <a:solidFill>
+                  <a:schemeClr val="tx1"/>
+                </a:solidFill>
+                <a:effectLst>
+                  <a:outerShdw blurRad="38100" dist="19050" dir="2700000" algn="tl" rotWithShape="0">
+                    <a:schemeClr val="dk1">
+                      <a:alpha val="40000"/>
+                    </a:schemeClr>
+                  </a:outerShdw>
+                </a:effectLst>
+              </a:rPr>
+              <a:t>Eco</a:t>
+            </a:r>
+          </a:p>
+        </p:txBody>
+      </p:sp>
+      <p:sp>
+        <p:nvSpPr>
+          <p:cNvPr id="11" name="Rectángulo 10">
+            <a:extLst>
+              <a:ext uri="{FF2B5EF4-FFF2-40B4-BE49-F238E27FC236}">
+                <a16:creationId xmlns:a16="http://schemas.microsoft.com/office/drawing/2014/main" id="{8BB3DECC-006F-6546-4BC1-3AFBC3797DC8}"/>
+              </a:ext>
+            </a:extLst>
+          </p:cNvPr>
+          <p:cNvSpPr/>
+          <p:nvPr/>
+        </p:nvSpPr>
+        <p:spPr>
+          <a:xfrm>
+            <a:off x="8516269" y="2513069"/>
+            <a:ext cx="612988" cy="400110"/>
+          </a:xfrm>
+          <a:prstGeom prst="rect">
+            <a:avLst/>
+          </a:prstGeom>
+          <a:noFill/>
+        </p:spPr>
+        <p:txBody>
+          <a:bodyPr wrap="none" lIns="91440" tIns="45720" rIns="91440" bIns="45720">
+            <a:spAutoFit/>
+          </a:bodyPr>
+          <a:lstStyle/>
+          <a:p>
+            <a:pPr algn="ctr"/>
+            <a:r>
+              <a:rPr lang="es-ES" sz="2000" b="0" cap="none" spc="0" dirty="0">
+                <a:ln w="0"/>
+                <a:solidFill>
+                  <a:schemeClr val="tx1"/>
+                </a:solidFill>
+                <a:effectLst>
+                  <a:outerShdw blurRad="38100" dist="19050" dir="2700000" algn="tl" rotWithShape="0">
+                    <a:schemeClr val="dk1">
+                      <a:alpha val="40000"/>
+                    </a:schemeClr>
+                  </a:outerShdw>
+                </a:effectLst>
+              </a:rPr>
+              <a:t>PAN</a:t>
+            </a:r>
+          </a:p>
+        </p:txBody>
+      </p:sp>
+      <p:sp>
+        <p:nvSpPr>
+          <p:cNvPr id="29" name="Rectángulo 28">
+            <a:extLst>
+              <a:ext uri="{FF2B5EF4-FFF2-40B4-BE49-F238E27FC236}">
+                <a16:creationId xmlns:a16="http://schemas.microsoft.com/office/drawing/2014/main" id="{7C50E4F1-A274-D34C-E38A-4C00FA9F7A22}"/>
+              </a:ext>
+            </a:extLst>
+          </p:cNvPr>
+          <p:cNvSpPr/>
+          <p:nvPr/>
+        </p:nvSpPr>
+        <p:spPr>
+          <a:xfrm>
+            <a:off x="8338496" y="5554866"/>
+            <a:ext cx="968534" cy="369332"/>
+          </a:xfrm>
+          <a:prstGeom prst="rect">
+            <a:avLst/>
+          </a:prstGeom>
+          <a:noFill/>
+        </p:spPr>
+        <p:txBody>
+          <a:bodyPr wrap="none" lIns="91440" tIns="45720" rIns="91440" bIns="45720">
+            <a:spAutoFit/>
+          </a:bodyPr>
+          <a:lstStyle/>
+          <a:p>
+            <a:pPr algn="ctr"/>
+            <a:r>
+              <a:rPr lang="es-ES" b="0" cap="none" spc="0" dirty="0">
+                <a:ln w="0"/>
+                <a:solidFill>
+                  <a:schemeClr val="tx1"/>
+                </a:solidFill>
+                <a:effectLst>
+                  <a:outerShdw blurRad="38100" dist="19050" dir="2700000" algn="tl" rotWithShape="0">
+                    <a:schemeClr val="dk1">
+                      <a:alpha val="40000"/>
+                    </a:schemeClr>
+                  </a:outerShdw>
+                </a:effectLst>
+              </a:rPr>
+              <a:t>MASTER</a:t>
+            </a:r>
+          </a:p>
+        </p:txBody>
+      </p:sp>
+    </p:spTree>
+    <p:extLst>
+      <p:ext uri="{BB962C8B-B14F-4D97-AF65-F5344CB8AC3E}">
+        <p14:creationId xmlns:p14="http://schemas.microsoft.com/office/powerpoint/2010/main" val="3206267713"/>
+      </p:ext>
+    </p:extLst>
+  </p:cSld>
+  <p:clrMapOvr>
+    <a:masterClrMapping/>
+  </p:clrMapOvr>
+</p:sld>
+</file>
+
 <file path=ppt/theme/theme1.xml><?xml version="1.0" encoding="utf-8"?>
 <a:theme xmlns:a="http://schemas.openxmlformats.org/drawingml/2006/main" name="Tema de Office">
   <a:themeElements>

</xml_diff>